<commit_message>
Fix because of opendoc fuck. do not save with open/libre office again!!!
;)
</commit_message>
<xml_diff>
--- a/doc/Poster.pptx
+++ b/doc/Poster.pptx
@@ -302,7 +302,7 @@
           <a:p>
             <a:fld id="{D2ED235E-9080-4719-A145-5B05AC56BA2B}" type="datetimeFigureOut">
               <a:rPr lang="de-DE" smtClean="0"/>
-              <a:t>05.07.2016</a:t>
+              <a:t>06.07.2016</a:t>
             </a:fld>
             <a:endParaRPr lang="de-DE"/>
           </a:p>
@@ -732,11 +732,6 @@
               </a:rPr>
               <a:t> – Steuerung einer Bebop 2 Drohne mit verschiedenen Eingabegeräten</a:t>
             </a:r>
-            <a:endParaRPr lang="de-DE" sz="7200" b="1" dirty="0" smtClean="0">
-              <a:solidFill>
-                <a:schemeClr val="accent5"/>
-              </a:solidFill>
-            </a:endParaRPr>
           </a:p>
           <a:p>
             <a:endParaRPr lang="de-DE" sz="4400" b="1" dirty="0" smtClean="0">
@@ -755,15 +750,7 @@
                   <a:srgbClr val="262626"/>
                 </a:solidFill>
               </a:rPr>
-              <a:t>Fabian Kalweit, Stefan </a:t>
-            </a:r>
-            <a:r>
-              <a:rPr lang="de-DE" sz="4400" b="1" dirty="0" smtClean="0">
-                <a:solidFill>
-                  <a:srgbClr val="262626"/>
-                </a:solidFill>
-              </a:rPr>
-              <a:t>Templin, Tobias Puderer, Florian Oswald </a:t>
+              <a:t>Fabian Kalweit, Stefan Templin, Tobias Puderer, Florian Oswald </a:t>
             </a:r>
           </a:p>
           <a:p>
@@ -838,7 +825,15 @@
                   <a:srgbClr val="262626"/>
                 </a:solidFill>
               </a:rPr>
-              <a:t>faka0004, stte0002, topu0001, flos0001 @stud.hs-kl.de</a:t>
+              <a:t>&lt;faka0004 | stte0002 | topu0001 | flos0001&gt; </a:t>
+            </a:r>
+            <a:r>
+              <a:rPr lang="de-DE" sz="4400" dirty="0" smtClean="0">
+                <a:solidFill>
+                  <a:srgbClr val="262626"/>
+                </a:solidFill>
+              </a:rPr>
+              <a:t>@stud.hs-kl.de</a:t>
             </a:r>
           </a:p>
         </p:txBody>
@@ -875,13 +870,6 @@
               </a:rPr>
               <a:t>Umsetzung</a:t>
             </a:r>
-            <a:endParaRPr lang="de-DE" sz="5400" dirty="0" smtClean="0">
-              <a:solidFill>
-                <a:schemeClr val="accent5"/>
-              </a:solidFill>
-              <a:latin typeface="+mj-lt"/>
-              <a:cs typeface="Times New Roman" pitchFamily="18" charset="0"/>
-            </a:endParaRPr>
           </a:p>
         </p:txBody>
       </p:sp>
@@ -894,7 +882,7 @@
         <p:spPr>
           <a:xfrm>
             <a:off x="1911944" y="15217407"/>
-            <a:ext cx="12529392" cy="6324808"/>
+            <a:ext cx="12529392" cy="7248138"/>
           </a:xfrm>
           <a:prstGeom prst="rect">
             <a:avLst/>
@@ -966,23 +954,7 @@
                   <a:srgbClr val="262626"/>
                 </a:solidFill>
               </a:rPr>
-              <a:t> Joystick und das </a:t>
-            </a:r>
-            <a:r>
-              <a:rPr lang="de-DE" sz="3000" smtClean="0">
-                <a:solidFill>
-                  <a:srgbClr val="262626"/>
-                </a:solidFill>
-              </a:rPr>
-              <a:t>Wii Balance Board </a:t>
-            </a:r>
-            <a:r>
-              <a:rPr lang="de-DE" sz="3000" dirty="0" smtClean="0">
-                <a:solidFill>
-                  <a:srgbClr val="262626"/>
-                </a:solidFill>
-              </a:rPr>
-              <a:t>von Nintendo zum Einsatz, welche – mit Ausnahme des Balance </a:t>
+              <a:t> Joystick und das Wii Balance Board von Nintendo zum Einsatz, welche – mit Ausnahme des Balance </a:t>
             </a:r>
             <a:r>
               <a:rPr lang="de-DE" sz="3000" dirty="0">
@@ -1050,15 +1022,31 @@
             </a:r>
             <a:r>
               <a:rPr lang="de-DE" sz="3000" dirty="0"/>
-              <a:t> (z.B. Debian oder Ubuntu) auf einem mobilen PC (z.B. Laptop, Tablet), da alle benötigten Komponenten problemlos anzubinden sind. </a:t>
-            </a:r>
-            <a:r>
-              <a:rPr lang="de-DE" sz="3000" dirty="0" smtClean="0">
-                <a:solidFill>
-                  <a:srgbClr val="FF0000"/>
-                </a:solidFill>
-              </a:rPr>
-              <a:t>Die Hauptkomponenten funktionieren auch unter Windows und MacOS.</a:t>
+              <a:t> (z.B. Debian oder Ubuntu) auf einem mobilen PC (z.B. Laptop, Tablet), da </a:t>
+            </a:r>
+            <a:r>
+              <a:rPr lang="de-DE" sz="3000" dirty="0" smtClean="0"/>
+              <a:t>hier alle </a:t>
+            </a:r>
+            <a:r>
+              <a:rPr lang="de-DE" sz="3000" dirty="0"/>
+              <a:t>benötigten Komponenten problemlos anzubinden sind. </a:t>
+            </a:r>
+            <a:r>
+              <a:rPr lang="de-DE" sz="3000" dirty="0" smtClean="0"/>
+              <a:t>Die Hauptkomponenten funktionieren auch unter Windows und </a:t>
+            </a:r>
+            <a:r>
+              <a:rPr lang="de-DE" sz="3000" dirty="0" smtClean="0"/>
+              <a:t>MacOS, wobei das Balance Board unter Windows nur mit einem passenden JSR082 Bluetooth Stack (z.B. </a:t>
+            </a:r>
+            <a:r>
+              <a:rPr lang="de-DE" sz="3000" dirty="0" err="1" smtClean="0"/>
+              <a:t>Widcomm</a:t>
+            </a:r>
+            <a:r>
+              <a:rPr lang="de-DE" sz="3000" dirty="0" smtClean="0"/>
+              <a:t>) anzubinden ist.</a:t>
             </a:r>
             <a:endParaRPr lang="de-DE" sz="3000" dirty="0" smtClean="0"/>
           </a:p>
@@ -1096,13 +1084,6 @@
               </a:rPr>
               <a:t>Kurzfassung</a:t>
             </a:r>
-            <a:endParaRPr lang="de-DE" sz="5400" dirty="0" smtClean="0">
-              <a:solidFill>
-                <a:schemeClr val="accent5"/>
-              </a:solidFill>
-              <a:latin typeface="+mj-lt"/>
-              <a:cs typeface="Times New Roman" pitchFamily="18" charset="0"/>
-            </a:endParaRPr>
           </a:p>
         </p:txBody>
       </p:sp>
@@ -1310,13 +1291,6 @@
               </a:rPr>
               <a:t>Ausblick</a:t>
             </a:r>
-            <a:endParaRPr lang="de-DE" sz="5400" dirty="0" smtClean="0">
-              <a:solidFill>
-                <a:schemeClr val="accent5"/>
-              </a:solidFill>
-              <a:latin typeface="+mj-lt"/>
-              <a:cs typeface="Times New Roman" pitchFamily="18" charset="0"/>
-            </a:endParaRPr>
           </a:p>
         </p:txBody>
       </p:sp>
@@ -1438,13 +1412,6 @@
               </a:rPr>
               <a:t>Referenzen</a:t>
             </a:r>
-            <a:endParaRPr lang="de-DE" sz="5400" dirty="0" smtClean="0">
-              <a:solidFill>
-                <a:schemeClr val="accent5"/>
-              </a:solidFill>
-              <a:latin typeface="+mj-lt"/>
-              <a:cs typeface="Times New Roman" pitchFamily="18" charset="0"/>
-            </a:endParaRPr>
           </a:p>
         </p:txBody>
       </p:sp>
@@ -1734,21 +1701,13 @@
                   <a:srgbClr val="262626"/>
                 </a:solidFill>
               </a:rPr>
-              <a:t> </a:t>
+              <a:t>  </a:t>
             </a:r>
             <a:r>
               <a:rPr lang="en-US" sz="2400" dirty="0">
                 <a:solidFill>
                   <a:srgbClr val="262626"/>
                 </a:solidFill>
-              </a:rPr>
-              <a:t> </a:t>
-            </a:r>
-            <a:r>
-              <a:rPr lang="en-US" sz="2400" dirty="0">
-                <a:solidFill>
-                  <a:srgbClr val="262626"/>
-                </a:solidFill>
                 <a:hlinkClick r:id="rId6"/>
               </a:rPr>
               <a:t>https://</a:t>
@@ -1784,15 +1743,7 @@
                   <a:srgbClr val="262626"/>
                 </a:solidFill>
               </a:rPr>
-              <a:t> </a:t>
-            </a:r>
-            <a:r>
-              <a:rPr lang="en-US" sz="2400" dirty="0" smtClean="0">
-                <a:solidFill>
-                  <a:srgbClr val="262626"/>
-                </a:solidFill>
-              </a:rPr>
-              <a:t> 2016)</a:t>
+              <a:t>  2016)</a:t>
             </a:r>
             <a:endParaRPr lang="de-DE" sz="2400" dirty="0">
               <a:solidFill>
@@ -1810,7 +1761,7 @@
         </p:nvSpPr>
         <p:spPr>
           <a:xfrm>
-            <a:off x="4605970" y="28688378"/>
+            <a:off x="4605970" y="29624481"/>
             <a:ext cx="6042999" cy="830997"/>
           </a:xfrm>
           <a:prstGeom prst="rect">
@@ -1869,23 +1820,7 @@
                   <a:srgbClr val="262626"/>
                 </a:solidFill>
               </a:rPr>
-              <a:t>Abbildung 2</a:t>
-            </a:r>
-            <a:r>
-              <a:rPr lang="de-DE" sz="2400" b="1" dirty="0" smtClean="0">
-                <a:solidFill>
-                  <a:srgbClr val="262626"/>
-                </a:solidFill>
-              </a:rPr>
-              <a:t>: </a:t>
-            </a:r>
-            <a:r>
-              <a:rPr lang="de-DE" sz="2400" b="1" dirty="0" smtClean="0">
-                <a:solidFill>
-                  <a:srgbClr val="262626"/>
-                </a:solidFill>
-              </a:rPr>
-              <a:t>Architektur</a:t>
+              <a:t>Abbildung 2: Architektur</a:t>
             </a:r>
             <a:endParaRPr lang="de-DE" sz="2400" b="1" dirty="0">
               <a:solidFill>
@@ -2004,7 +1939,7 @@
         </p:nvGrpSpPr>
         <p:grpSpPr>
           <a:xfrm>
-            <a:off x="2050608" y="21836311"/>
+            <a:off x="2050608" y="22772414"/>
             <a:ext cx="12209205" cy="6624736"/>
             <a:chOff x="1630000" y="21836311"/>
             <a:chExt cx="12306202" cy="6624736"/>
@@ -2561,7 +2496,7 @@
         </p:nvSpPr>
         <p:spPr>
           <a:xfrm>
-            <a:off x="1630000" y="29901206"/>
+            <a:off x="1630000" y="30621286"/>
             <a:ext cx="12529390" cy="7200800"/>
           </a:xfrm>
           <a:prstGeom prst="rect">
@@ -2928,7 +2863,15 @@
             <a:pPr algn="just"/>
             <a:r>
               <a:rPr lang="de-DE" sz="3000" dirty="0" smtClean="0"/>
-              <a:t>Aus Gründen der Sicherheit kann die Steuerung der Drohne jederzeit von der zentralen Steuereinheit übernommen und alle Peripheriegeräte separat aktiviert bzw. deaktiviert werden.</a:t>
+              <a:t>Aus </a:t>
+            </a:r>
+            <a:r>
+              <a:rPr lang="de-DE" sz="3000" dirty="0" smtClean="0"/>
+              <a:t>Sicherheitsgründen </a:t>
+            </a:r>
+            <a:r>
+              <a:rPr lang="de-DE" sz="3000" dirty="0" smtClean="0"/>
+              <a:t>kann die Steuerung der Drohne jederzeit von der zentralen Steuereinheit übernommen und alle Peripheriegeräte separat aktiviert bzw. deaktiviert werden.</a:t>
             </a:r>
             <a:endParaRPr lang="de-DE" sz="3000" dirty="0"/>
           </a:p>

</xml_diff>

<commit_message>
Farben und Layout aktualisiert
</commit_message>
<xml_diff>
--- a/doc/Poster.pptx
+++ b/doc/Poster.pptx
@@ -302,6 +302,7 @@
           <a:p>
             <a:fld id="{D2ED235E-9080-4719-A145-5B05AC56BA2B}" type="datetimeFigureOut">
               <a:rPr lang="de-DE" smtClean="0"/>
+              <a:pPr/>
               <a:t>06.07.2016</a:t>
             </a:fld>
             <a:endParaRPr lang="de-DE"/>
@@ -360,6 +361,7 @@
           <a:p>
             <a:fld id="{07A96CB7-5B98-44AE-A165-BB4B0B7DE95A}" type="slidenum">
               <a:rPr lang="de-DE" smtClean="0"/>
+              <a:pPr/>
               <a:t>‹Nr.›</a:t>
             </a:fld>
             <a:endParaRPr lang="de-DE"/>
@@ -369,7 +371,7 @@
     </p:spTree>
     <p:extLst>
       <p:ext uri="{BB962C8B-B14F-4D97-AF65-F5344CB8AC3E}">
-        <p14:creationId xmlns:p14="http://schemas.microsoft.com/office/powerpoint/2010/main" val="2271319829"/>
+        <p14:creationId xmlns:p14="http://schemas.microsoft.com/office/powerpoint/2010/main" xmlns="" val="2271319829"/>
       </p:ext>
     </p:extLst>
   </p:cSld>
@@ -411,7 +413,7 @@
     </p:spTree>
     <p:extLst>
       <p:ext uri="{BB962C8B-B14F-4D97-AF65-F5344CB8AC3E}">
-        <p14:creationId xmlns:p14="http://schemas.microsoft.com/office/powerpoint/2010/main" val="185692037"/>
+        <p14:creationId xmlns:p14="http://schemas.microsoft.com/office/powerpoint/2010/main" xmlns="" val="185692037"/>
       </p:ext>
     </p:extLst>
   </p:cSld>
@@ -825,15 +827,7 @@
                   <a:srgbClr val="262626"/>
                 </a:solidFill>
               </a:rPr>
-              <a:t>&lt;faka0004 | stte0002 | topu0001 | flos0001&gt; </a:t>
-            </a:r>
-            <a:r>
-              <a:rPr lang="de-DE" sz="4400" dirty="0" smtClean="0">
-                <a:solidFill>
-                  <a:srgbClr val="262626"/>
-                </a:solidFill>
-              </a:rPr>
-              <a:t>@stud.hs-kl.de</a:t>
+              <a:t>&lt;faka0004 | stte0002 | topu0001 | flos0001&gt; @stud.hs-kl.de</a:t>
             </a:r>
           </a:p>
         </p:txBody>
@@ -846,7 +840,7 @@
         </p:nvSpPr>
         <p:spPr>
           <a:xfrm>
-            <a:off x="1890515" y="14079031"/>
+            <a:off x="1630000" y="14079031"/>
             <a:ext cx="12529392" cy="923330"/>
           </a:xfrm>
           <a:prstGeom prst="rect">
@@ -870,6 +864,13 @@
               </a:rPr>
               <a:t>Umsetzung</a:t>
             </a:r>
+            <a:endParaRPr lang="de-DE" sz="5400" dirty="0" smtClean="0">
+              <a:solidFill>
+                <a:schemeClr val="accent5"/>
+              </a:solidFill>
+              <a:latin typeface="+mj-lt"/>
+              <a:cs typeface="Times New Roman" pitchFamily="18" charset="0"/>
+            </a:endParaRPr>
           </a:p>
         </p:txBody>
       </p:sp>
@@ -881,7 +882,7 @@
         </p:nvSpPr>
         <p:spPr>
           <a:xfrm>
-            <a:off x="1911944" y="15217407"/>
+            <a:off x="1630000" y="15217407"/>
             <a:ext cx="12529392" cy="7248138"/>
           </a:xfrm>
           <a:prstGeom prst="rect">
@@ -1034,11 +1035,7 @@
             </a:r>
             <a:r>
               <a:rPr lang="de-DE" sz="3000" dirty="0" smtClean="0"/>
-              <a:t>Die Hauptkomponenten funktionieren auch unter Windows und </a:t>
-            </a:r>
-            <a:r>
-              <a:rPr lang="de-DE" sz="3000" dirty="0" smtClean="0"/>
-              <a:t>MacOS, wobei das Balance Board unter Windows nur mit einem passenden JSR082 Bluetooth Stack (z.B. </a:t>
+              <a:t>Die Hauptkomponenten funktionieren auch unter Windows und MacOS, wobei das Balance Board unter Windows nur mit einem passenden JSR082 Bluetooth Stack (z.B. </a:t>
             </a:r>
             <a:r>
               <a:rPr lang="de-DE" sz="3000" dirty="0" err="1" smtClean="0"/>
@@ -1048,7 +1045,6 @@
               <a:rPr lang="de-DE" sz="3000" dirty="0" smtClean="0"/>
               <a:t>) anzubinden ist.</a:t>
             </a:r>
-            <a:endParaRPr lang="de-DE" sz="3000" dirty="0" smtClean="0"/>
           </a:p>
         </p:txBody>
       </p:sp>
@@ -1060,7 +1056,7 @@
         </p:nvSpPr>
         <p:spPr>
           <a:xfrm>
-            <a:off x="1933373" y="8082782"/>
+            <a:off x="1630000" y="8082782"/>
             <a:ext cx="12486534" cy="923330"/>
           </a:xfrm>
           <a:prstGeom prst="rect">
@@ -1082,8 +1078,25 @@
                 <a:latin typeface="+mj-lt"/>
                 <a:cs typeface="Times New Roman" pitchFamily="18" charset="0"/>
               </a:rPr>
-              <a:t>Kurzfassung</a:t>
-            </a:r>
+              <a:t>K</a:t>
+            </a:r>
+            <a:r>
+              <a:rPr lang="de-DE" sz="5400" dirty="0" smtClean="0">
+                <a:solidFill>
+                  <a:schemeClr val="accent5"/>
+                </a:solidFill>
+                <a:latin typeface="+mj-lt"/>
+                <a:cs typeface="Times New Roman" pitchFamily="18" charset="0"/>
+              </a:rPr>
+              <a:t>urzfassung</a:t>
+            </a:r>
+            <a:endParaRPr lang="de-DE" sz="5400" dirty="0" smtClean="0">
+              <a:solidFill>
+                <a:schemeClr val="accent5"/>
+              </a:solidFill>
+              <a:latin typeface="+mj-lt"/>
+              <a:cs typeface="Times New Roman" pitchFamily="18" charset="0"/>
+            </a:endParaRPr>
           </a:p>
         </p:txBody>
       </p:sp>
@@ -1095,7 +1108,7 @@
         </p:nvSpPr>
         <p:spPr>
           <a:xfrm>
-            <a:off x="1810966" y="9024974"/>
+            <a:off x="1630000" y="9024974"/>
             <a:ext cx="12529392" cy="5026331"/>
           </a:xfrm>
           <a:prstGeom prst="rect">
@@ -1232,7 +1245,7 @@
           <a:blip r:embed="rId2" cstate="print">
             <a:extLst>
               <a:ext uri="{28A0092B-C50C-407E-A947-70E740481C1C}">
-                <a14:useLocalDpi xmlns:a14="http://schemas.microsoft.com/office/drawing/2010/main" val="0"/>
+                <a14:useLocalDpi xmlns:a14="http://schemas.microsoft.com/office/drawing/2010/main" xmlns="" val="0"/>
               </a:ext>
             </a:extLst>
           </a:blip>
@@ -1250,7 +1263,7 @@
           <a:noFill/>
           <a:extLst>
             <a:ext uri="{909E8E84-426E-40DD-AFC4-6F175D3DCCD1}">
-              <a14:hiddenFill xmlns:a14="http://schemas.microsoft.com/office/drawing/2010/main">
+              <a14:hiddenFill xmlns:a14="http://schemas.microsoft.com/office/drawing/2010/main" xmlns="">
                 <a:solidFill>
                   <a:srgbClr val="FFFFFF"/>
                 </a:solidFill>
@@ -1267,7 +1280,7 @@
         </p:nvSpPr>
         <p:spPr>
           <a:xfrm>
-            <a:off x="15837004" y="27308040"/>
+            <a:off x="15758295" y="27308040"/>
             <a:ext cx="5883556" cy="923330"/>
           </a:xfrm>
           <a:prstGeom prst="rect">
@@ -1302,7 +1315,7 @@
         </p:nvSpPr>
         <p:spPr>
           <a:xfrm>
-            <a:off x="15837003" y="28386425"/>
+            <a:off x="15758295" y="28386425"/>
             <a:ext cx="12529393" cy="6411325"/>
           </a:xfrm>
           <a:prstGeom prst="rect">
@@ -1388,7 +1401,7 @@
         </p:nvSpPr>
         <p:spPr>
           <a:xfrm>
-            <a:off x="15859987" y="34797750"/>
+            <a:off x="15758295" y="34797750"/>
             <a:ext cx="12529393" cy="923330"/>
           </a:xfrm>
           <a:prstGeom prst="rect">
@@ -1423,7 +1436,7 @@
         </p:nvSpPr>
         <p:spPr>
           <a:xfrm>
-            <a:off x="15859987" y="35721080"/>
+            <a:off x="15758295" y="35721080"/>
             <a:ext cx="12529390" cy="1948565"/>
           </a:xfrm>
           <a:prstGeom prst="rect">
@@ -1830,107 +1843,38 @@
           </a:p>
         </p:txBody>
       </p:sp>
-      <p:grpSp>
-        <p:nvGrpSpPr>
-          <p:cNvPr id="79" name="Gruppieren 78"/>
-          <p:cNvGrpSpPr/>
+      <p:pic>
+        <p:nvPicPr>
+          <p:cNvPr id="41" name="Grafik 40"/>
+          <p:cNvPicPr>
+            <a:picLocks noChangeAspect="1"/>
+          </p:cNvPicPr>
           <p:nvPr/>
-        </p:nvGrpSpPr>
-        <p:grpSpPr>
+        </p:nvPicPr>
+        <p:blipFill>
+          <a:blip r:embed="rId7" cstate="print"/>
+          <a:stretch>
+            <a:fillRect/>
+          </a:stretch>
+        </p:blipFill>
+        <p:spPr>
           <a:xfrm>
-            <a:off x="15837003" y="8704404"/>
-            <a:ext cx="12552376" cy="5897644"/>
-            <a:chOff x="15837003" y="8704404"/>
-            <a:chExt cx="12552376" cy="5897644"/>
+            <a:off x="15860067" y="8953890"/>
+            <a:ext cx="12495323" cy="5897644"/>
           </a:xfrm>
-        </p:grpSpPr>
-        <p:sp>
-          <p:nvSpPr>
-            <p:cNvPr id="78" name="Rechteck 77"/>
-            <p:cNvSpPr/>
-            <p:nvPr/>
-          </p:nvSpPr>
-          <p:spPr>
-            <a:xfrm>
-              <a:off x="15859986" y="8704404"/>
-              <a:ext cx="12529393" cy="5897644"/>
-            </a:xfrm>
-            <a:prstGeom prst="rect">
-              <a:avLst/>
-            </a:prstGeom>
-            <a:solidFill>
-              <a:srgbClr val="FFFF00">
-                <a:alpha val="5000"/>
-              </a:srgbClr>
-            </a:solidFill>
-          </p:spPr>
-          <p:style>
-            <a:lnRef idx="2">
-              <a:schemeClr val="accent1">
-                <a:shade val="50000"/>
-              </a:schemeClr>
-            </a:lnRef>
-            <a:fillRef idx="1">
-              <a:schemeClr val="accent1"/>
-            </a:fillRef>
-            <a:effectRef idx="0">
-              <a:schemeClr val="accent1"/>
-            </a:effectRef>
-            <a:fontRef idx="minor">
-              <a:schemeClr val="lt1"/>
-            </a:fontRef>
-          </p:style>
-          <p:txBody>
-            <a:bodyPr rtlCol="0" anchor="ctr"/>
-            <a:lstStyle/>
-            <a:p>
-              <a:pPr algn="ctr"/>
-              <a:endParaRPr lang="de-DE"/>
-            </a:p>
-          </p:txBody>
-        </p:sp>
-        <p:pic>
-          <p:nvPicPr>
-            <p:cNvPr id="41" name="Grafik 40"/>
-            <p:cNvPicPr>
-              <a:picLocks noChangeAspect="1"/>
-            </p:cNvPicPr>
-            <p:nvPr/>
-          </p:nvPicPr>
-          <p:blipFill>
-            <a:blip r:embed="rId7">
-              <a:clrChange>
-                <a:clrFrom>
-                  <a:srgbClr val="FFFFFF"/>
-                </a:clrFrom>
-                <a:clrTo>
-                  <a:srgbClr val="FFFFFF">
-                    <a:alpha val="0"/>
-                  </a:srgbClr>
-                </a:clrTo>
-              </a:clrChange>
-              <a:extLst>
-                <a:ext uri="{28A0092B-C50C-407E-A947-70E740481C1C}">
-                  <a14:useLocalDpi xmlns:a14="http://schemas.microsoft.com/office/drawing/2010/main" val="0"/>
-                </a:ext>
-              </a:extLst>
-            </a:blip>
-            <a:stretch>
-              <a:fillRect/>
-            </a:stretch>
-          </p:blipFill>
-          <p:spPr>
-            <a:xfrm>
-              <a:off x="15837003" y="8704404"/>
-              <a:ext cx="12533794" cy="5897644"/>
-            </a:xfrm>
-            <a:prstGeom prst="rect">
-              <a:avLst/>
-            </a:prstGeom>
+          <a:prstGeom prst="rect">
+            <a:avLst/>
+          </a:prstGeom>
+          <a:solidFill>
+            <a:srgbClr val="002060">
+              <a:alpha val="5000"/>
+            </a:srgbClr>
+          </a:solidFill>
+          <a:ln>
             <a:noFill/>
-          </p:spPr>
-        </p:pic>
-      </p:grpSp>
+          </a:ln>
+        </p:spPr>
+      </p:pic>
       <p:grpSp>
         <p:nvGrpSpPr>
           <p:cNvPr id="75" name="Gruppieren 74"/>
@@ -1960,10 +1904,15 @@
               <a:avLst/>
             </a:prstGeom>
             <a:solidFill>
-              <a:srgbClr val="FFFF00">
+              <a:srgbClr val="002060">
                 <a:alpha val="5000"/>
               </a:srgbClr>
             </a:solidFill>
+            <a:ln>
+              <a:solidFill>
+                <a:srgbClr val="000000"/>
+              </a:solidFill>
+            </a:ln>
           </p:spPr>
           <p:style>
             <a:lnRef idx="2">
@@ -1999,7 +1948,7 @@
             <p:nvPr/>
           </p:nvPicPr>
           <p:blipFill rotWithShape="1">
-            <a:blip r:embed="rId8">
+            <a:blip r:embed="rId8" cstate="print">
               <a:clrChange>
                 <a:clrFrom>
                   <a:srgbClr val="FFFFFF"/>
@@ -2012,7 +1961,7 @@
               </a:clrChange>
               <a:extLst>
                 <a:ext uri="{28A0092B-C50C-407E-A947-70E740481C1C}">
-                  <a14:useLocalDpi xmlns:a14="http://schemas.microsoft.com/office/drawing/2010/main" val="0"/>
+                  <a14:useLocalDpi xmlns:a14="http://schemas.microsoft.com/office/drawing/2010/main" xmlns="" val="0"/>
                 </a:ext>
               </a:extLst>
             </a:blip>
@@ -2029,11 +1978,13 @@
             </a:prstGeom>
             <a:noFill/>
             <a:ln>
-              <a:noFill/>
+              <a:solidFill>
+                <a:srgbClr val="000000"/>
+              </a:solidFill>
             </a:ln>
             <a:extLst>
               <a:ext uri="{53640926-AAD7-44D8-BBD7-CCE9431645EC}">
-                <a14:shadowObscured xmlns:a14="http://schemas.microsoft.com/office/drawing/2010/main"/>
+                <a14:shadowObscured xmlns:a14="http://schemas.microsoft.com/office/drawing/2010/main" xmlns=""/>
               </a:ext>
             </a:extLst>
           </p:spPr>
@@ -2050,7 +2001,7 @@
             <a:blip r:embed="rId9" cstate="print">
               <a:extLst>
                 <a:ext uri="{28A0092B-C50C-407E-A947-70E740481C1C}">
-                  <a14:useLocalDpi xmlns:a14="http://schemas.microsoft.com/office/drawing/2010/main" val="0"/>
+                  <a14:useLocalDpi xmlns:a14="http://schemas.microsoft.com/office/drawing/2010/main" xmlns="" val="0"/>
                 </a:ext>
               </a:extLst>
             </a:blip>
@@ -2066,6 +2017,11 @@
             <a:prstGeom prst="rect">
               <a:avLst/>
             </a:prstGeom>
+            <a:ln>
+              <a:solidFill>
+                <a:srgbClr val="000000"/>
+              </a:solidFill>
+            </a:ln>
           </p:spPr>
         </p:pic>
         <p:pic>
@@ -2080,7 +2036,7 @@
             <a:blip r:embed="rId10" cstate="print">
               <a:extLst>
                 <a:ext uri="{BEBA8EAE-BF5A-486C-A8C5-ECC9F3942E4B}">
-                  <a14:imgProps xmlns:a14="http://schemas.microsoft.com/office/drawing/2010/main">
+                  <a14:imgProps xmlns:a14="http://schemas.microsoft.com/office/drawing/2010/main" xmlns="">
                     <a14:imgLayer r:embed="rId11">
                       <a14:imgEffect>
                         <a14:artisticPlasticWrap/>
@@ -2089,7 +2045,7 @@
                   </a14:imgProps>
                 </a:ext>
                 <a:ext uri="{28A0092B-C50C-407E-A947-70E740481C1C}">
-                  <a14:useLocalDpi xmlns:a14="http://schemas.microsoft.com/office/drawing/2010/main" val="0"/>
+                  <a14:useLocalDpi xmlns:a14="http://schemas.microsoft.com/office/drawing/2010/main" xmlns="" val="0"/>
                 </a:ext>
               </a:extLst>
             </a:blip>
@@ -2108,7 +2064,9 @@
             </a:prstGeom>
             <a:noFill/>
             <a:ln>
-              <a:noFill/>
+              <a:solidFill>
+                <a:srgbClr val="000000"/>
+              </a:solidFill>
             </a:ln>
           </p:spPr>
         </p:pic>
@@ -2124,7 +2082,7 @@
             <a:blip r:embed="rId12" cstate="print">
               <a:extLst>
                 <a:ext uri="{BEBA8EAE-BF5A-486C-A8C5-ECC9F3942E4B}">
-                  <a14:imgProps xmlns:a14="http://schemas.microsoft.com/office/drawing/2010/main">
+                  <a14:imgProps xmlns:a14="http://schemas.microsoft.com/office/drawing/2010/main" xmlns="">
                     <a14:imgLayer r:embed="rId13">
                       <a14:imgEffect>
                         <a14:artisticPlasticWrap/>
@@ -2133,7 +2091,7 @@
                   </a14:imgProps>
                 </a:ext>
                 <a:ext uri="{28A0092B-C50C-407E-A947-70E740481C1C}">
-                  <a14:useLocalDpi xmlns:a14="http://schemas.microsoft.com/office/drawing/2010/main" val="0"/>
+                  <a14:useLocalDpi xmlns:a14="http://schemas.microsoft.com/office/drawing/2010/main" xmlns="" val="0"/>
                 </a:ext>
               </a:extLst>
             </a:blip>
@@ -2149,6 +2107,11 @@
             <a:prstGeom prst="rect">
               <a:avLst/>
             </a:prstGeom>
+            <a:ln>
+              <a:solidFill>
+                <a:srgbClr val="000000"/>
+              </a:solidFill>
+            </a:ln>
           </p:spPr>
         </p:pic>
         <p:pic>
@@ -2160,10 +2123,10 @@
             <p:nvPr/>
           </p:nvPicPr>
           <p:blipFill>
-            <a:blip r:embed="rId14">
+            <a:blip r:embed="rId14" cstate="print">
               <a:extLst>
                 <a:ext uri="{28A0092B-C50C-407E-A947-70E740481C1C}">
-                  <a14:useLocalDpi xmlns:a14="http://schemas.microsoft.com/office/drawing/2010/main" val="0"/>
+                  <a14:useLocalDpi xmlns:a14="http://schemas.microsoft.com/office/drawing/2010/main" xmlns="" val="0"/>
                 </a:ext>
               </a:extLst>
             </a:blip>
@@ -2179,6 +2142,11 @@
             <a:prstGeom prst="rect">
               <a:avLst/>
             </a:prstGeom>
+            <a:ln>
+              <a:solidFill>
+                <a:srgbClr val="000000"/>
+              </a:solidFill>
+            </a:ln>
           </p:spPr>
         </p:pic>
         <p:pic>
@@ -2203,7 +2171,7 @@
               </a:clrChange>
               <a:extLst>
                 <a:ext uri="{BEBA8EAE-BF5A-486C-A8C5-ECC9F3942E4B}">
-                  <a14:imgProps xmlns:a14="http://schemas.microsoft.com/office/drawing/2010/main">
+                  <a14:imgProps xmlns:a14="http://schemas.microsoft.com/office/drawing/2010/main" xmlns="">
                     <a14:imgLayer r:embed="rId16">
                       <a14:imgEffect>
                         <a14:saturation sat="0"/>
@@ -2212,7 +2180,7 @@
                   </a14:imgProps>
                 </a:ext>
                 <a:ext uri="{28A0092B-C50C-407E-A947-70E740481C1C}">
-                  <a14:useLocalDpi xmlns:a14="http://schemas.microsoft.com/office/drawing/2010/main" val="0"/>
+                  <a14:useLocalDpi xmlns:a14="http://schemas.microsoft.com/office/drawing/2010/main" xmlns="" val="0"/>
                 </a:ext>
               </a:extLst>
             </a:blip>
@@ -2229,11 +2197,13 @@
             </a:prstGeom>
             <a:noFill/>
             <a:ln>
-              <a:noFill/>
+              <a:solidFill>
+                <a:srgbClr val="000000"/>
+              </a:solidFill>
             </a:ln>
             <a:extLst>
               <a:ext uri="{53640926-AAD7-44D8-BBD7-CCE9431645EC}">
-                <a14:shadowObscured xmlns:a14="http://schemas.microsoft.com/office/drawing/2010/main"/>
+                <a14:shadowObscured xmlns:a14="http://schemas.microsoft.com/office/drawing/2010/main" xmlns=""/>
               </a:ext>
             </a:extLst>
           </p:spPr>
@@ -2250,7 +2220,7 @@
             <a:blip r:embed="rId17" cstate="print">
               <a:extLst>
                 <a:ext uri="{28A0092B-C50C-407E-A947-70E740481C1C}">
-                  <a14:useLocalDpi xmlns:a14="http://schemas.microsoft.com/office/drawing/2010/main" val="0"/>
+                  <a14:useLocalDpi xmlns:a14="http://schemas.microsoft.com/office/drawing/2010/main" xmlns="" val="0"/>
                 </a:ext>
               </a:extLst>
             </a:blip>
@@ -2267,11 +2237,13 @@
             </a:prstGeom>
             <a:noFill/>
             <a:ln>
-              <a:noFill/>
+              <a:solidFill>
+                <a:srgbClr val="000000"/>
+              </a:solidFill>
             </a:ln>
             <a:extLst>
               <a:ext uri="{53640926-AAD7-44D8-BBD7-CCE9431645EC}">
-                <a14:shadowObscured xmlns:a14="http://schemas.microsoft.com/office/drawing/2010/main"/>
+                <a14:shadowObscured xmlns:a14="http://schemas.microsoft.com/office/drawing/2010/main" xmlns=""/>
               </a:ext>
             </a:extLst>
           </p:spPr>
@@ -2288,7 +2260,7 @@
             <a:blip r:embed="rId18" cstate="print">
               <a:extLst>
                 <a:ext uri="{28A0092B-C50C-407E-A947-70E740481C1C}">
-                  <a14:useLocalDpi xmlns:a14="http://schemas.microsoft.com/office/drawing/2010/main" val="0"/>
+                  <a14:useLocalDpi xmlns:a14="http://schemas.microsoft.com/office/drawing/2010/main" xmlns="" val="0"/>
                 </a:ext>
               </a:extLst>
             </a:blip>
@@ -2307,7 +2279,9 @@
             </a:prstGeom>
             <a:noFill/>
             <a:ln>
-              <a:noFill/>
+              <a:solidFill>
+                <a:srgbClr val="000000"/>
+              </a:solidFill>
             </a:ln>
           </p:spPr>
         </p:pic>
@@ -2327,6 +2301,9 @@
             </a:prstGeom>
             <a:noFill/>
             <a:ln>
+              <a:solidFill>
+                <a:srgbClr val="000000"/>
+              </a:solidFill>
               <a:prstDash val="dash"/>
             </a:ln>
           </p:spPr>
@@ -2375,6 +2352,9 @@
             </a:prstGeom>
             <a:noFill/>
             <a:ln>
+              <a:solidFill>
+                <a:srgbClr val="000000"/>
+              </a:solidFill>
               <a:prstDash val="dash"/>
             </a:ln>
           </p:spPr>
@@ -2421,6 +2401,11 @@
             <a:prstGeom prst="upArrow">
               <a:avLst/>
             </a:prstGeom>
+            <a:ln>
+              <a:solidFill>
+                <a:srgbClr val="000000"/>
+              </a:solidFill>
+            </a:ln>
           </p:spPr>
           <p:style>
             <a:lnRef idx="2">
@@ -2461,6 +2446,11 @@
             <a:prstGeom prst="upArrow">
               <a:avLst/>
             </a:prstGeom>
+            <a:ln>
+              <a:solidFill>
+                <a:srgbClr val="000000"/>
+              </a:solidFill>
+            </a:ln>
           </p:spPr>
           <p:style>
             <a:lnRef idx="2">
@@ -2863,15 +2853,7 @@
             <a:pPr algn="just"/>
             <a:r>
               <a:rPr lang="de-DE" sz="3000" dirty="0" smtClean="0"/>
-              <a:t>Aus </a:t>
-            </a:r>
-            <a:r>
-              <a:rPr lang="de-DE" sz="3000" dirty="0" smtClean="0"/>
-              <a:t>Sicherheitsgründen </a:t>
-            </a:r>
-            <a:r>
-              <a:rPr lang="de-DE" sz="3000" dirty="0" smtClean="0"/>
-              <a:t>kann die Steuerung der Drohne jederzeit von der zentralen Steuereinheit übernommen und alle Peripheriegeräte separat aktiviert bzw. deaktiviert werden.</a:t>
+              <a:t>Aus Sicherheitsgründen kann die Steuerung der Drohne jederzeit von der zentralen Steuereinheit übernommen und alle Peripheriegeräte separat aktiviert bzw. deaktiviert werden.</a:t>
             </a:r>
             <a:endParaRPr lang="de-DE" sz="3000" dirty="0"/>
           </a:p>
@@ -2886,10 +2868,10 @@
           <p:nvPr/>
         </p:nvPicPr>
         <p:blipFill>
-          <a:blip r:embed="rId19">
+          <a:blip r:embed="rId19" cstate="print">
             <a:extLst>
               <a:ext uri="{BEBA8EAE-BF5A-486C-A8C5-ECC9F3942E4B}">
-                <a14:imgProps xmlns:a14="http://schemas.microsoft.com/office/drawing/2010/main">
+                <a14:imgProps xmlns:a14="http://schemas.microsoft.com/office/drawing/2010/main" xmlns="">
                   <a14:imgLayer r:embed="rId20">
                     <a14:imgEffect>
                       <a14:artisticPlasticWrap/>
@@ -2898,7 +2880,7 @@
                 </a14:imgProps>
               </a:ext>
               <a:ext uri="{28A0092B-C50C-407E-A947-70E740481C1C}">
-                <a14:useLocalDpi xmlns:a14="http://schemas.microsoft.com/office/drawing/2010/main" val="0"/>
+                <a14:useLocalDpi xmlns:a14="http://schemas.microsoft.com/office/drawing/2010/main" xmlns="" val="0"/>
               </a:ext>
             </a:extLst>
           </a:blip>
@@ -2922,14 +2904,14 @@
           <a:effectLst/>
           <a:extLst>
             <a:ext uri="{909E8E84-426E-40DD-AFC4-6F175D3DCCD1}">
-              <a14:hiddenFill xmlns:a14="http://schemas.microsoft.com/office/drawing/2010/main">
+              <a14:hiddenFill xmlns:a14="http://schemas.microsoft.com/office/drawing/2010/main" xmlns="">
                 <a:solidFill>
                   <a:schemeClr val="accent1"/>
                 </a:solidFill>
               </a14:hiddenFill>
             </a:ext>
             <a:ext uri="{91240B29-F687-4F45-9708-019B960494DF}">
-              <a14:hiddenLine xmlns:a14="http://schemas.microsoft.com/office/drawing/2010/main" w="9525">
+              <a14:hiddenLine xmlns:a14="http://schemas.microsoft.com/office/drawing/2010/main" xmlns="" w="9525">
                 <a:solidFill>
                   <a:schemeClr val="tx1"/>
                 </a:solidFill>
@@ -2939,7 +2921,7 @@
               </a14:hiddenLine>
             </a:ext>
             <a:ext uri="{AF507438-7753-43E0-B8FC-AC1667EBCBE1}">
-              <a14:hiddenEffects xmlns:a14="http://schemas.microsoft.com/office/drawing/2010/main">
+              <a14:hiddenEffects xmlns:a14="http://schemas.microsoft.com/office/drawing/2010/main" xmlns="">
                 <a:effectLst>
                   <a:outerShdw dist="35921" dir="2700000" algn="ctr" rotWithShape="0">
                     <a:schemeClr val="bg2"/>
@@ -2959,10 +2941,10 @@
           <p:nvPr/>
         </p:nvPicPr>
         <p:blipFill>
-          <a:blip r:embed="rId21">
+          <a:blip r:embed="rId21" cstate="print">
             <a:extLst>
               <a:ext uri="{28A0092B-C50C-407E-A947-70E740481C1C}">
-                <a14:useLocalDpi xmlns:a14="http://schemas.microsoft.com/office/drawing/2010/main" val="0"/>
+                <a14:useLocalDpi xmlns:a14="http://schemas.microsoft.com/office/drawing/2010/main" xmlns="" val="0"/>
               </a:ext>
             </a:extLst>
           </a:blip>
@@ -2986,14 +2968,14 @@
           <a:effectLst/>
           <a:extLst>
             <a:ext uri="{909E8E84-426E-40DD-AFC4-6F175D3DCCD1}">
-              <a14:hiddenFill xmlns:a14="http://schemas.microsoft.com/office/drawing/2010/main">
+              <a14:hiddenFill xmlns:a14="http://schemas.microsoft.com/office/drawing/2010/main" xmlns="">
                 <a:solidFill>
                   <a:schemeClr val="accent1"/>
                 </a:solidFill>
               </a14:hiddenFill>
             </a:ext>
             <a:ext uri="{91240B29-F687-4F45-9708-019B960494DF}">
-              <a14:hiddenLine xmlns:a14="http://schemas.microsoft.com/office/drawing/2010/main" w="9525">
+              <a14:hiddenLine xmlns:a14="http://schemas.microsoft.com/office/drawing/2010/main" xmlns="" w="9525">
                 <a:solidFill>
                   <a:schemeClr val="tx1"/>
                 </a:solidFill>
@@ -3003,7 +2985,7 @@
               </a14:hiddenLine>
             </a:ext>
             <a:ext uri="{AF507438-7753-43E0-B8FC-AC1667EBCBE1}">
-              <a14:hiddenEffects xmlns:a14="http://schemas.microsoft.com/office/drawing/2010/main">
+              <a14:hiddenEffects xmlns:a14="http://schemas.microsoft.com/office/drawing/2010/main" xmlns="">
                 <a:effectLst>
                   <a:outerShdw dist="35921" dir="2700000" algn="ctr" rotWithShape="0">
                     <a:schemeClr val="bg2"/>
@@ -3017,7 +2999,7 @@
     </p:spTree>
     <p:extLst>
       <p:ext uri="{BB962C8B-B14F-4D97-AF65-F5344CB8AC3E}">
-        <p14:creationId xmlns:p14="http://schemas.microsoft.com/office/powerpoint/2010/main" val="4058847616"/>
+        <p14:creationId xmlns:p14="http://schemas.microsoft.com/office/powerpoint/2010/main" xmlns="" val="4058847616"/>
       </p:ext>
     </p:extLst>
   </p:cSld>

</xml_diff>

<commit_message>
Neuer Titel, Umstrukturierung, Neue Aussicht
Bitte gegenlesen. Vor allem der Titel und die neue Aussicht benötigen unter Umständen eine Umformulierung
</commit_message>
<xml_diff>
--- a/doc/Poster.pptx
+++ b/doc/Poster.pptx
@@ -371,7 +371,7 @@
     </p:spTree>
     <p:extLst>
       <p:ext uri="{BB962C8B-B14F-4D97-AF65-F5344CB8AC3E}">
-        <p14:creationId xmlns="" xmlns:p14="http://schemas.microsoft.com/office/powerpoint/2010/main" val="2271319829"/>
+        <p14:creationId xmlns:p14="http://schemas.microsoft.com/office/powerpoint/2010/main" val="2271319829"/>
       </p:ext>
     </p:extLst>
   </p:cSld>
@@ -413,7 +413,7 @@
     </p:spTree>
     <p:extLst>
       <p:ext uri="{BB962C8B-B14F-4D97-AF65-F5344CB8AC3E}">
-        <p14:creationId xmlns="" xmlns:p14="http://schemas.microsoft.com/office/powerpoint/2010/main" val="185692037"/>
+        <p14:creationId xmlns:p14="http://schemas.microsoft.com/office/powerpoint/2010/main" val="185692037"/>
       </p:ext>
     </p:extLst>
   </p:cSld>
@@ -719,7 +719,7 @@
               </a:lnSpc>
             </a:pPr>
             <a:r>
-              <a:rPr lang="de-DE" sz="7200" dirty="0" smtClean="0">
+              <a:rPr lang="de-DE" sz="7000" dirty="0" smtClean="0">
                 <a:solidFill>
                   <a:schemeClr val="accent5"/>
                 </a:solidFill>
@@ -727,12 +727,44 @@
               <a:t>GAME OF DRONES</a:t>
             </a:r>
             <a:r>
-              <a:rPr lang="de-DE" sz="7200" b="1" dirty="0" smtClean="0">
+              <a:rPr lang="de-DE" sz="7000" b="1" dirty="0" smtClean="0">
                 <a:solidFill>
                   <a:schemeClr val="accent5"/>
                 </a:solidFill>
               </a:rPr>
-              <a:t> – Steuerung einer Bebop 2 Drohne mit verschiedenen Eingabegeräten</a:t>
+              <a:t> – Erstellung eines Multiple-Input </a:t>
+            </a:r>
+            <a:r>
+              <a:rPr lang="de-DE" sz="7000" b="1" dirty="0" err="1" smtClean="0">
+                <a:solidFill>
+                  <a:schemeClr val="accent5"/>
+                </a:solidFill>
+              </a:rPr>
+              <a:t>Drone</a:t>
+            </a:r>
+            <a:r>
+              <a:rPr lang="de-DE" sz="7000" b="1" dirty="0" smtClean="0">
+                <a:solidFill>
+                  <a:schemeClr val="accent5"/>
+                </a:solidFill>
+              </a:rPr>
+              <a:t> </a:t>
+            </a:r>
+            <a:r>
+              <a:rPr lang="de-DE" sz="7000" b="1" dirty="0" smtClean="0">
+                <a:solidFill>
+                  <a:schemeClr val="accent5"/>
+                </a:solidFill>
+              </a:rPr>
+              <a:t>Racing </a:t>
+            </a:r>
+            <a:r>
+              <a:rPr lang="de-DE" sz="7000" b="1" dirty="0" smtClean="0">
+                <a:solidFill>
+                  <a:schemeClr val="accent5"/>
+                </a:solidFill>
+              </a:rPr>
+              <a:t>Games</a:t>
             </a:r>
           </a:p>
           <a:p>
@@ -840,7 +872,7 @@
         </p:nvSpPr>
         <p:spPr>
           <a:xfrm>
-            <a:off x="1630000" y="14079031"/>
+            <a:off x="1630000" y="13987438"/>
             <a:ext cx="12529392" cy="923330"/>
           </a:xfrm>
           <a:prstGeom prst="rect">
@@ -862,8 +894,15 @@
                 <a:latin typeface="+mj-lt"/>
                 <a:cs typeface="Times New Roman" pitchFamily="18" charset="0"/>
               </a:rPr>
-              <a:t>Umsetzung</a:t>
-            </a:r>
+              <a:t>Die Applikation</a:t>
+            </a:r>
+            <a:endParaRPr lang="de-DE" sz="5400" dirty="0" smtClean="0">
+              <a:solidFill>
+                <a:schemeClr val="accent5"/>
+              </a:solidFill>
+              <a:latin typeface="+mj-lt"/>
+              <a:cs typeface="Times New Roman" pitchFamily="18" charset="0"/>
+            </a:endParaRPr>
           </a:p>
         </p:txBody>
       </p:sp>
@@ -875,8 +914,8 @@
         </p:nvSpPr>
         <p:spPr>
           <a:xfrm>
-            <a:off x="1630000" y="15217407"/>
-            <a:ext cx="12529392" cy="7735451"/>
+            <a:off x="1674493" y="25292694"/>
+            <a:ext cx="12529392" cy="2494594"/>
           </a:xfrm>
           <a:prstGeom prst="rect">
             <a:avLst/>
@@ -895,52 +934,12 @@
               </a:lnSpc>
             </a:pPr>
             <a:r>
-              <a:rPr lang="de-DE" sz="3000" b="1" dirty="0" smtClean="0">
-                <a:solidFill>
-                  <a:srgbClr val="262626"/>
-                </a:solidFill>
-              </a:rPr>
-              <a:t>Verwendete Technologie und Framework</a:t>
-            </a:r>
-            <a:endParaRPr lang="en-US" sz="3000" b="1" dirty="0" smtClean="0">
-              <a:solidFill>
-                <a:srgbClr val="262626"/>
-              </a:solidFill>
-            </a:endParaRPr>
-          </a:p>
-          <a:p>
-            <a:pPr algn="just">
-              <a:lnSpc>
-                <a:spcPts val="3800"/>
-              </a:lnSpc>
-            </a:pPr>
-            <a:endParaRPr lang="de-DE" sz="3000" dirty="0" smtClean="0">
-              <a:solidFill>
-                <a:srgbClr val="262626"/>
-              </a:solidFill>
-            </a:endParaRPr>
-          </a:p>
-          <a:p>
-            <a:pPr algn="just">
-              <a:lnSpc>
-                <a:spcPts val="3800"/>
-              </a:lnSpc>
-            </a:pPr>
-            <a:r>
               <a:rPr lang="de-DE" sz="3000" dirty="0" smtClean="0">
                 <a:solidFill>
                   <a:srgbClr val="262626"/>
                 </a:solidFill>
               </a:rPr>
-              <a:t>Als Eingabegeräte kommen zur Zeit Tastatur, Xbox Controller, Logitech </a:t>
-            </a:r>
-            <a:r>
-              <a:rPr lang="de-DE" sz="3000" dirty="0" err="1" smtClean="0">
-                <a:solidFill>
-                  <a:srgbClr val="262626"/>
-                </a:solidFill>
-              </a:rPr>
-              <a:t>Attack</a:t>
+              <a:t>Fast </a:t>
             </a:r>
             <a:r>
               <a:rPr lang="de-DE" sz="3000" dirty="0" smtClean="0">
@@ -948,15 +947,7 @@
                   <a:srgbClr val="262626"/>
                 </a:solidFill>
               </a:rPr>
-              <a:t> Joystick und das Wii Balance Board von Nintendo zum Einsatz. Fast alle Eingabegeräte werden per USB Kabel mit einer zentralen Steuereinheit (Laptop) verbunden. Die einzige Ausnahme bildet das </a:t>
-            </a:r>
-            <a:r>
-              <a:rPr lang="de-DE" sz="3000" dirty="0" err="1" smtClean="0">
-                <a:solidFill>
-                  <a:srgbClr val="262626"/>
-                </a:solidFill>
-              </a:rPr>
-              <a:t>Wii</a:t>
+              <a:t>alle Eingabegeräte werden per USB Kabel mit einer zentralen Steuereinheit </a:t>
             </a:r>
             <a:r>
               <a:rPr lang="de-DE" sz="3000" dirty="0" smtClean="0">
@@ -964,7 +955,15 @@
                   <a:srgbClr val="262626"/>
                 </a:solidFill>
               </a:rPr>
-              <a:t> Balance Board, welches per Bluetooth verbunden wird.  </a:t>
+              <a:t>(Tower) </a:t>
+            </a:r>
+            <a:r>
+              <a:rPr lang="de-DE" sz="3000" dirty="0" smtClean="0">
+                <a:solidFill>
+                  <a:srgbClr val="262626"/>
+                </a:solidFill>
+              </a:rPr>
+              <a:t>verbunden. Die einzige Ausnahme bildet das Wii Balance Board, welches per Bluetooth verbunden wird. </a:t>
             </a:r>
             <a:r>
               <a:rPr lang="de-DE" sz="3000" dirty="0" smtClean="0"/>
@@ -984,67 +983,17 @@
             </a:r>
             <a:r>
               <a:rPr lang="de-DE" sz="3000" dirty="0" smtClean="0"/>
-              <a:t>WLAN-Schnittstelle, welche vom verwendeten Framework angesprochen wird.</a:t>
-            </a:r>
-          </a:p>
-          <a:p>
-            <a:pPr algn="just">
-              <a:lnSpc>
-                <a:spcPts val="3800"/>
-              </a:lnSpc>
-            </a:pPr>
-            <a:endParaRPr lang="de-DE" sz="3000" dirty="0">
-              <a:solidFill>
-                <a:srgbClr val="262626"/>
-              </a:solidFill>
-            </a:endParaRPr>
-          </a:p>
-          <a:p>
-            <a:pPr algn="just"/>
-            <a:r>
-              <a:rPr lang="de-DE" sz="3000" dirty="0" smtClean="0"/>
-              <a:t>Zielplattform </a:t>
-            </a:r>
-            <a:r>
-              <a:rPr lang="de-DE" sz="3000" dirty="0"/>
-              <a:t>des Projekts ist eine der verbreiteten </a:t>
-            </a:r>
-            <a:r>
-              <a:rPr lang="de-DE" sz="3000" dirty="0" err="1"/>
-              <a:t>Linuxdistributionen</a:t>
-            </a:r>
-            <a:r>
-              <a:rPr lang="de-DE" sz="3000" dirty="0"/>
-              <a:t> (z.B. Debian oder Ubuntu) auf einem </a:t>
-            </a:r>
-            <a:r>
-              <a:rPr lang="de-DE" sz="3000" dirty="0" smtClean="0"/>
-              <a:t>Laptop, </a:t>
-            </a:r>
-            <a:r>
-              <a:rPr lang="de-DE" sz="3000" dirty="0"/>
-              <a:t>da </a:t>
-            </a:r>
-            <a:r>
-              <a:rPr lang="de-DE" sz="3000" dirty="0" smtClean="0"/>
-              <a:t>hier alle </a:t>
-            </a:r>
-            <a:r>
-              <a:rPr lang="de-DE" sz="3000" dirty="0"/>
-              <a:t>benötigten Komponenten problemlos anzubinden sind. </a:t>
-            </a:r>
-            <a:r>
-              <a:rPr lang="de-DE" sz="3000" dirty="0" smtClean="0"/>
-              <a:t>Die Hauptkomponenten funktionieren auch unter Windows und MacOS, wobei das Balance Board unter Windows nur mit einem passenden JSR082 Bluetooth Stack (z.B. </a:t>
-            </a:r>
-            <a:r>
-              <a:rPr lang="de-DE" sz="3000" dirty="0" err="1" smtClean="0"/>
-              <a:t>Widcomm</a:t>
-            </a:r>
-            <a:r>
-              <a:rPr lang="de-DE" sz="3000" dirty="0" smtClean="0"/>
-              <a:t>) anzubinden ist.</a:t>
-            </a:r>
+              <a:t>WLAN-Schnittstelle,, die vom </a:t>
+            </a:r>
+            <a:r>
+              <a:rPr lang="de-DE" sz="3000" dirty="0" smtClean="0"/>
+              <a:t>verwendeten Framework angesprochen wird</a:t>
+            </a:r>
+            <a:r>
+              <a:rPr lang="de-DE" sz="3000" dirty="0" smtClean="0"/>
+              <a:t>.</a:t>
+            </a:r>
+            <a:endParaRPr lang="de-DE" sz="3000" dirty="0" smtClean="0"/>
           </a:p>
         </p:txBody>
       </p:sp>
@@ -1163,11 +1112,39 @@
             <a:pPr algn="just"/>
             <a:r>
               <a:rPr lang="de-DE" sz="3000" dirty="0" smtClean="0"/>
-              <a:t>Um </a:t>
+              <a:t>Die in diesem Projekt erstellte </a:t>
             </a:r>
             <a:r>
               <a:rPr lang="de-DE" sz="3000" dirty="0"/>
-              <a:t>Alternativen zur Steuerung der Drohne per Touchscreen zu bieten, wurden mit Hilfe von </a:t>
+              <a:t>Anwendung </a:t>
+            </a:r>
+            <a:r>
+              <a:rPr lang="de-DE" sz="3000" dirty="0" smtClean="0"/>
+              <a:t>ist </a:t>
+            </a:r>
+            <a:r>
+              <a:rPr lang="de-DE" sz="3000" dirty="0"/>
+              <a:t>als Spiel mit einem freien Flugmodus und einen kompetitiven Rennmodus </a:t>
+            </a:r>
+            <a:r>
+              <a:rPr lang="de-DE" sz="3000" dirty="0" smtClean="0"/>
+              <a:t>konzipiert. Da </a:t>
+            </a:r>
+            <a:r>
+              <a:rPr lang="de-DE" sz="3000" dirty="0" err="1" smtClean="0"/>
+              <a:t>Touchoberflächen</a:t>
+            </a:r>
+            <a:r>
+              <a:rPr lang="de-DE" sz="3000" dirty="0" smtClean="0"/>
+              <a:t> im Bereich der Spiele nur wenig verbreitet sind,</a:t>
+            </a:r>
+            <a:r>
+              <a:rPr lang="de-DE" sz="3000" dirty="0" smtClean="0"/>
+              <a:t> </a:t>
+            </a:r>
+            <a:r>
+              <a:rPr lang="de-DE" sz="3000" dirty="0"/>
+              <a:t>wurden mit Hilfe von </a:t>
             </a:r>
             <a:r>
               <a:rPr lang="de-DE" sz="3000" dirty="0" err="1"/>
@@ -1175,19 +1152,11 @@
             </a:r>
             <a:r>
               <a:rPr lang="de-DE" sz="3000" dirty="0"/>
-              <a:t> mehrere Eingabegeräte angebunden. Die Anwendung ist als Spiel mit einem freien Flugmodus und einen </a:t>
-            </a:r>
-            <a:r>
-              <a:rPr lang="de-DE" sz="3000" dirty="0" smtClean="0"/>
-              <a:t>kompetitiven </a:t>
-            </a:r>
-            <a:r>
-              <a:rPr lang="de-DE" sz="3000" dirty="0"/>
-              <a:t>Rennmodus konzipiert. Während des Flugs können sowohl Bilder als auch Videos aufgenommen werden</a:t>
-            </a:r>
-            <a:r>
-              <a:rPr lang="de-DE" sz="3000" dirty="0" smtClean="0"/>
-              <a:t>.</a:t>
+              <a:t> </a:t>
+            </a:r>
+            <a:r>
+              <a:rPr lang="de-DE" sz="3000" dirty="0" smtClean="0"/>
+              <a:t>mehrere typische Eingabegeräte aus dem Spieleumfeld angebunden. </a:t>
             </a:r>
             <a:endParaRPr lang="de-DE" sz="3000" dirty="0"/>
           </a:p>
@@ -1240,7 +1209,7 @@
           <a:blip r:embed="rId2" cstate="print">
             <a:extLst>
               <a:ext uri="{28A0092B-C50C-407E-A947-70E740481C1C}">
-                <a14:useLocalDpi xmlns="" xmlns:a14="http://schemas.microsoft.com/office/drawing/2010/main" val="0"/>
+                <a14:useLocalDpi xmlns:a14="http://schemas.microsoft.com/office/drawing/2010/main" val="0"/>
               </a:ext>
             </a:extLst>
           </a:blip>
@@ -1258,7 +1227,7 @@
           <a:noFill/>
           <a:extLst>
             <a:ext uri="{909E8E84-426E-40DD-AFC4-6F175D3DCCD1}">
-              <a14:hiddenFill xmlns="" xmlns:a14="http://schemas.microsoft.com/office/drawing/2010/main">
+              <a14:hiddenFill xmlns:a14="http://schemas.microsoft.com/office/drawing/2010/main">
                 <a:solidFill>
                   <a:srgbClr val="FFFFFF"/>
                 </a:solidFill>
@@ -1275,7 +1244,7 @@
         </p:nvSpPr>
         <p:spPr>
           <a:xfrm>
-            <a:off x="15758295" y="27308040"/>
+            <a:off x="15735971" y="27711349"/>
             <a:ext cx="5883556" cy="923330"/>
           </a:xfrm>
           <a:prstGeom prst="rect">
@@ -1310,7 +1279,7 @@
         </p:nvSpPr>
         <p:spPr>
           <a:xfrm>
-            <a:off x="15758295" y="28386425"/>
+            <a:off x="15758296" y="28789946"/>
             <a:ext cx="12529393" cy="6872990"/>
           </a:xfrm>
           <a:prstGeom prst="rect">
@@ -1326,89 +1295,26 @@
           <a:p>
             <a:pPr algn="just"/>
             <a:r>
-              <a:rPr lang="de-DE" sz="3000" dirty="0"/>
-              <a:t>Unter Windows </a:t>
-            </a:r>
-            <a:r>
-              <a:rPr lang="de-DE" sz="3000" dirty="0" smtClean="0"/>
-              <a:t>ist bislang </a:t>
-            </a:r>
-            <a:r>
-              <a:rPr lang="de-DE" sz="3000" dirty="0"/>
-              <a:t>die Anbindung des Wii Balance </a:t>
-            </a:r>
-            <a:r>
-              <a:rPr lang="de-DE" sz="3000" dirty="0" smtClean="0"/>
-              <a:t>Boards </a:t>
-            </a:r>
-            <a:r>
-              <a:rPr lang="de-DE" sz="3000" dirty="0"/>
-              <a:t>nicht möglich, da diese über die </a:t>
-            </a:r>
-            <a:r>
-              <a:rPr lang="de-DE" sz="3000" dirty="0" smtClean="0"/>
-              <a:t>Bibliothek </a:t>
-            </a:r>
-            <a:r>
-              <a:rPr lang="de-DE" sz="3000" dirty="0" err="1" smtClean="0"/>
-              <a:t>WiiRemoteJ</a:t>
-            </a:r>
-            <a:r>
-              <a:rPr lang="de-DE" sz="3000" dirty="0" smtClean="0"/>
-              <a:t> stattfindet. </a:t>
-            </a:r>
-            <a:r>
-              <a:rPr lang="de-DE" sz="3000" dirty="0" err="1" smtClean="0"/>
-              <a:t>WiiRemoteJ</a:t>
-            </a:r>
-            <a:r>
-              <a:rPr lang="de-DE" sz="3000" dirty="0" smtClean="0"/>
-              <a:t> setzt </a:t>
-            </a:r>
-            <a:r>
-              <a:rPr lang="de-DE" sz="3000" dirty="0"/>
-              <a:t>unter Windows einen bestimmten Bluetooth Stack und einen geeigneten Bluetooth </a:t>
-            </a:r>
-            <a:r>
-              <a:rPr lang="de-DE" sz="3000" dirty="0" err="1"/>
-              <a:t>Dongle</a:t>
-            </a:r>
-            <a:r>
-              <a:rPr lang="de-DE" sz="3000" dirty="0"/>
-              <a:t> </a:t>
-            </a:r>
-            <a:r>
-              <a:rPr lang="de-DE" sz="3000" dirty="0" smtClean="0"/>
-              <a:t>voraus. Dieser Fall wurde in der vorliegenden Applikation nicht berücksichtigt, da Linux dies direkt unterstützt.</a:t>
-            </a:r>
+              <a:rPr lang="de-DE" sz="3000" dirty="0" smtClean="0"/>
+              <a:t>In einem ersten Schritt wurde mit der Anbindung mehrerer Eingabegeräte zur Steuerung der Drohne eine Basis für weitere Untersuchungen geschaffen. Im nächsten Schritt kann nun evaluiert werden, welches der Eingabegeräte sich als besonders effektiv zur Steuerung der Drohne herausstellt. </a:t>
+            </a:r>
+            <a:r>
+              <a:rPr lang="de-DE" sz="3000" dirty="0" smtClean="0"/>
+              <a:t>Die Konzipierung des Projekts als kompetitives Rennspiel fördert dies, da zu erwarten steht, dass ein Benutzer eine möglichst genaue Steuerung  anstrebt.</a:t>
+            </a:r>
+            <a:endParaRPr lang="de-DE" sz="3000" dirty="0" smtClean="0"/>
           </a:p>
           <a:p>
             <a:pPr algn="just"/>
-            <a:endParaRPr lang="de-DE" sz="3000" dirty="0">
-              <a:solidFill>
-                <a:srgbClr val="FF0000"/>
-              </a:solidFill>
-            </a:endParaRPr>
+            <a:endParaRPr lang="de-DE" sz="3000" dirty="0" smtClean="0"/>
           </a:p>
           <a:p>
             <a:pPr algn="just"/>
             <a:r>
               <a:rPr lang="de-DE" sz="3000" dirty="0" smtClean="0"/>
-              <a:t>Die Applikation ist in der aktuellen Version auf die Verwendung des Xbox Controllers und des </a:t>
-            </a:r>
-            <a:r>
-              <a:rPr lang="de-DE" sz="3000" dirty="0" err="1" smtClean="0"/>
-              <a:t>Attack</a:t>
-            </a:r>
-            <a:r>
-              <a:rPr lang="de-DE" sz="3000" dirty="0" smtClean="0"/>
-              <a:t> Joysticks von Logitech angepasst, obwohl das genutzte Modul die Einbindung beliebiger Controller gestattet. Dies liegt darin begründet, dass jeder Controller ein eigenes Button Layout benutzt. Bei einer Weiterentwicklung wäre eine Zuweisung der Tasten auf die korrespondierenden Aktionen der Drohne per Konfigurationsdateien denkbar.</a:t>
-            </a:r>
-            <a:endParaRPr lang="de-DE" sz="3000" dirty="0">
-              <a:solidFill>
-                <a:srgbClr val="FF0000"/>
-              </a:solidFill>
-            </a:endParaRPr>
+              <a:t>Denkbar wäre darüber hinaus eine Untersuchung der Unterschiede zwischen verschiedenen Benutzergruppen. Von besonderem Interesse sind vor allem die Auswirkung von Geschlecht, Alter und technischer Erfahrung bzw. Spieleerfahrung auf das subjektive Empfinden der Testperson bei der Steuerung und der Fähigkeit zur Bewältigung des Parcours.</a:t>
+            </a:r>
+            <a:endParaRPr lang="de-DE" sz="3000" dirty="0" smtClean="0"/>
           </a:p>
         </p:txBody>
       </p:sp>
@@ -1420,7 +1326,7 @@
         </p:nvSpPr>
         <p:spPr>
           <a:xfrm>
-            <a:off x="15758295" y="35310231"/>
+            <a:off x="15758295" y="35454247"/>
             <a:ext cx="12529393" cy="923330"/>
           </a:xfrm>
           <a:prstGeom prst="rect">
@@ -1455,7 +1361,7 @@
         </p:nvSpPr>
         <p:spPr>
           <a:xfrm>
-            <a:off x="15758295" y="36233561"/>
+            <a:off x="15758295" y="36377577"/>
             <a:ext cx="12529390" cy="1948565"/>
           </a:xfrm>
           <a:prstGeom prst="rect">
@@ -1787,52 +1693,13 @@
       </p:sp>
       <p:sp>
         <p:nvSpPr>
-          <p:cNvPr id="44" name="Textfeld 43"/>
-          <p:cNvSpPr txBox="1"/>
-          <p:nvPr/>
-        </p:nvSpPr>
-        <p:spPr>
-          <a:xfrm>
-            <a:off x="4605970" y="30056529"/>
-            <a:ext cx="6042999" cy="830997"/>
-          </a:xfrm>
-          <a:prstGeom prst="rect">
-            <a:avLst/>
-          </a:prstGeom>
-          <a:noFill/>
-        </p:spPr>
-        <p:txBody>
-          <a:bodyPr wrap="square" rtlCol="0">
-            <a:spAutoFit/>
-          </a:bodyPr>
-          <a:lstStyle/>
-          <a:p>
-            <a:pPr algn="ctr"/>
-            <a:r>
-              <a:rPr lang="de-DE" sz="2400" b="1" dirty="0" smtClean="0">
-                <a:solidFill>
-                  <a:srgbClr val="262626"/>
-                </a:solidFill>
-              </a:rPr>
-              <a:t>Abbildung 1: Anbindung der Peripherie per USB und  Bluetooth</a:t>
-            </a:r>
-            <a:endParaRPr lang="de-DE" sz="2400" b="1" dirty="0">
-              <a:solidFill>
-                <a:srgbClr val="262626"/>
-              </a:solidFill>
-            </a:endParaRPr>
-          </a:p>
-        </p:txBody>
-      </p:sp>
-      <p:sp>
-        <p:nvSpPr>
           <p:cNvPr id="37" name="Textfeld 36"/>
           <p:cNvSpPr txBox="1"/>
           <p:nvPr/>
         </p:nvSpPr>
         <p:spPr>
           <a:xfrm>
-            <a:off x="19730472" y="14923542"/>
+            <a:off x="19560722" y="24277570"/>
             <a:ext cx="4050475" cy="461665"/>
           </a:xfrm>
           <a:prstGeom prst="rect">
@@ -1878,7 +1745,7 @@
         </p:blipFill>
         <p:spPr>
           <a:xfrm>
-            <a:off x="15860067" y="8953890"/>
+            <a:off x="15690317" y="18307918"/>
             <a:ext cx="12495323" cy="5897644"/>
           </a:xfrm>
           <a:prstGeom prst="rect">
@@ -1894,597 +1761,6 @@
           </a:ln>
         </p:spPr>
       </p:pic>
-      <p:grpSp>
-        <p:nvGrpSpPr>
-          <p:cNvPr id="75" name="Gruppieren 74"/>
-          <p:cNvGrpSpPr/>
-          <p:nvPr/>
-        </p:nvGrpSpPr>
-        <p:grpSpPr>
-          <a:xfrm>
-            <a:off x="2050608" y="23204462"/>
-            <a:ext cx="12209205" cy="6624736"/>
-            <a:chOff x="1630000" y="21836311"/>
-            <a:chExt cx="12306202" cy="6624736"/>
-          </a:xfrm>
-        </p:grpSpPr>
-        <p:sp>
-          <p:nvSpPr>
-            <p:cNvPr id="74" name="Rechteck 73"/>
-            <p:cNvSpPr/>
-            <p:nvPr/>
-          </p:nvSpPr>
-          <p:spPr>
-            <a:xfrm>
-              <a:off x="1630000" y="21836311"/>
-              <a:ext cx="12306202" cy="6624736"/>
-            </a:xfrm>
-            <a:prstGeom prst="rect">
-              <a:avLst/>
-            </a:prstGeom>
-            <a:solidFill>
-              <a:srgbClr val="002060">
-                <a:alpha val="5000"/>
-              </a:srgbClr>
-            </a:solidFill>
-            <a:ln>
-              <a:solidFill>
-                <a:srgbClr val="000000"/>
-              </a:solidFill>
-            </a:ln>
-          </p:spPr>
-          <p:style>
-            <a:lnRef idx="2">
-              <a:schemeClr val="accent1">
-                <a:shade val="50000"/>
-              </a:schemeClr>
-            </a:lnRef>
-            <a:fillRef idx="1">
-              <a:schemeClr val="accent1"/>
-            </a:fillRef>
-            <a:effectRef idx="0">
-              <a:schemeClr val="accent1"/>
-            </a:effectRef>
-            <a:fontRef idx="minor">
-              <a:schemeClr val="lt1"/>
-            </a:fontRef>
-          </p:style>
-          <p:txBody>
-            <a:bodyPr rtlCol="0" anchor="ctr"/>
-            <a:lstStyle/>
-            <a:p>
-              <a:pPr algn="ctr"/>
-              <a:endParaRPr lang="de-DE"/>
-            </a:p>
-          </p:txBody>
-        </p:sp>
-        <p:pic>
-          <p:nvPicPr>
-            <p:cNvPr id="48" name="Grafik 47" descr="https://dri1.img.digitalrivercontent.net/Storefront/Company/msintl/images/English/en-INTL-Parrot-Bebop-Drone-2-White-Cntrlr-Bndl-QK9-00022/en-INTL-L-Parrot-Bebop-Drone-2-White-Cntrlr-Bndl-QK9-00022-RM5-mnco.jpg"/>
-            <p:cNvPicPr>
-              <a:picLocks noChangeAspect="1"/>
-            </p:cNvPicPr>
-            <p:nvPr/>
-          </p:nvPicPr>
-          <p:blipFill rotWithShape="1">
-            <a:blip r:embed="rId8" cstate="print">
-              <a:clrChange>
-                <a:clrFrom>
-                  <a:srgbClr val="FFFFFF"/>
-                </a:clrFrom>
-                <a:clrTo>
-                  <a:srgbClr val="FFFFFF">
-                    <a:alpha val="0"/>
-                  </a:srgbClr>
-                </a:clrTo>
-              </a:clrChange>
-              <a:extLst>
-                <a:ext uri="{28A0092B-C50C-407E-A947-70E740481C1C}">
-                  <a14:useLocalDpi xmlns="" xmlns:a14="http://schemas.microsoft.com/office/drawing/2010/main" val="0"/>
-                </a:ext>
-              </a:extLst>
-            </a:blip>
-            <a:srcRect l="9830" t="26205" r="14828" b="29217"/>
-            <a:stretch/>
-          </p:blipFill>
-          <p:spPr bwMode="auto">
-            <a:xfrm>
-              <a:off x="9999352" y="23338117"/>
-              <a:ext cx="3701160" cy="1288727"/>
-            </a:xfrm>
-            <a:prstGeom prst="rect">
-              <a:avLst/>
-            </a:prstGeom>
-            <a:noFill/>
-            <a:ln>
-              <a:noFill/>
-            </a:ln>
-            <a:extLst>
-              <a:ext uri="{53640926-AAD7-44D8-BBD7-CCE9431645EC}">
-                <a14:shadowObscured xmlns="" xmlns:a14="http://schemas.microsoft.com/office/drawing/2010/main"/>
-              </a:ext>
-            </a:extLst>
-          </p:spPr>
-        </p:pic>
-        <p:pic>
-          <p:nvPicPr>
-            <p:cNvPr id="50" name="Grafik 49"/>
-            <p:cNvPicPr>
-              <a:picLocks noChangeAspect="1"/>
-            </p:cNvPicPr>
-            <p:nvPr/>
-          </p:nvPicPr>
-          <p:blipFill>
-            <a:blip r:embed="rId9" cstate="print">
-              <a:extLst>
-                <a:ext uri="{28A0092B-C50C-407E-A947-70E740481C1C}">
-                  <a14:useLocalDpi xmlns="" xmlns:a14="http://schemas.microsoft.com/office/drawing/2010/main" val="0"/>
-                </a:ext>
-              </a:extLst>
-            </a:blip>
-            <a:stretch>
-              <a:fillRect/>
-            </a:stretch>
-          </p:blipFill>
-          <p:spPr>
-            <a:xfrm>
-              <a:off x="6669543" y="22558385"/>
-              <a:ext cx="2457820" cy="2071328"/>
-            </a:xfrm>
-            <a:prstGeom prst="rect">
-              <a:avLst/>
-            </a:prstGeom>
-            <a:ln>
-              <a:noFill/>
-            </a:ln>
-          </p:spPr>
-        </p:pic>
-        <p:pic>
-          <p:nvPicPr>
-            <p:cNvPr id="51" name="Grafik 50" descr="Joystick, Game Controller, Spiel, Kontrolle, Gerät"/>
-            <p:cNvPicPr>
-              <a:picLocks noChangeAspect="1"/>
-            </p:cNvPicPr>
-            <p:nvPr/>
-          </p:nvPicPr>
-          <p:blipFill>
-            <a:blip r:embed="rId10" cstate="print">
-              <a:extLst>
-                <a:ext uri="{BEBA8EAE-BF5A-486C-A8C5-ECC9F3942E4B}">
-                  <a14:imgProps xmlns="" xmlns:a14="http://schemas.microsoft.com/office/drawing/2010/main">
-                    <a14:imgLayer r:embed="rId11">
-                      <a14:imgEffect>
-                        <a14:artisticPlasticWrap/>
-                      </a14:imgEffect>
-                    </a14:imgLayer>
-                  </a14:imgProps>
-                </a:ext>
-                <a:ext uri="{28A0092B-C50C-407E-A947-70E740481C1C}">
-                  <a14:useLocalDpi xmlns="" xmlns:a14="http://schemas.microsoft.com/office/drawing/2010/main" val="0"/>
-                </a:ext>
-              </a:extLst>
-            </a:blip>
-            <a:srcRect/>
-            <a:stretch>
-              <a:fillRect/>
-            </a:stretch>
-          </p:blipFill>
-          <p:spPr bwMode="auto">
-            <a:xfrm>
-              <a:off x="8072584" y="26369706"/>
-              <a:ext cx="1529157" cy="1572310"/>
-            </a:xfrm>
-            <a:prstGeom prst="rect">
-              <a:avLst/>
-            </a:prstGeom>
-            <a:noFill/>
-            <a:ln>
-              <a:noFill/>
-            </a:ln>
-          </p:spPr>
-        </p:pic>
-        <p:pic>
-          <p:nvPicPr>
-            <p:cNvPr id="52" name="Grafik 51"/>
-            <p:cNvPicPr>
-              <a:picLocks noChangeAspect="1"/>
-            </p:cNvPicPr>
-            <p:nvPr/>
-          </p:nvPicPr>
-          <p:blipFill>
-            <a:blip r:embed="rId12" cstate="print">
-              <a:extLst>
-                <a:ext uri="{BEBA8EAE-BF5A-486C-A8C5-ECC9F3942E4B}">
-                  <a14:imgProps xmlns="" xmlns:a14="http://schemas.microsoft.com/office/drawing/2010/main">
-                    <a14:imgLayer r:embed="rId13">
-                      <a14:imgEffect>
-                        <a14:artisticPlasticWrap/>
-                      </a14:imgEffect>
-                    </a14:imgLayer>
-                  </a14:imgProps>
-                </a:ext>
-                <a:ext uri="{28A0092B-C50C-407E-A947-70E740481C1C}">
-                  <a14:useLocalDpi xmlns="" xmlns:a14="http://schemas.microsoft.com/office/drawing/2010/main" val="0"/>
-                </a:ext>
-              </a:extLst>
-            </a:blip>
-            <a:stretch>
-              <a:fillRect/>
-            </a:stretch>
-          </p:blipFill>
-          <p:spPr>
-            <a:xfrm>
-              <a:off x="5912847" y="26551763"/>
-              <a:ext cx="1513393" cy="1390253"/>
-            </a:xfrm>
-            <a:prstGeom prst="rect">
-              <a:avLst/>
-            </a:prstGeom>
-            <a:ln>
-              <a:noFill/>
-            </a:ln>
-          </p:spPr>
-        </p:pic>
-        <p:pic>
-          <p:nvPicPr>
-            <p:cNvPr id="53" name="Grafik 52"/>
-            <p:cNvPicPr>
-              <a:picLocks noChangeAspect="1"/>
-            </p:cNvPicPr>
-            <p:nvPr/>
-          </p:nvPicPr>
-          <p:blipFill>
-            <a:blip r:embed="rId14" cstate="print">
-              <a:extLst>
-                <a:ext uri="{28A0092B-C50C-407E-A947-70E740481C1C}">
-                  <a14:useLocalDpi xmlns="" xmlns:a14="http://schemas.microsoft.com/office/drawing/2010/main" val="0"/>
-                </a:ext>
-              </a:extLst>
-            </a:blip>
-            <a:stretch>
-              <a:fillRect/>
-            </a:stretch>
-          </p:blipFill>
-          <p:spPr>
-            <a:xfrm>
-              <a:off x="1908662" y="26783472"/>
-              <a:ext cx="3294782" cy="1158544"/>
-            </a:xfrm>
-            <a:prstGeom prst="rect">
-              <a:avLst/>
-            </a:prstGeom>
-            <a:ln>
-              <a:noFill/>
-            </a:ln>
-          </p:spPr>
-        </p:pic>
-        <p:pic>
-          <p:nvPicPr>
-            <p:cNvPr id="57" name="Grafik 56" descr="C:\Users\Puderer\AppData\Local\Microsoft\Windows\INetCache\IE\A3QJ7VIY\wireless-connection-icon[1].jpg"/>
-            <p:cNvPicPr>
-              <a:picLocks noChangeAspect="1"/>
-            </p:cNvPicPr>
-            <p:nvPr/>
-          </p:nvPicPr>
-          <p:blipFill rotWithShape="1">
-            <a:blip r:embed="rId15" cstate="print">
-              <a:clrChange>
-                <a:clrFrom>
-                  <a:srgbClr val="FFFFFF"/>
-                </a:clrFrom>
-                <a:clrTo>
-                  <a:srgbClr val="FFFFFF">
-                    <a:alpha val="0"/>
-                  </a:srgbClr>
-                </a:clrTo>
-              </a:clrChange>
-              <a:extLst>
-                <a:ext uri="{BEBA8EAE-BF5A-486C-A8C5-ECC9F3942E4B}">
-                  <a14:imgProps xmlns="" xmlns:a14="http://schemas.microsoft.com/office/drawing/2010/main">
-                    <a14:imgLayer r:embed="rId16">
-                      <a14:imgEffect>
-                        <a14:saturation sat="0"/>
-                      </a14:imgEffect>
-                    </a14:imgLayer>
-                  </a14:imgProps>
-                </a:ext>
-                <a:ext uri="{28A0092B-C50C-407E-A947-70E740481C1C}">
-                  <a14:useLocalDpi xmlns="" xmlns:a14="http://schemas.microsoft.com/office/drawing/2010/main" val="0"/>
-                </a:ext>
-              </a:extLst>
-            </a:blip>
-            <a:srcRect l="11755" t="7454" r="9602" b="5383"/>
-            <a:stretch/>
-          </p:blipFill>
-          <p:spPr bwMode="auto">
-            <a:xfrm>
-              <a:off x="11382314" y="22365434"/>
-              <a:ext cx="915972" cy="873913"/>
-            </a:xfrm>
-            <a:prstGeom prst="rect">
-              <a:avLst/>
-            </a:prstGeom>
-            <a:noFill/>
-            <a:ln>
-              <a:noFill/>
-            </a:ln>
-            <a:extLst>
-              <a:ext uri="{53640926-AAD7-44D8-BBD7-CCE9431645EC}">
-                <a14:shadowObscured xmlns="" xmlns:a14="http://schemas.microsoft.com/office/drawing/2010/main"/>
-              </a:ext>
-            </a:extLst>
-          </p:spPr>
-        </p:pic>
-        <p:pic>
-          <p:nvPicPr>
-            <p:cNvPr id="63" name="Grafik 62" descr="C:\Users\Puderer\AppData\Local\Microsoft\Windows\INetCache\IE\DW9SJ4A0\bluetooth[1].png"/>
-            <p:cNvPicPr>
-              <a:picLocks noChangeAspect="1"/>
-            </p:cNvPicPr>
-            <p:nvPr/>
-          </p:nvPicPr>
-          <p:blipFill rotWithShape="1">
-            <a:blip r:embed="rId17" cstate="print">
-              <a:extLst>
-                <a:ext uri="{28A0092B-C50C-407E-A947-70E740481C1C}">
-                  <a14:useLocalDpi xmlns="" xmlns:a14="http://schemas.microsoft.com/office/drawing/2010/main" val="0"/>
-                </a:ext>
-              </a:extLst>
-            </a:blip>
-            <a:srcRect l="16423" t="8211" r="16716" b="8211"/>
-            <a:stretch/>
-          </p:blipFill>
-          <p:spPr bwMode="auto">
-            <a:xfrm>
-              <a:off x="13159605" y="25889738"/>
-              <a:ext cx="425642" cy="562721"/>
-            </a:xfrm>
-            <a:prstGeom prst="rect">
-              <a:avLst/>
-            </a:prstGeom>
-            <a:noFill/>
-            <a:ln>
-              <a:solidFill>
-                <a:srgbClr val="000000"/>
-              </a:solidFill>
-            </a:ln>
-            <a:extLst>
-              <a:ext uri="{53640926-AAD7-44D8-BBD7-CCE9431645EC}">
-                <a14:shadowObscured xmlns="" xmlns:a14="http://schemas.microsoft.com/office/drawing/2010/main"/>
-              </a:ext>
-            </a:extLst>
-          </p:spPr>
-        </p:pic>
-        <p:pic>
-          <p:nvPicPr>
-            <p:cNvPr id="64" name="Grafik 63" descr="C:\Users\Puderer\AppData\Local\Microsoft\Windows\INetCache\IE\DW9SJ4A0\1280px-USB_Icon.svg[1].png"/>
-            <p:cNvPicPr>
-              <a:picLocks noChangeAspect="1"/>
-            </p:cNvPicPr>
-            <p:nvPr/>
-          </p:nvPicPr>
-          <p:blipFill>
-            <a:blip r:embed="rId18" cstate="print">
-              <a:extLst>
-                <a:ext uri="{28A0092B-C50C-407E-A947-70E740481C1C}">
-                  <a14:useLocalDpi xmlns="" xmlns:a14="http://schemas.microsoft.com/office/drawing/2010/main" val="0"/>
-                </a:ext>
-              </a:extLst>
-            </a:blip>
-            <a:srcRect/>
-            <a:stretch>
-              <a:fillRect/>
-            </a:stretch>
-          </p:blipFill>
-          <p:spPr bwMode="auto">
-            <a:xfrm>
-              <a:off x="1845604" y="25889738"/>
-              <a:ext cx="882812" cy="446867"/>
-            </a:xfrm>
-            <a:prstGeom prst="rect">
-              <a:avLst/>
-            </a:prstGeom>
-            <a:noFill/>
-            <a:ln>
-              <a:solidFill>
-                <a:srgbClr val="000000"/>
-              </a:solidFill>
-            </a:ln>
-          </p:spPr>
-        </p:pic>
-        <p:sp>
-          <p:nvSpPr>
-            <p:cNvPr id="65" name="Rechteck 64"/>
-            <p:cNvSpPr/>
-            <p:nvPr/>
-          </p:nvSpPr>
-          <p:spPr>
-            <a:xfrm>
-              <a:off x="1782546" y="25823535"/>
-              <a:ext cx="7929546" cy="2432943"/>
-            </a:xfrm>
-            <a:prstGeom prst="rect">
-              <a:avLst/>
-            </a:prstGeom>
-            <a:noFill/>
-            <a:ln>
-              <a:solidFill>
-                <a:srgbClr val="000000"/>
-              </a:solidFill>
-              <a:prstDash val="dash"/>
-            </a:ln>
-          </p:spPr>
-          <p:style>
-            <a:lnRef idx="2">
-              <a:schemeClr val="accent1">
-                <a:shade val="50000"/>
-              </a:schemeClr>
-            </a:lnRef>
-            <a:fillRef idx="1">
-              <a:schemeClr val="accent1"/>
-            </a:fillRef>
-            <a:effectRef idx="0">
-              <a:schemeClr val="accent1"/>
-            </a:effectRef>
-            <a:fontRef idx="minor">
-              <a:schemeClr val="lt1"/>
-            </a:fontRef>
-          </p:style>
-          <p:txBody>
-            <a:bodyPr rot="0" spcFirstLastPara="0" vert="horz" wrap="square" lIns="91440" tIns="45720" rIns="91440" bIns="45720" numCol="1" spcCol="0" rtlCol="0" fromWordArt="0" anchor="ctr" anchorCtr="0" forceAA="0" compatLnSpc="1">
-              <a:prstTxWarp prst="textNoShape">
-                <a:avLst/>
-              </a:prstTxWarp>
-              <a:noAutofit/>
-            </a:bodyPr>
-            <a:lstStyle/>
-            <a:p>
-              <a:endParaRPr lang="de-DE"/>
-            </a:p>
-          </p:txBody>
-        </p:sp>
-        <p:sp>
-          <p:nvSpPr>
-            <p:cNvPr id="66" name="Rechteck 65"/>
-            <p:cNvSpPr/>
-            <p:nvPr/>
-          </p:nvSpPr>
-          <p:spPr>
-            <a:xfrm>
-              <a:off x="9980089" y="25823535"/>
-              <a:ext cx="3720423" cy="2432943"/>
-            </a:xfrm>
-            <a:prstGeom prst="rect">
-              <a:avLst/>
-            </a:prstGeom>
-            <a:noFill/>
-            <a:ln>
-              <a:solidFill>
-                <a:srgbClr val="000000"/>
-              </a:solidFill>
-              <a:prstDash val="dash"/>
-            </a:ln>
-          </p:spPr>
-          <p:style>
-            <a:lnRef idx="2">
-              <a:schemeClr val="accent6">
-                <a:shade val="50000"/>
-              </a:schemeClr>
-            </a:lnRef>
-            <a:fillRef idx="1">
-              <a:schemeClr val="accent6"/>
-            </a:fillRef>
-            <a:effectRef idx="0">
-              <a:schemeClr val="accent6"/>
-            </a:effectRef>
-            <a:fontRef idx="minor">
-              <a:schemeClr val="lt1"/>
-            </a:fontRef>
-          </p:style>
-          <p:txBody>
-            <a:bodyPr rot="0" spcFirstLastPara="0" vert="horz" wrap="square" lIns="91440" tIns="45720" rIns="91440" bIns="45720" numCol="1" spcCol="0" rtlCol="0" fromWordArt="0" anchor="ctr" anchorCtr="0" forceAA="0" compatLnSpc="1">
-              <a:prstTxWarp prst="textNoShape">
-                <a:avLst/>
-              </a:prstTxWarp>
-              <a:noAutofit/>
-            </a:bodyPr>
-            <a:lstStyle/>
-            <a:p>
-              <a:endParaRPr lang="de-DE"/>
-            </a:p>
-          </p:txBody>
-        </p:sp>
-        <p:sp>
-          <p:nvSpPr>
-            <p:cNvPr id="11" name="Pfeil nach oben 10"/>
-            <p:cNvSpPr/>
-            <p:nvPr/>
-          </p:nvSpPr>
-          <p:spPr>
-            <a:xfrm>
-              <a:off x="6907313" y="24944314"/>
-              <a:ext cx="1774385" cy="647868"/>
-            </a:xfrm>
-            <a:prstGeom prst="upArrow">
-              <a:avLst/>
-            </a:prstGeom>
-            <a:ln>
-              <a:solidFill>
-                <a:srgbClr val="000000"/>
-              </a:solidFill>
-            </a:ln>
-          </p:spPr>
-          <p:style>
-            <a:lnRef idx="2">
-              <a:schemeClr val="accent1">
-                <a:shade val="50000"/>
-              </a:schemeClr>
-            </a:lnRef>
-            <a:fillRef idx="1">
-              <a:schemeClr val="accent1"/>
-            </a:fillRef>
-            <a:effectRef idx="0">
-              <a:schemeClr val="accent1"/>
-            </a:effectRef>
-            <a:fontRef idx="minor">
-              <a:schemeClr val="lt1"/>
-            </a:fontRef>
-          </p:style>
-          <p:txBody>
-            <a:bodyPr rtlCol="0" anchor="ctr"/>
-            <a:lstStyle/>
-            <a:p>
-              <a:pPr algn="ctr"/>
-              <a:endParaRPr lang="de-DE"/>
-            </a:p>
-          </p:txBody>
-        </p:sp>
-        <p:sp>
-          <p:nvSpPr>
-            <p:cNvPr id="68" name="Pfeil nach oben 67"/>
-            <p:cNvSpPr/>
-            <p:nvPr/>
-          </p:nvSpPr>
-          <p:spPr>
-            <a:xfrm rot="5400000">
-              <a:off x="9005471" y="23270115"/>
-              <a:ext cx="1180090" cy="647868"/>
-            </a:xfrm>
-            <a:prstGeom prst="upArrow">
-              <a:avLst/>
-            </a:prstGeom>
-            <a:ln>
-              <a:solidFill>
-                <a:srgbClr val="000000"/>
-              </a:solidFill>
-            </a:ln>
-          </p:spPr>
-          <p:style>
-            <a:lnRef idx="2">
-              <a:schemeClr val="accent1">
-                <a:shade val="50000"/>
-              </a:schemeClr>
-            </a:lnRef>
-            <a:fillRef idx="1">
-              <a:schemeClr val="accent1"/>
-            </a:fillRef>
-            <a:effectRef idx="0">
-              <a:schemeClr val="accent1"/>
-            </a:effectRef>
-            <a:fontRef idx="minor">
-              <a:schemeClr val="lt1"/>
-            </a:fontRef>
-          </p:style>
-          <p:txBody>
-            <a:bodyPr rtlCol="0" anchor="ctr"/>
-            <a:lstStyle/>
-            <a:p>
-              <a:pPr algn="ctr"/>
-              <a:endParaRPr lang="de-DE"/>
-            </a:p>
-          </p:txBody>
-        </p:sp>
-      </p:grpSp>
       <p:sp>
         <p:nvSpPr>
           <p:cNvPr id="70" name="Textfeld 69"/>
@@ -2493,8 +1769,8 @@
         </p:nvSpPr>
         <p:spPr>
           <a:xfrm>
-            <a:off x="1630000" y="31053334"/>
-            <a:ext cx="12529390" cy="7200800"/>
+            <a:off x="15728258" y="10819086"/>
+            <a:ext cx="12529390" cy="7067430"/>
           </a:xfrm>
           <a:prstGeom prst="rect">
             <a:avLst/>
@@ -2574,7 +1850,11 @@
             </a:r>
             <a:r>
               <a:rPr lang="de-DE" sz="3000" dirty="0" smtClean="0"/>
-              <a:t>) eingebunden.</a:t>
+              <a:t>) eingebunden</a:t>
+            </a:r>
+            <a:r>
+              <a:rPr lang="de-DE" sz="3000" dirty="0" smtClean="0"/>
+              <a:t>.</a:t>
             </a:r>
           </a:p>
           <a:p>
@@ -2585,15 +1865,7 @@
             <a:pPr algn="just"/>
             <a:r>
               <a:rPr lang="de-DE" sz="3000" dirty="0"/>
-              <a:t>Eine Ausnahme stellt das Wii Balance Board dar. Hier kommt die </a:t>
-            </a:r>
-            <a:r>
-              <a:rPr lang="de-DE" sz="3000" dirty="0" smtClean="0"/>
-              <a:t>Java- </a:t>
-            </a:r>
-            <a:r>
-              <a:rPr lang="de-DE" sz="3000" dirty="0"/>
-              <a:t>Bibliothek </a:t>
+              <a:t>Eine Ausnahme stellt das Wii Balance Board dar. Hier kommt die Java- Bibliothek </a:t>
             </a:r>
             <a:r>
               <a:rPr lang="de-DE" sz="3000" dirty="0" err="1"/>
@@ -2601,31 +1873,7 @@
             </a:r>
             <a:r>
               <a:rPr lang="de-DE" sz="3000" dirty="0"/>
-              <a:t> zum Einsatz, die eine bequeme Anbindung Wii-bezogener Peripherie </a:t>
-            </a:r>
-            <a:r>
-              <a:rPr lang="de-DE" sz="3000" dirty="0" smtClean="0"/>
-              <a:t>ermöglicht. Hierzu </a:t>
-            </a:r>
-            <a:r>
-              <a:rPr lang="de-DE" sz="3000" dirty="0"/>
-              <a:t>wurde eine separate </a:t>
-            </a:r>
-            <a:r>
-              <a:rPr lang="de-DE" sz="3000" dirty="0" smtClean="0"/>
-              <a:t>Java- </a:t>
-            </a:r>
-            <a:r>
-              <a:rPr lang="de-DE" sz="3000" dirty="0"/>
-              <a:t>Applikation entwickelt, welche zu Beginn des Hauptprogramms gestartet wird. Die Kommunikation der dafür benötigten, selbst erstellten </a:t>
-            </a:r>
-            <a:r>
-              <a:rPr lang="de-DE" sz="3000" dirty="0" smtClean="0"/>
-              <a:t>Java- </a:t>
-            </a:r>
-            <a:r>
-              <a:rPr lang="de-DE" sz="3000" dirty="0"/>
-              <a:t>Applikation mit der </a:t>
+              <a:t> zum Einsatz, die eine bequeme Anbindung Wii-bezogener Peripherie ermöglicht. Hierzu wurde eine separate Java- Applikation entwickelt, welche zu Beginn des Hauptprogramms gestartet wird. Die Kommunikation der dafür benötigten, selbst erstellten Java- Applikation mit der </a:t>
             </a:r>
             <a:r>
               <a:rPr lang="de-DE" sz="3000" dirty="0" err="1"/>
@@ -2633,20 +1881,15 @@
             </a:r>
             <a:r>
               <a:rPr lang="de-DE" sz="3000" dirty="0"/>
-              <a:t> Schicht findet über </a:t>
-            </a:r>
-            <a:r>
-              <a:rPr lang="de-DE" sz="3000" dirty="0" smtClean="0"/>
-              <a:t>TCP-Sockets </a:t>
-            </a:r>
-            <a:r>
-              <a:rPr lang="de-DE" sz="3000" dirty="0"/>
-              <a:t>statt</a:t>
-            </a:r>
-            <a:r>
-              <a:rPr lang="de-DE" sz="3000" dirty="0" smtClean="0"/>
-              <a:t>.</a:t>
-            </a:r>
+              <a:t> Schicht findet über TCP-Sockets statt.</a:t>
+            </a:r>
+          </a:p>
+          <a:p>
+            <a:pPr algn="just"/>
+            <a:endParaRPr lang="de-DE" sz="3000" dirty="0" smtClean="0"/>
+          </a:p>
+          <a:p>
+            <a:pPr algn="just"/>
             <a:endParaRPr lang="de-DE" sz="3000" dirty="0"/>
           </a:p>
         </p:txBody>
@@ -2659,8 +1902,8 @@
         </p:nvSpPr>
         <p:spPr>
           <a:xfrm>
-            <a:off x="15758295" y="15787638"/>
-            <a:ext cx="12529390" cy="8587501"/>
+            <a:off x="1674493" y="15056301"/>
+            <a:ext cx="12529390" cy="8933237"/>
           </a:xfrm>
           <a:prstGeom prst="rect">
             <a:avLst/>
@@ -2673,42 +1916,14 @@
           </a:bodyPr>
           <a:lstStyle/>
           <a:p>
-            <a:pPr algn="just">
-              <a:lnSpc>
-                <a:spcPts val="3800"/>
-              </a:lnSpc>
-            </a:pPr>
-            <a:r>
-              <a:rPr lang="de-DE" sz="3000" b="1" dirty="0" smtClean="0">
-                <a:solidFill>
-                  <a:srgbClr val="262626"/>
-                </a:solidFill>
-              </a:rPr>
-              <a:t>Die Applikation</a:t>
-            </a:r>
-            <a:endParaRPr lang="en-US" sz="3000" b="1" dirty="0" smtClean="0">
-              <a:solidFill>
-                <a:srgbClr val="262626"/>
-              </a:solidFill>
-            </a:endParaRPr>
-          </a:p>
-          <a:p>
-            <a:pPr algn="just">
-              <a:lnSpc>
-                <a:spcPts val="3800"/>
-              </a:lnSpc>
-            </a:pPr>
-            <a:endParaRPr lang="de-DE" sz="3000" dirty="0" smtClean="0">
-              <a:solidFill>
-                <a:srgbClr val="262626"/>
-              </a:solidFill>
-            </a:endParaRPr>
-          </a:p>
-          <a:p>
             <a:pPr algn="just"/>
             <a:r>
+              <a:rPr lang="de-DE" sz="3000" dirty="0" smtClean="0"/>
+              <a:t>Das Spiel sieht die Navigation durch einen selbst </a:t>
+            </a:r>
+            <a:r>
               <a:rPr lang="de-DE" sz="3000" dirty="0"/>
-              <a:t>Als Anwendungsfall ist die Navigation durch einen selbst erstellten Hindernisparcours </a:t>
+              <a:t>erstellten Hindernisparcours </a:t>
             </a:r>
             <a:r>
               <a:rPr lang="de-DE" sz="3000" dirty="0" smtClean="0"/>
@@ -2716,12 +1931,89 @@
             </a:r>
             <a:r>
               <a:rPr lang="de-DE" sz="3000" dirty="0"/>
-              <a:t>Verwendung der verschiedenen Eingabegeräte vorgesehen. Eine Parcoursrunde startet mit dem Abheben der Drohne und endet mit der Landung der Drohne am Ziel</a:t>
-            </a:r>
-            <a:r>
-              <a:rPr lang="de-DE" sz="3000" dirty="0" smtClean="0"/>
-              <a:t>. Dazwischen wird die benötigte Zeit zur Bewältigung des Parcours für jedes Peripheriegerät gemessen und bei Landung am Zielpunkt in eine Tabelle übernommen. </a:t>
-            </a:r>
+              <a:t>Verwendung </a:t>
+            </a:r>
+            <a:r>
+              <a:rPr lang="de-DE" sz="3000" dirty="0" smtClean="0"/>
+              <a:t>von</a:t>
+            </a:r>
+            <a:r>
+              <a:rPr lang="de-DE" sz="3000" dirty="0" smtClean="0"/>
+              <a:t> </a:t>
+            </a:r>
+            <a:r>
+              <a:rPr lang="de-DE" sz="3000" dirty="0"/>
+              <a:t>verschiedenen </a:t>
+            </a:r>
+            <a:r>
+              <a:rPr lang="de-DE" sz="3000" dirty="0" smtClean="0"/>
+              <a:t>Eingabe-geräten vor. </a:t>
+            </a:r>
+            <a:r>
+              <a:rPr lang="de-DE" sz="3000" dirty="0">
+                <a:solidFill>
+                  <a:srgbClr val="262626"/>
+                </a:solidFill>
+              </a:rPr>
+              <a:t>Als Eingabegeräte kommen Tastatur, Xbox Controller, Logitech </a:t>
+            </a:r>
+            <a:r>
+              <a:rPr lang="de-DE" sz="3000" dirty="0" err="1">
+                <a:solidFill>
+                  <a:srgbClr val="262626"/>
+                </a:solidFill>
+              </a:rPr>
+              <a:t>Attack</a:t>
+            </a:r>
+            <a:r>
+              <a:rPr lang="de-DE" sz="3000" dirty="0">
+                <a:solidFill>
+                  <a:srgbClr val="262626"/>
+                </a:solidFill>
+              </a:rPr>
+              <a:t> Joystick und das Wii Balance Board von Nintendo zum Einsatz. </a:t>
+            </a:r>
+            <a:r>
+              <a:rPr lang="de-DE" sz="3000" dirty="0" smtClean="0"/>
+              <a:t>Eine </a:t>
+            </a:r>
+            <a:r>
+              <a:rPr lang="de-DE" sz="3000" dirty="0"/>
+              <a:t>Parcoursrunde startet mit dem Abheben der Drohne und endet mit </a:t>
+            </a:r>
+            <a:r>
+              <a:rPr lang="de-DE" sz="3000" dirty="0" smtClean="0"/>
+              <a:t>deren </a:t>
+            </a:r>
+            <a:r>
+              <a:rPr lang="de-DE" sz="3000" dirty="0"/>
+              <a:t>Landung </a:t>
+            </a:r>
+            <a:r>
+              <a:rPr lang="de-DE" sz="3000" dirty="0" smtClean="0"/>
+              <a:t>am </a:t>
+            </a:r>
+            <a:r>
+              <a:rPr lang="de-DE" sz="3000" dirty="0"/>
+              <a:t>Ziel</a:t>
+            </a:r>
+            <a:r>
+              <a:rPr lang="de-DE" sz="3000" dirty="0" smtClean="0"/>
+              <a:t>. Dazwischen </a:t>
+            </a:r>
+            <a:r>
+              <a:rPr lang="de-DE" sz="3000" dirty="0" smtClean="0"/>
+              <a:t>wird die </a:t>
+            </a:r>
+            <a:r>
+              <a:rPr lang="de-DE" sz="3000" dirty="0" smtClean="0"/>
+              <a:t>benötigte Zeit zur Bewältigung des Parcours für jedes Peripheriegerät gemessen und bei Landung am Zielpunkt in eine Tabelle übernommen. </a:t>
+            </a:r>
+            <a:r>
+              <a:rPr lang="de-DE" sz="3000" dirty="0"/>
+              <a:t>Während des Flugs können sowohl Bilder als auch Videos aufgenommen werden.</a:t>
+            </a:r>
+            <a:endParaRPr lang="de-DE" sz="3000" dirty="0" smtClean="0"/>
           </a:p>
           <a:p>
             <a:pPr algn="just"/>
@@ -2731,7 +2023,23 @@
             <a:pPr algn="just"/>
             <a:r>
               <a:rPr lang="de-DE" sz="3000" dirty="0" smtClean="0"/>
-              <a:t>Das Spielfeld kann durch die Festlegung eines GPS Wertes als Mittelpunkt und die Angabe eines Radius (in Meter) begrenzt werden. Da die Position seitens der Drohne nur sekündlich aktualisiert wird, ist sie bei steigender Geschwindigkeit relativ ungenau. Aus diesem Grund wird aktuell noch ein menschlicher </a:t>
+              <a:t>Das Spielfeld kann durch die Festlegung eines GPS Wertes als Mittelpunkt und die Angabe eines Radius (in Meter) begrenzt werden. Da die Position seitens der Drohne nur sekündlich aktualisiert wird, ist sie bei steigender Geschwindigkeit relativ ungenau. </a:t>
+            </a:r>
+            <a:r>
+              <a:rPr lang="de-DE" sz="3000" dirty="0" smtClean="0"/>
+              <a:t>Darum </a:t>
+            </a:r>
+            <a:r>
+              <a:rPr lang="de-DE" sz="3000" dirty="0" smtClean="0"/>
+              <a:t>wird </a:t>
+            </a:r>
+            <a:r>
+              <a:rPr lang="de-DE" sz="3000" dirty="0" smtClean="0"/>
+              <a:t>ein </a:t>
+            </a:r>
+            <a:r>
+              <a:rPr lang="de-DE" sz="3000" dirty="0" smtClean="0"/>
+              <a:t>menschlicher </a:t>
             </a:r>
             <a:r>
               <a:rPr lang="de-DE" sz="3000" dirty="0"/>
@@ -2755,7 +2063,15 @@
             </a:r>
             <a:r>
               <a:rPr lang="de-DE" sz="3000" dirty="0" smtClean="0"/>
-              <a:t>. Da für das Wii Balance Board keine sinnvolle Start- und Landemöglichkeit existiert, werden Start und Landung in diesem Fall vom Bediener der zentralen Steuereinheit mit der Tastatur durchgeführt.</a:t>
+              <a:t>. Da für das Wii Balance Board keine sinnvolle Start- und Landemöglichkeit existiert, werden Start und Landung in diesem Fall vom Bediener </a:t>
+            </a:r>
+            <a:r>
+              <a:rPr lang="de-DE" sz="3000" dirty="0" smtClean="0"/>
+              <a:t>der zentralen </a:t>
+            </a:r>
+            <a:r>
+              <a:rPr lang="de-DE" sz="3000" dirty="0" smtClean="0"/>
+              <a:t>Steuereinheit mit der Tastatur durchgeführt.</a:t>
             </a:r>
           </a:p>
         </p:txBody>
@@ -2835,7 +2151,7 @@
         </p:nvSpPr>
         <p:spPr>
           <a:xfrm>
-            <a:off x="15758295" y="24644622"/>
+            <a:off x="15690317" y="24860646"/>
             <a:ext cx="12529390" cy="2542513"/>
           </a:xfrm>
           <a:prstGeom prst="rect">
@@ -2899,11 +2215,11 @@
           <p:nvPr/>
         </p:nvPicPr>
         <p:blipFill>
-          <a:blip r:embed="rId19" cstate="print">
+          <a:blip r:embed="rId8" cstate="print">
             <a:extLst>
               <a:ext uri="{BEBA8EAE-BF5A-486C-A8C5-ECC9F3942E4B}">
-                <a14:imgProps xmlns="" xmlns:a14="http://schemas.microsoft.com/office/drawing/2010/main">
-                  <a14:imgLayer r:embed="rId20">
+                <a14:imgProps xmlns:a14="http://schemas.microsoft.com/office/drawing/2010/main">
+                  <a14:imgLayer r:embed="rId9">
                     <a14:imgEffect>
                       <a14:artisticPlasticWrap/>
                     </a14:imgEffect>
@@ -2911,7 +2227,7 @@
                 </a14:imgProps>
               </a:ext>
               <a:ext uri="{28A0092B-C50C-407E-A947-70E740481C1C}">
-                <a14:useLocalDpi xmlns="" xmlns:a14="http://schemas.microsoft.com/office/drawing/2010/main" val="0"/>
+                <a14:useLocalDpi xmlns:a14="http://schemas.microsoft.com/office/drawing/2010/main" val="0"/>
               </a:ext>
             </a:extLst>
           </a:blip>
@@ -2935,14 +2251,14 @@
           <a:effectLst/>
           <a:extLst>
             <a:ext uri="{909E8E84-426E-40DD-AFC4-6F175D3DCCD1}">
-              <a14:hiddenFill xmlns="" xmlns:a14="http://schemas.microsoft.com/office/drawing/2010/main">
+              <a14:hiddenFill xmlns:a14="http://schemas.microsoft.com/office/drawing/2010/main">
                 <a:solidFill>
                   <a:schemeClr val="accent1"/>
                 </a:solidFill>
               </a14:hiddenFill>
             </a:ext>
             <a:ext uri="{91240B29-F687-4F45-9708-019B960494DF}">
-              <a14:hiddenLine xmlns="" xmlns:a14="http://schemas.microsoft.com/office/drawing/2010/main" w="9525">
+              <a14:hiddenLine xmlns:a14="http://schemas.microsoft.com/office/drawing/2010/main" w="9525">
                 <a:solidFill>
                   <a:schemeClr val="tx1"/>
                 </a:solidFill>
@@ -2952,7 +2268,7 @@
               </a14:hiddenLine>
             </a:ext>
             <a:ext uri="{AF507438-7753-43E0-B8FC-AC1667EBCBE1}">
-              <a14:hiddenEffects xmlns="" xmlns:a14="http://schemas.microsoft.com/office/drawing/2010/main">
+              <a14:hiddenEffects xmlns:a14="http://schemas.microsoft.com/office/drawing/2010/main">
                 <a:effectLst>
                   <a:outerShdw dist="35921" dir="2700000" algn="ctr" rotWithShape="0">
                     <a:schemeClr val="bg2"/>
@@ -2963,74 +2279,970 @@
           </a:extLst>
         </p:spPr>
       </p:pic>
-      <p:pic>
-        <p:nvPicPr>
-          <p:cNvPr id="1032" name="Picture 8"/>
-          <p:cNvPicPr>
-            <a:picLocks noChangeAspect="1" noChangeArrowheads="1"/>
-          </p:cNvPicPr>
+      <p:grpSp>
+        <p:nvGrpSpPr>
+          <p:cNvPr id="2" name="Gruppieren 1"/>
+          <p:cNvGrpSpPr/>
           <p:nvPr/>
-        </p:nvPicPr>
-        <p:blipFill>
-          <a:blip r:embed="rId21" cstate="print">
+        </p:nvGrpSpPr>
+        <p:grpSpPr>
+          <a:xfrm>
+            <a:off x="1674491" y="28173014"/>
+            <a:ext cx="12209205" cy="7683064"/>
+            <a:chOff x="28287685" y="22920931"/>
+            <a:chExt cx="12209205" cy="7683064"/>
+          </a:xfrm>
+        </p:grpSpPr>
+        <p:sp>
+          <p:nvSpPr>
+            <p:cNvPr id="44" name="Textfeld 43"/>
+            <p:cNvSpPr txBox="1"/>
+            <p:nvPr/>
+          </p:nvSpPr>
+          <p:spPr>
+            <a:xfrm>
+              <a:off x="30843047" y="29772998"/>
+              <a:ext cx="6042999" cy="830997"/>
+            </a:xfrm>
+            <a:prstGeom prst="rect">
+              <a:avLst/>
+            </a:prstGeom>
+            <a:noFill/>
+          </p:spPr>
+          <p:txBody>
+            <a:bodyPr wrap="square" rtlCol="0">
+              <a:spAutoFit/>
+            </a:bodyPr>
+            <a:lstStyle/>
+            <a:p>
+              <a:pPr algn="ctr"/>
+              <a:r>
+                <a:rPr lang="de-DE" sz="2400" b="1" dirty="0" smtClean="0">
+                  <a:solidFill>
+                    <a:srgbClr val="262626"/>
+                  </a:solidFill>
+                </a:rPr>
+                <a:t>Abbildung 1: Anbindung der Peripherie per USB und  Bluetooth</a:t>
+              </a:r>
+              <a:endParaRPr lang="de-DE" sz="2400" b="1" dirty="0">
+                <a:solidFill>
+                  <a:srgbClr val="262626"/>
+                </a:solidFill>
+              </a:endParaRPr>
+            </a:p>
+          </p:txBody>
+        </p:sp>
+        <p:grpSp>
+          <p:nvGrpSpPr>
+            <p:cNvPr id="75" name="Gruppieren 74"/>
+            <p:cNvGrpSpPr/>
+            <p:nvPr/>
+          </p:nvGrpSpPr>
+          <p:grpSpPr>
+            <a:xfrm>
+              <a:off x="28287685" y="22920931"/>
+              <a:ext cx="12209205" cy="6624736"/>
+              <a:chOff x="1630000" y="21836311"/>
+              <a:chExt cx="12306202" cy="6624736"/>
+            </a:xfrm>
+          </p:grpSpPr>
+          <p:sp>
+            <p:nvSpPr>
+              <p:cNvPr id="74" name="Rechteck 73"/>
+              <p:cNvSpPr/>
+              <p:nvPr/>
+            </p:nvSpPr>
+            <p:spPr>
+              <a:xfrm>
+                <a:off x="1630000" y="21836311"/>
+                <a:ext cx="12306202" cy="6624736"/>
+              </a:xfrm>
+              <a:prstGeom prst="rect">
+                <a:avLst/>
+              </a:prstGeom>
+              <a:solidFill>
+                <a:srgbClr val="002060">
+                  <a:alpha val="5000"/>
+                </a:srgbClr>
+              </a:solidFill>
+              <a:ln>
+                <a:solidFill>
+                  <a:srgbClr val="000000"/>
+                </a:solidFill>
+              </a:ln>
+            </p:spPr>
+            <p:style>
+              <a:lnRef idx="2">
+                <a:schemeClr val="accent1">
+                  <a:shade val="50000"/>
+                </a:schemeClr>
+              </a:lnRef>
+              <a:fillRef idx="1">
+                <a:schemeClr val="accent1"/>
+              </a:fillRef>
+              <a:effectRef idx="0">
+                <a:schemeClr val="accent1"/>
+              </a:effectRef>
+              <a:fontRef idx="minor">
+                <a:schemeClr val="lt1"/>
+              </a:fontRef>
+            </p:style>
+            <p:txBody>
+              <a:bodyPr rtlCol="0" anchor="ctr"/>
+              <a:lstStyle/>
+              <a:p>
+                <a:pPr algn="ctr"/>
+                <a:endParaRPr lang="de-DE"/>
+              </a:p>
+            </p:txBody>
+          </p:sp>
+          <p:pic>
+            <p:nvPicPr>
+              <p:cNvPr id="48" name="Grafik 47" descr="https://dri1.img.digitalrivercontent.net/Storefront/Company/msintl/images/English/en-INTL-Parrot-Bebop-Drone-2-White-Cntrlr-Bndl-QK9-00022/en-INTL-L-Parrot-Bebop-Drone-2-White-Cntrlr-Bndl-QK9-00022-RM5-mnco.jpg"/>
+              <p:cNvPicPr>
+                <a:picLocks noChangeAspect="1"/>
+              </p:cNvPicPr>
+              <p:nvPr/>
+            </p:nvPicPr>
+            <p:blipFill rotWithShape="1">
+              <a:blip r:embed="rId10" cstate="print">
+                <a:clrChange>
+                  <a:clrFrom>
+                    <a:srgbClr val="FFFFFF"/>
+                  </a:clrFrom>
+                  <a:clrTo>
+                    <a:srgbClr val="FFFFFF">
+                      <a:alpha val="0"/>
+                    </a:srgbClr>
+                  </a:clrTo>
+                </a:clrChange>
+                <a:extLst>
+                  <a:ext uri="{28A0092B-C50C-407E-A947-70E740481C1C}">
+                    <a14:useLocalDpi xmlns:a14="http://schemas.microsoft.com/office/drawing/2010/main" val="0"/>
+                  </a:ext>
+                </a:extLst>
+              </a:blip>
+              <a:srcRect l="9830" t="26205" r="14828" b="29217"/>
+              <a:stretch/>
+            </p:blipFill>
+            <p:spPr bwMode="auto">
+              <a:xfrm>
+                <a:off x="9999352" y="23025018"/>
+                <a:ext cx="3701160" cy="1288727"/>
+              </a:xfrm>
+              <a:prstGeom prst="rect">
+                <a:avLst/>
+              </a:prstGeom>
+              <a:noFill/>
+              <a:ln>
+                <a:noFill/>
+              </a:ln>
+              <a:extLst>
+                <a:ext uri="{53640926-AAD7-44D8-BBD7-CCE9431645EC}">
+                  <a14:shadowObscured xmlns:a14="http://schemas.microsoft.com/office/drawing/2010/main"/>
+                </a:ext>
+              </a:extLst>
+            </p:spPr>
+          </p:pic>
+          <p:pic>
+            <p:nvPicPr>
+              <p:cNvPr id="50" name="Grafik 49"/>
+              <p:cNvPicPr>
+                <a:picLocks noChangeAspect="1"/>
+              </p:cNvPicPr>
+              <p:nvPr/>
+            </p:nvPicPr>
+            <p:blipFill>
+              <a:blip r:embed="rId11" cstate="print">
+                <a:extLst>
+                  <a:ext uri="{28A0092B-C50C-407E-A947-70E740481C1C}">
+                    <a14:useLocalDpi xmlns:a14="http://schemas.microsoft.com/office/drawing/2010/main" val="0"/>
+                  </a:ext>
+                </a:extLst>
+              </a:blip>
+              <a:stretch>
+                <a:fillRect/>
+              </a:stretch>
+            </p:blipFill>
+            <p:spPr>
+              <a:xfrm>
+                <a:off x="6669543" y="22124343"/>
+                <a:ext cx="2457820" cy="2071328"/>
+              </a:xfrm>
+              <a:prstGeom prst="rect">
+                <a:avLst/>
+              </a:prstGeom>
+              <a:ln>
+                <a:noFill/>
+              </a:ln>
+            </p:spPr>
+          </p:pic>
+          <p:pic>
+            <p:nvPicPr>
+              <p:cNvPr id="51" name="Grafik 50" descr="Joystick, Game Controller, Spiel, Kontrolle, Gerät"/>
+              <p:cNvPicPr>
+                <a:picLocks noChangeAspect="1"/>
+              </p:cNvPicPr>
+              <p:nvPr/>
+            </p:nvPicPr>
+            <p:blipFill>
+              <a:blip r:embed="rId12" cstate="print">
+                <a:extLst>
+                  <a:ext uri="{BEBA8EAE-BF5A-486C-A8C5-ECC9F3942E4B}">
+                    <a14:imgProps xmlns:a14="http://schemas.microsoft.com/office/drawing/2010/main">
+                      <a14:imgLayer r:embed="rId13">
+                        <a14:imgEffect>
+                          <a14:artisticPlasticWrap/>
+                        </a14:imgEffect>
+                      </a14:imgLayer>
+                    </a14:imgProps>
+                  </a:ext>
+                  <a:ext uri="{28A0092B-C50C-407E-A947-70E740481C1C}">
+                    <a14:useLocalDpi xmlns:a14="http://schemas.microsoft.com/office/drawing/2010/main" val="0"/>
+                  </a:ext>
+                </a:extLst>
+              </a:blip>
+              <a:srcRect/>
+              <a:stretch>
+                <a:fillRect/>
+              </a:stretch>
+            </p:blipFill>
+            <p:spPr bwMode="auto">
+              <a:xfrm>
+                <a:off x="8072584" y="26369706"/>
+                <a:ext cx="1529157" cy="1572310"/>
+              </a:xfrm>
+              <a:prstGeom prst="rect">
+                <a:avLst/>
+              </a:prstGeom>
+              <a:noFill/>
+              <a:ln>
+                <a:noFill/>
+              </a:ln>
+            </p:spPr>
+          </p:pic>
+          <p:pic>
+            <p:nvPicPr>
+              <p:cNvPr id="52" name="Grafik 51"/>
+              <p:cNvPicPr>
+                <a:picLocks noChangeAspect="1"/>
+              </p:cNvPicPr>
+              <p:nvPr/>
+            </p:nvPicPr>
+            <p:blipFill>
+              <a:blip r:embed="rId14" cstate="print">
+                <a:extLst>
+                  <a:ext uri="{BEBA8EAE-BF5A-486C-A8C5-ECC9F3942E4B}">
+                    <a14:imgProps xmlns:a14="http://schemas.microsoft.com/office/drawing/2010/main">
+                      <a14:imgLayer r:embed="rId15">
+                        <a14:imgEffect>
+                          <a14:artisticPlasticWrap/>
+                        </a14:imgEffect>
+                      </a14:imgLayer>
+                    </a14:imgProps>
+                  </a:ext>
+                  <a:ext uri="{28A0092B-C50C-407E-A947-70E740481C1C}">
+                    <a14:useLocalDpi xmlns:a14="http://schemas.microsoft.com/office/drawing/2010/main" val="0"/>
+                  </a:ext>
+                </a:extLst>
+              </a:blip>
+              <a:stretch>
+                <a:fillRect/>
+              </a:stretch>
+            </p:blipFill>
+            <p:spPr>
+              <a:xfrm>
+                <a:off x="5912847" y="26551763"/>
+                <a:ext cx="1513393" cy="1390253"/>
+              </a:xfrm>
+              <a:prstGeom prst="rect">
+                <a:avLst/>
+              </a:prstGeom>
+              <a:ln>
+                <a:noFill/>
+              </a:ln>
+            </p:spPr>
+          </p:pic>
+          <p:pic>
+            <p:nvPicPr>
+              <p:cNvPr id="53" name="Grafik 52"/>
+              <p:cNvPicPr>
+                <a:picLocks noChangeAspect="1"/>
+              </p:cNvPicPr>
+              <p:nvPr/>
+            </p:nvPicPr>
+            <p:blipFill>
+              <a:blip r:embed="rId16" cstate="print">
+                <a:extLst>
+                  <a:ext uri="{28A0092B-C50C-407E-A947-70E740481C1C}">
+                    <a14:useLocalDpi xmlns:a14="http://schemas.microsoft.com/office/drawing/2010/main" val="0"/>
+                  </a:ext>
+                </a:extLst>
+              </a:blip>
+              <a:stretch>
+                <a:fillRect/>
+              </a:stretch>
+            </p:blipFill>
+            <p:spPr>
+              <a:xfrm>
+                <a:off x="1908662" y="26783472"/>
+                <a:ext cx="3294782" cy="1158544"/>
+              </a:xfrm>
+              <a:prstGeom prst="rect">
+                <a:avLst/>
+              </a:prstGeom>
+              <a:ln>
+                <a:noFill/>
+              </a:ln>
+            </p:spPr>
+          </p:pic>
+          <p:pic>
+            <p:nvPicPr>
+              <p:cNvPr id="57" name="Grafik 56" descr="C:\Users\Puderer\AppData\Local\Microsoft\Windows\INetCache\IE\A3QJ7VIY\wireless-connection-icon[1].jpg"/>
+              <p:cNvPicPr>
+                <a:picLocks noChangeAspect="1"/>
+              </p:cNvPicPr>
+              <p:nvPr/>
+            </p:nvPicPr>
+            <p:blipFill rotWithShape="1">
+              <a:blip r:embed="rId17" cstate="print">
+                <a:clrChange>
+                  <a:clrFrom>
+                    <a:srgbClr val="FFFFFF"/>
+                  </a:clrFrom>
+                  <a:clrTo>
+                    <a:srgbClr val="FFFFFF">
+                      <a:alpha val="0"/>
+                    </a:srgbClr>
+                  </a:clrTo>
+                </a:clrChange>
+                <a:extLst>
+                  <a:ext uri="{BEBA8EAE-BF5A-486C-A8C5-ECC9F3942E4B}">
+                    <a14:imgProps xmlns:a14="http://schemas.microsoft.com/office/drawing/2010/main">
+                      <a14:imgLayer r:embed="rId18">
+                        <a14:imgEffect>
+                          <a14:saturation sat="0"/>
+                        </a14:imgEffect>
+                      </a14:imgLayer>
+                    </a14:imgProps>
+                  </a:ext>
+                  <a:ext uri="{28A0092B-C50C-407E-A947-70E740481C1C}">
+                    <a14:useLocalDpi xmlns:a14="http://schemas.microsoft.com/office/drawing/2010/main" val="0"/>
+                  </a:ext>
+                </a:extLst>
+              </a:blip>
+              <a:srcRect l="11755" t="7454" r="9602" b="5383"/>
+              <a:stretch/>
+            </p:blipFill>
+            <p:spPr bwMode="auto">
+              <a:xfrm>
+                <a:off x="11382314" y="22052335"/>
+                <a:ext cx="915972" cy="873913"/>
+              </a:xfrm>
+              <a:prstGeom prst="rect">
+                <a:avLst/>
+              </a:prstGeom>
+              <a:noFill/>
+              <a:ln>
+                <a:noFill/>
+              </a:ln>
+              <a:extLst>
+                <a:ext uri="{53640926-AAD7-44D8-BBD7-CCE9431645EC}">
+                  <a14:shadowObscured xmlns:a14="http://schemas.microsoft.com/office/drawing/2010/main"/>
+                </a:ext>
+              </a:extLst>
+            </p:spPr>
+          </p:pic>
+          <p:pic>
+            <p:nvPicPr>
+              <p:cNvPr id="63" name="Grafik 62" descr="C:\Users\Puderer\AppData\Local\Microsoft\Windows\INetCache\IE\DW9SJ4A0\bluetooth[1].png"/>
+              <p:cNvPicPr>
+                <a:picLocks noChangeAspect="1"/>
+              </p:cNvPicPr>
+              <p:nvPr/>
+            </p:nvPicPr>
+            <p:blipFill rotWithShape="1">
+              <a:blip r:embed="rId19" cstate="print">
+                <a:extLst>
+                  <a:ext uri="{28A0092B-C50C-407E-A947-70E740481C1C}">
+                    <a14:useLocalDpi xmlns:a14="http://schemas.microsoft.com/office/drawing/2010/main" val="0"/>
+                  </a:ext>
+                </a:extLst>
+              </a:blip>
+              <a:srcRect l="16423" t="8211" r="16716" b="8211"/>
+              <a:stretch/>
+            </p:blipFill>
+            <p:spPr bwMode="auto">
+              <a:xfrm>
+                <a:off x="13159605" y="25889738"/>
+                <a:ext cx="425642" cy="562721"/>
+              </a:xfrm>
+              <a:prstGeom prst="rect">
+                <a:avLst/>
+              </a:prstGeom>
+              <a:noFill/>
+              <a:ln>
+                <a:solidFill>
+                  <a:srgbClr val="000000"/>
+                </a:solidFill>
+              </a:ln>
+              <a:extLst>
+                <a:ext uri="{53640926-AAD7-44D8-BBD7-CCE9431645EC}">
+                  <a14:shadowObscured xmlns:a14="http://schemas.microsoft.com/office/drawing/2010/main"/>
+                </a:ext>
+              </a:extLst>
+            </p:spPr>
+          </p:pic>
+          <p:pic>
+            <p:nvPicPr>
+              <p:cNvPr id="64" name="Grafik 63" descr="C:\Users\Puderer\AppData\Local\Microsoft\Windows\INetCache\IE\DW9SJ4A0\1280px-USB_Icon.svg[1].png"/>
+              <p:cNvPicPr>
+                <a:picLocks noChangeAspect="1"/>
+              </p:cNvPicPr>
+              <p:nvPr/>
+            </p:nvPicPr>
+            <p:blipFill>
+              <a:blip r:embed="rId20" cstate="print">
+                <a:extLst>
+                  <a:ext uri="{28A0092B-C50C-407E-A947-70E740481C1C}">
+                    <a14:useLocalDpi xmlns:a14="http://schemas.microsoft.com/office/drawing/2010/main" val="0"/>
+                  </a:ext>
+                </a:extLst>
+              </a:blip>
+              <a:srcRect/>
+              <a:stretch>
+                <a:fillRect/>
+              </a:stretch>
+            </p:blipFill>
+            <p:spPr bwMode="auto">
+              <a:xfrm>
+                <a:off x="1845604" y="25889738"/>
+                <a:ext cx="882812" cy="446867"/>
+              </a:xfrm>
+              <a:prstGeom prst="rect">
+                <a:avLst/>
+              </a:prstGeom>
+              <a:noFill/>
+              <a:ln>
+                <a:solidFill>
+                  <a:srgbClr val="000000"/>
+                </a:solidFill>
+              </a:ln>
+            </p:spPr>
+          </p:pic>
+          <p:sp>
+            <p:nvSpPr>
+              <p:cNvPr id="65" name="Rechteck 64"/>
+              <p:cNvSpPr/>
+              <p:nvPr/>
+            </p:nvSpPr>
+            <p:spPr>
+              <a:xfrm>
+                <a:off x="1782546" y="25823535"/>
+                <a:ext cx="7929546" cy="2432943"/>
+              </a:xfrm>
+              <a:prstGeom prst="rect">
+                <a:avLst/>
+              </a:prstGeom>
+              <a:noFill/>
+              <a:ln>
+                <a:solidFill>
+                  <a:srgbClr val="000000"/>
+                </a:solidFill>
+                <a:prstDash val="dash"/>
+              </a:ln>
+            </p:spPr>
+            <p:style>
+              <a:lnRef idx="2">
+                <a:schemeClr val="accent1">
+                  <a:shade val="50000"/>
+                </a:schemeClr>
+              </a:lnRef>
+              <a:fillRef idx="1">
+                <a:schemeClr val="accent1"/>
+              </a:fillRef>
+              <a:effectRef idx="0">
+                <a:schemeClr val="accent1"/>
+              </a:effectRef>
+              <a:fontRef idx="minor">
+                <a:schemeClr val="lt1"/>
+              </a:fontRef>
+            </p:style>
+            <p:txBody>
+              <a:bodyPr rot="0" spcFirstLastPara="0" vert="horz" wrap="square" lIns="91440" tIns="45720" rIns="91440" bIns="45720" numCol="1" spcCol="0" rtlCol="0" fromWordArt="0" anchor="ctr" anchorCtr="0" forceAA="0" compatLnSpc="1">
+                <a:prstTxWarp prst="textNoShape">
+                  <a:avLst/>
+                </a:prstTxWarp>
+                <a:noAutofit/>
+              </a:bodyPr>
+              <a:lstStyle/>
+              <a:p>
+                <a:endParaRPr lang="de-DE"/>
+              </a:p>
+            </p:txBody>
+          </p:sp>
+          <p:sp>
+            <p:nvSpPr>
+              <p:cNvPr id="66" name="Rechteck 65"/>
+              <p:cNvSpPr/>
+              <p:nvPr/>
+            </p:nvSpPr>
+            <p:spPr>
+              <a:xfrm>
+                <a:off x="9980089" y="25823535"/>
+                <a:ext cx="3720423" cy="2432943"/>
+              </a:xfrm>
+              <a:prstGeom prst="rect">
+                <a:avLst/>
+              </a:prstGeom>
+              <a:noFill/>
+              <a:ln>
+                <a:solidFill>
+                  <a:srgbClr val="000000"/>
+                </a:solidFill>
+                <a:prstDash val="dash"/>
+              </a:ln>
+            </p:spPr>
+            <p:style>
+              <a:lnRef idx="2">
+                <a:schemeClr val="accent6">
+                  <a:shade val="50000"/>
+                </a:schemeClr>
+              </a:lnRef>
+              <a:fillRef idx="1">
+                <a:schemeClr val="accent6"/>
+              </a:fillRef>
+              <a:effectRef idx="0">
+                <a:schemeClr val="accent6"/>
+              </a:effectRef>
+              <a:fontRef idx="minor">
+                <a:schemeClr val="lt1"/>
+              </a:fontRef>
+            </p:style>
+            <p:txBody>
+              <a:bodyPr rot="0" spcFirstLastPara="0" vert="horz" wrap="square" lIns="91440" tIns="45720" rIns="91440" bIns="45720" numCol="1" spcCol="0" rtlCol="0" fromWordArt="0" anchor="ctr" anchorCtr="0" forceAA="0" compatLnSpc="1">
+                <a:prstTxWarp prst="textNoShape">
+                  <a:avLst/>
+                </a:prstTxWarp>
+                <a:noAutofit/>
+              </a:bodyPr>
+              <a:lstStyle/>
+              <a:p>
+                <a:endParaRPr lang="de-DE"/>
+              </a:p>
+            </p:txBody>
+          </p:sp>
+          <p:sp>
+            <p:nvSpPr>
+              <p:cNvPr id="11" name="Pfeil nach oben 10"/>
+              <p:cNvSpPr/>
+              <p:nvPr/>
+            </p:nvSpPr>
+            <p:spPr>
+              <a:xfrm>
+                <a:off x="6907313" y="24428599"/>
+                <a:ext cx="1774385" cy="647868"/>
+              </a:xfrm>
+              <a:prstGeom prst="upArrow">
+                <a:avLst/>
+              </a:prstGeom>
+              <a:ln>
+                <a:solidFill>
+                  <a:srgbClr val="000000"/>
+                </a:solidFill>
+              </a:ln>
+            </p:spPr>
+            <p:style>
+              <a:lnRef idx="2">
+                <a:schemeClr val="accent1">
+                  <a:shade val="50000"/>
+                </a:schemeClr>
+              </a:lnRef>
+              <a:fillRef idx="1">
+                <a:schemeClr val="accent1"/>
+              </a:fillRef>
+              <a:effectRef idx="0">
+                <a:schemeClr val="accent1"/>
+              </a:effectRef>
+              <a:fontRef idx="minor">
+                <a:schemeClr val="lt1"/>
+              </a:fontRef>
+            </p:style>
+            <p:txBody>
+              <a:bodyPr rtlCol="0" anchor="ctr"/>
+              <a:lstStyle/>
+              <a:p>
+                <a:pPr algn="ctr"/>
+                <a:endParaRPr lang="de-DE"/>
+              </a:p>
+            </p:txBody>
+          </p:sp>
+          <p:sp>
+            <p:nvSpPr>
+              <p:cNvPr id="68" name="Pfeil nach oben 67"/>
+              <p:cNvSpPr/>
+              <p:nvPr/>
+            </p:nvSpPr>
+            <p:spPr>
+              <a:xfrm rot="5400000">
+                <a:off x="9005471" y="22957016"/>
+                <a:ext cx="1180090" cy="647868"/>
+              </a:xfrm>
+              <a:prstGeom prst="upArrow">
+                <a:avLst/>
+              </a:prstGeom>
+              <a:ln>
+                <a:solidFill>
+                  <a:srgbClr val="000000"/>
+                </a:solidFill>
+              </a:ln>
+            </p:spPr>
+            <p:style>
+              <a:lnRef idx="2">
+                <a:schemeClr val="accent1">
+                  <a:shade val="50000"/>
+                </a:schemeClr>
+              </a:lnRef>
+              <a:fillRef idx="1">
+                <a:schemeClr val="accent1"/>
+              </a:fillRef>
+              <a:effectRef idx="0">
+                <a:schemeClr val="accent1"/>
+              </a:effectRef>
+              <a:fontRef idx="minor">
+                <a:schemeClr val="lt1"/>
+              </a:fontRef>
+            </p:style>
+            <p:txBody>
+              <a:bodyPr rtlCol="0" anchor="ctr"/>
+              <a:lstStyle/>
+              <a:p>
+                <a:pPr algn="ctr"/>
+                <a:endParaRPr lang="de-DE"/>
+              </a:p>
+            </p:txBody>
+          </p:sp>
+        </p:grpSp>
+        <p:pic>
+          <p:nvPicPr>
+            <p:cNvPr id="1032" name="Picture 8"/>
+            <p:cNvPicPr>
+              <a:picLocks noChangeAspect="1" noChangeArrowheads="1"/>
+            </p:cNvPicPr>
+            <p:nvPr/>
+          </p:nvPicPr>
+          <p:blipFill>
+            <a:blip r:embed="rId21" cstate="print">
+              <a:extLst>
+                <a:ext uri="{28A0092B-C50C-407E-A947-70E740481C1C}">
+                  <a14:useLocalDpi xmlns:a14="http://schemas.microsoft.com/office/drawing/2010/main" val="0"/>
+                </a:ext>
+              </a:extLst>
+            </a:blip>
+            <a:srcRect/>
+            <a:stretch>
+              <a:fillRect/>
+            </a:stretch>
+          </p:blipFill>
+          <p:spPr bwMode="auto">
+            <a:xfrm>
+              <a:off x="36886046" y="27335606"/>
+              <a:ext cx="2724150" cy="1809750"/>
+            </a:xfrm>
+            <a:prstGeom prst="rect">
+              <a:avLst/>
+            </a:prstGeom>
+            <a:noFill/>
+            <a:ln>
+              <a:noFill/>
+            </a:ln>
+            <a:effectLst/>
             <a:extLst>
-              <a:ext uri="{28A0092B-C50C-407E-A947-70E740481C1C}">
-                <a14:useLocalDpi xmlns="" xmlns:a14="http://schemas.microsoft.com/office/drawing/2010/main" val="0"/>
+              <a:ext uri="{909E8E84-426E-40DD-AFC4-6F175D3DCCD1}">
+                <a14:hiddenFill xmlns:a14="http://schemas.microsoft.com/office/drawing/2010/main">
+                  <a:solidFill>
+                    <a:schemeClr val="accent1"/>
+                  </a:solidFill>
+                </a14:hiddenFill>
+              </a:ext>
+              <a:ext uri="{91240B29-F687-4F45-9708-019B960494DF}">
+                <a14:hiddenLine xmlns:a14="http://schemas.microsoft.com/office/drawing/2010/main" w="9525">
+                  <a:solidFill>
+                    <a:schemeClr val="tx1"/>
+                  </a:solidFill>
+                  <a:miter lim="800000"/>
+                  <a:headEnd/>
+                  <a:tailEnd/>
+                </a14:hiddenLine>
+              </a:ext>
+              <a:ext uri="{AF507438-7753-43E0-B8FC-AC1667EBCBE1}">
+                <a14:hiddenEffects xmlns:a14="http://schemas.microsoft.com/office/drawing/2010/main">
+                  <a:effectLst>
+                    <a:outerShdw dist="35921" dir="2700000" algn="ctr" rotWithShape="0">
+                      <a:schemeClr val="bg2"/>
+                    </a:outerShdw>
+                  </a:effectLst>
+                </a14:hiddenEffects>
               </a:ext>
             </a:extLst>
-          </a:blip>
-          <a:srcRect/>
-          <a:stretch>
-            <a:fillRect/>
-          </a:stretch>
-        </p:blipFill>
-        <p:spPr bwMode="auto">
+          </p:spPr>
+        </p:pic>
+      </p:grpSp>
+      <p:sp>
+        <p:nvSpPr>
+          <p:cNvPr id="38" name="Textfeld 37"/>
+          <p:cNvSpPr txBox="1"/>
+          <p:nvPr/>
+        </p:nvSpPr>
+        <p:spPr>
           <a:xfrm>
-            <a:off x="10675491" y="27596950"/>
-            <a:ext cx="2724150" cy="1809750"/>
+            <a:off x="1674491" y="24068558"/>
+            <a:ext cx="12529392" cy="923330"/>
           </a:xfrm>
           <a:prstGeom prst="rect">
             <a:avLst/>
           </a:prstGeom>
           <a:noFill/>
-          <a:ln>
-            <a:noFill/>
-          </a:ln>
-          <a:effectLst/>
-          <a:extLst>
-            <a:ext uri="{909E8E84-426E-40DD-AFC4-6F175D3DCCD1}">
-              <a14:hiddenFill xmlns="" xmlns:a14="http://schemas.microsoft.com/office/drawing/2010/main">
-                <a:solidFill>
-                  <a:schemeClr val="accent1"/>
-                </a:solidFill>
-              </a14:hiddenFill>
-            </a:ext>
-            <a:ext uri="{91240B29-F687-4F45-9708-019B960494DF}">
-              <a14:hiddenLine xmlns="" xmlns:a14="http://schemas.microsoft.com/office/drawing/2010/main" w="9525">
-                <a:solidFill>
-                  <a:schemeClr val="tx1"/>
-                </a:solidFill>
-                <a:miter lim="800000"/>
-                <a:headEnd/>
-                <a:tailEnd/>
-              </a14:hiddenLine>
-            </a:ext>
-            <a:ext uri="{AF507438-7753-43E0-B8FC-AC1667EBCBE1}">
-              <a14:hiddenEffects xmlns="" xmlns:a14="http://schemas.microsoft.com/office/drawing/2010/main">
-                <a:effectLst>
-                  <a:outerShdw dist="35921" dir="2700000" algn="ctr" rotWithShape="0">
-                    <a:schemeClr val="bg2"/>
-                  </a:outerShdw>
-                </a:effectLst>
-              </a14:hiddenEffects>
-            </a:ext>
-          </a:extLst>
         </p:spPr>
-      </p:pic>
+        <p:txBody>
+          <a:bodyPr wrap="square" rtlCol="0">
+            <a:spAutoFit/>
+          </a:bodyPr>
+          <a:lstStyle/>
+          <a:p>
+            <a:r>
+              <a:rPr lang="de-DE" sz="5400" dirty="0" smtClean="0">
+                <a:solidFill>
+                  <a:schemeClr val="accent5"/>
+                </a:solidFill>
+                <a:latin typeface="+mj-lt"/>
+                <a:cs typeface="Times New Roman" pitchFamily="18" charset="0"/>
+              </a:rPr>
+              <a:t>Die Umsetzung</a:t>
+            </a:r>
+            <a:endParaRPr lang="de-DE" sz="5400" dirty="0" smtClean="0">
+              <a:solidFill>
+                <a:schemeClr val="accent5"/>
+              </a:solidFill>
+              <a:latin typeface="+mj-lt"/>
+              <a:cs typeface="Times New Roman" pitchFamily="18" charset="0"/>
+            </a:endParaRPr>
+          </a:p>
+        </p:txBody>
+      </p:sp>
+      <p:sp>
+        <p:nvSpPr>
+          <p:cNvPr id="45" name="Textfeld 44"/>
+          <p:cNvSpPr txBox="1"/>
+          <p:nvPr/>
+        </p:nvSpPr>
+        <p:spPr>
+          <a:xfrm>
+            <a:off x="15758296" y="9006112"/>
+            <a:ext cx="12529392" cy="1477328"/>
+          </a:xfrm>
+          <a:prstGeom prst="rect">
+            <a:avLst/>
+          </a:prstGeom>
+          <a:noFill/>
+        </p:spPr>
+        <p:txBody>
+          <a:bodyPr wrap="square" rtlCol="0">
+            <a:spAutoFit/>
+          </a:bodyPr>
+          <a:lstStyle/>
+          <a:p>
+            <a:pPr algn="just"/>
+            <a:r>
+              <a:rPr lang="de-DE" sz="3000" dirty="0" smtClean="0"/>
+              <a:t>Die </a:t>
+            </a:r>
+            <a:r>
+              <a:rPr lang="de-DE" sz="3000" dirty="0" smtClean="0"/>
+              <a:t>Hauptkomponenten funktionieren auch unter Windows und MacOS, wobei das Balance Board unter Windows nur mit einem passenden JSR082 Bluetooth Stack (z.B. </a:t>
+            </a:r>
+            <a:r>
+              <a:rPr lang="de-DE" sz="3000" dirty="0" err="1" smtClean="0"/>
+              <a:t>Widcomm</a:t>
+            </a:r>
+            <a:r>
+              <a:rPr lang="de-DE" sz="3000" dirty="0" smtClean="0"/>
+              <a:t>) anzubinden ist.</a:t>
+            </a:r>
+          </a:p>
+        </p:txBody>
+      </p:sp>
+      <p:sp>
+        <p:nvSpPr>
+          <p:cNvPr id="46" name="Textfeld 45"/>
+          <p:cNvSpPr txBox="1"/>
+          <p:nvPr/>
+        </p:nvSpPr>
+        <p:spPr>
+          <a:xfrm>
+            <a:off x="1630000" y="36416766"/>
+            <a:ext cx="12529392" cy="1477328"/>
+          </a:xfrm>
+          <a:prstGeom prst="rect">
+            <a:avLst/>
+          </a:prstGeom>
+          <a:noFill/>
+        </p:spPr>
+        <p:txBody>
+          <a:bodyPr wrap="square" rtlCol="0">
+            <a:spAutoFit/>
+          </a:bodyPr>
+          <a:lstStyle/>
+          <a:p>
+            <a:pPr algn="just"/>
+            <a:r>
+              <a:rPr lang="de-DE" sz="3000" dirty="0" smtClean="0"/>
+              <a:t>Zielplattform </a:t>
+            </a:r>
+            <a:r>
+              <a:rPr lang="de-DE" sz="3000" dirty="0"/>
+              <a:t>des Projekts ist eine der verbreiteten </a:t>
+            </a:r>
+            <a:r>
+              <a:rPr lang="de-DE" sz="3000" dirty="0" err="1"/>
+              <a:t>Linuxdistributionen</a:t>
+            </a:r>
+            <a:r>
+              <a:rPr lang="de-DE" sz="3000" dirty="0"/>
+              <a:t> (z.B. Debian oder Ubuntu) auf einem </a:t>
+            </a:r>
+            <a:r>
+              <a:rPr lang="de-DE" sz="3000" dirty="0" smtClean="0"/>
+              <a:t>Laptop, </a:t>
+            </a:r>
+            <a:r>
+              <a:rPr lang="de-DE" sz="3000" dirty="0"/>
+              <a:t>da </a:t>
+            </a:r>
+            <a:r>
+              <a:rPr lang="de-DE" sz="3000" dirty="0" smtClean="0"/>
+              <a:t>hier alle </a:t>
+            </a:r>
+            <a:r>
+              <a:rPr lang="de-DE" sz="3000" dirty="0"/>
+              <a:t>benötigten Komponenten problemlos anzubinden sind. </a:t>
+            </a:r>
+            <a:endParaRPr lang="de-DE" sz="3000" dirty="0" smtClean="0"/>
+          </a:p>
+        </p:txBody>
+      </p:sp>
+      <p:sp>
+        <p:nvSpPr>
+          <p:cNvPr id="47" name="Textfeld 46"/>
+          <p:cNvSpPr txBox="1"/>
+          <p:nvPr/>
+        </p:nvSpPr>
+        <p:spPr>
+          <a:xfrm>
+            <a:off x="3638274" y="28800749"/>
+            <a:ext cx="2932761" cy="1748529"/>
+          </a:xfrm>
+          <a:prstGeom prst="rect">
+            <a:avLst/>
+          </a:prstGeom>
+          <a:noFill/>
+        </p:spPr>
+        <p:txBody>
+          <a:bodyPr wrap="square" bIns="360000" numCol="1" spcCol="720000" rtlCol="0">
+            <a:noAutofit/>
+          </a:bodyPr>
+          <a:lstStyle/>
+          <a:p>
+            <a:pPr algn="ctr">
+              <a:lnSpc>
+                <a:spcPts val="3800"/>
+              </a:lnSpc>
+            </a:pPr>
+            <a:r>
+              <a:rPr lang="de-DE" sz="3000" b="1" dirty="0" smtClean="0">
+                <a:solidFill>
+                  <a:srgbClr val="262626"/>
+                </a:solidFill>
+              </a:rPr>
+              <a:t>Tower</a:t>
+            </a:r>
+          </a:p>
+          <a:p>
+            <a:pPr algn="ctr">
+              <a:lnSpc>
+                <a:spcPts val="3800"/>
+              </a:lnSpc>
+            </a:pPr>
+            <a:r>
+              <a:rPr lang="de-DE" sz="3000" dirty="0" smtClean="0"/>
+              <a:t>(zentrale </a:t>
+            </a:r>
+          </a:p>
+          <a:p>
+            <a:pPr algn="ctr">
+              <a:lnSpc>
+                <a:spcPts val="3800"/>
+              </a:lnSpc>
+            </a:pPr>
+            <a:r>
+              <a:rPr lang="de-DE" sz="3000" dirty="0" smtClean="0"/>
+              <a:t>Steuereinheit)</a:t>
+            </a:r>
+            <a:endParaRPr lang="de-DE" sz="3000" dirty="0" smtClean="0">
+              <a:solidFill>
+                <a:srgbClr val="262626"/>
+              </a:solidFill>
+            </a:endParaRPr>
+          </a:p>
+        </p:txBody>
+      </p:sp>
+      <p:sp>
+        <p:nvSpPr>
+          <p:cNvPr id="49" name="Textfeld 48"/>
+          <p:cNvSpPr txBox="1"/>
+          <p:nvPr/>
+        </p:nvSpPr>
+        <p:spPr>
+          <a:xfrm>
+            <a:off x="6324026" y="31485382"/>
+            <a:ext cx="2932761" cy="581692"/>
+          </a:xfrm>
+          <a:prstGeom prst="rect">
+            <a:avLst/>
+          </a:prstGeom>
+          <a:noFill/>
+        </p:spPr>
+        <p:txBody>
+          <a:bodyPr wrap="square" bIns="360000" numCol="1" spcCol="720000" rtlCol="0">
+            <a:noAutofit/>
+          </a:bodyPr>
+          <a:lstStyle/>
+          <a:p>
+            <a:pPr algn="ctr">
+              <a:lnSpc>
+                <a:spcPts val="3800"/>
+              </a:lnSpc>
+            </a:pPr>
+            <a:r>
+              <a:rPr lang="de-DE" sz="3000" b="1" dirty="0" smtClean="0">
+                <a:solidFill>
+                  <a:srgbClr val="262626"/>
+                </a:solidFill>
+              </a:rPr>
+              <a:t>Eingabegeräte</a:t>
+            </a:r>
+            <a:endParaRPr lang="de-DE" sz="3000" dirty="0" smtClean="0">
+              <a:solidFill>
+                <a:srgbClr val="262626"/>
+              </a:solidFill>
+            </a:endParaRPr>
+          </a:p>
+        </p:txBody>
+      </p:sp>
     </p:spTree>
     <p:extLst>
       <p:ext uri="{BB962C8B-B14F-4D97-AF65-F5344CB8AC3E}">
-        <p14:creationId xmlns="" xmlns:p14="http://schemas.microsoft.com/office/powerpoint/2010/main" val="4058847616"/>
+        <p14:creationId xmlns:p14="http://schemas.microsoft.com/office/powerpoint/2010/main" val="4058847616"/>
       </p:ext>
     </p:extLst>
   </p:cSld>

</xml_diff>

<commit_message>
Poster: Unnötige Rahmen in Abbildung 1 entfernt
</commit_message>
<xml_diff>
--- a/doc/Poster.pptx
+++ b/doc/Poster.pptx
@@ -371,7 +371,7 @@
     </p:spTree>
     <p:extLst>
       <p:ext uri="{BB962C8B-B14F-4D97-AF65-F5344CB8AC3E}">
-        <p14:creationId xmlns:p14="http://schemas.microsoft.com/office/powerpoint/2010/main" xmlns="" val="2271319829"/>
+        <p14:creationId xmlns="" xmlns:p14="http://schemas.microsoft.com/office/powerpoint/2010/main" val="2271319829"/>
       </p:ext>
     </p:extLst>
   </p:cSld>
@@ -413,7 +413,7 @@
     </p:spTree>
     <p:extLst>
       <p:ext uri="{BB962C8B-B14F-4D97-AF65-F5344CB8AC3E}">
-        <p14:creationId xmlns:p14="http://schemas.microsoft.com/office/powerpoint/2010/main" xmlns="" val="185692037"/>
+        <p14:creationId xmlns="" xmlns:p14="http://schemas.microsoft.com/office/powerpoint/2010/main" val="185692037"/>
       </p:ext>
     </p:extLst>
   </p:cSld>
@@ -864,13 +864,6 @@
               </a:rPr>
               <a:t>Umsetzung</a:t>
             </a:r>
-            <a:endParaRPr lang="de-DE" sz="5400" dirty="0" smtClean="0">
-              <a:solidFill>
-                <a:schemeClr val="accent5"/>
-              </a:solidFill>
-              <a:latin typeface="+mj-lt"/>
-              <a:cs typeface="Times New Roman" pitchFamily="18" charset="0"/>
-            </a:endParaRPr>
           </a:p>
         </p:txBody>
       </p:sp>
@@ -955,7 +948,15 @@
                   <a:srgbClr val="262626"/>
                 </a:solidFill>
               </a:rPr>
-              <a:t> Joystick und das Wii Balance Board von Nintendo zum </a:t>
+              <a:t> Joystick und das Wii Balance Board von Nintendo zum Einsatz. Fast alle Eingabegeräte werden per USB Kabel mit einer zentralen Steuereinheit (Laptop) verbunden. Die einzige Ausnahme bildet das </a:t>
+            </a:r>
+            <a:r>
+              <a:rPr lang="de-DE" sz="3000" dirty="0" err="1" smtClean="0">
+                <a:solidFill>
+                  <a:srgbClr val="262626"/>
+                </a:solidFill>
+              </a:rPr>
+              <a:t>Wii</a:t>
             </a:r>
             <a:r>
               <a:rPr lang="de-DE" sz="3000" dirty="0" smtClean="0">
@@ -963,71 +964,7 @@
                   <a:srgbClr val="262626"/>
                 </a:solidFill>
               </a:rPr>
-              <a:t>Einsatz. Fast alle Eingabegeräte</a:t>
-            </a:r>
-            <a:r>
-              <a:rPr lang="de-DE" sz="3000" dirty="0" smtClean="0">
-                <a:solidFill>
-                  <a:srgbClr val="262626"/>
-                </a:solidFill>
-              </a:rPr>
-              <a:t> werden per </a:t>
-            </a:r>
-            <a:r>
-              <a:rPr lang="de-DE" sz="3000" dirty="0" smtClean="0">
-                <a:solidFill>
-                  <a:srgbClr val="262626"/>
-                </a:solidFill>
-              </a:rPr>
-              <a:t>USB Kabel mit einer zentralen Steuereinheit </a:t>
-            </a:r>
-            <a:r>
-              <a:rPr lang="de-DE" sz="3000" dirty="0" smtClean="0">
-                <a:solidFill>
-                  <a:srgbClr val="262626"/>
-                </a:solidFill>
-              </a:rPr>
-              <a:t>(Laptop) </a:t>
-            </a:r>
-            <a:r>
-              <a:rPr lang="de-DE" sz="3000" dirty="0" smtClean="0">
-                <a:solidFill>
-                  <a:srgbClr val="262626"/>
-                </a:solidFill>
-              </a:rPr>
-              <a:t>verbunden. </a:t>
-            </a:r>
-            <a:r>
-              <a:rPr lang="de-DE" sz="3000" dirty="0" smtClean="0">
-                <a:solidFill>
-                  <a:srgbClr val="262626"/>
-                </a:solidFill>
-              </a:rPr>
-              <a:t>Die einzige Ausnahme bildet das </a:t>
-            </a:r>
-            <a:r>
-              <a:rPr lang="de-DE" sz="3000" dirty="0" err="1" smtClean="0">
-                <a:solidFill>
-                  <a:srgbClr val="262626"/>
-                </a:solidFill>
-              </a:rPr>
-              <a:t>Wii</a:t>
-            </a:r>
-            <a:r>
-              <a:rPr lang="de-DE" sz="3000" dirty="0" smtClean="0">
-                <a:solidFill>
-                  <a:srgbClr val="262626"/>
-                </a:solidFill>
-              </a:rPr>
-              <a:t> Balance Board, welches per Bluetooth verbunden wird.</a:t>
-            </a:r>
-            <a:r>
-              <a:rPr lang="de-DE" sz="3000" dirty="0" smtClean="0">
-                <a:solidFill>
-                  <a:srgbClr val="262626"/>
-                </a:solidFill>
-              </a:rPr>
-              <a:t>  </a:t>
+              <a:t> Balance Board, welches per Bluetooth verbunden wird.  </a:t>
             </a:r>
             <a:r>
               <a:rPr lang="de-DE" sz="3000" dirty="0" smtClean="0"/>
@@ -1047,11 +984,7 @@
             </a:r>
             <a:r>
               <a:rPr lang="de-DE" sz="3000" dirty="0" smtClean="0"/>
-              <a:t>WLAN-Schnittstelle, welche vom verwendeten Framework angesprochen wird</a:t>
-            </a:r>
-            <a:r>
-              <a:rPr lang="de-DE" sz="3000" dirty="0" smtClean="0"/>
-              <a:t>.</a:t>
+              <a:t>WLAN-Schnittstelle, welche vom verwendeten Framework angesprochen wird.</a:t>
             </a:r>
           </a:p>
           <a:p>
@@ -1145,25 +1078,8 @@
                 <a:latin typeface="+mj-lt"/>
                 <a:cs typeface="Times New Roman" pitchFamily="18" charset="0"/>
               </a:rPr>
-              <a:t>K</a:t>
-            </a:r>
-            <a:r>
-              <a:rPr lang="de-DE" sz="5400" dirty="0" smtClean="0">
-                <a:solidFill>
-                  <a:schemeClr val="accent5"/>
-                </a:solidFill>
-                <a:latin typeface="+mj-lt"/>
-                <a:cs typeface="Times New Roman" pitchFamily="18" charset="0"/>
-              </a:rPr>
-              <a:t>urzfassung</a:t>
-            </a:r>
-            <a:endParaRPr lang="de-DE" sz="5400" dirty="0" smtClean="0">
-              <a:solidFill>
-                <a:schemeClr val="accent5"/>
-              </a:solidFill>
-              <a:latin typeface="+mj-lt"/>
-              <a:cs typeface="Times New Roman" pitchFamily="18" charset="0"/>
-            </a:endParaRPr>
+              <a:t>Kurzfassung</a:t>
+            </a:r>
           </a:p>
         </p:txBody>
       </p:sp>
@@ -1204,15 +1120,7 @@
             </a:r>
             <a:r>
               <a:rPr lang="de-DE" sz="3000" dirty="0" smtClean="0"/>
-              <a:t>angebotene </a:t>
-            </a:r>
-            <a:r>
-              <a:rPr lang="de-DE" sz="3000" dirty="0" smtClean="0"/>
-              <a:t>Smartphone-Applikation </a:t>
-            </a:r>
-            <a:r>
-              <a:rPr lang="de-DE" sz="3000" dirty="0" smtClean="0"/>
-              <a:t>für Android und IOS vorgesehen. Zusätzlich </a:t>
+              <a:t>angebotene Smartphone-Applikation für Android und IOS vorgesehen. Zusätzlich </a:t>
             </a:r>
             <a:r>
               <a:rPr lang="de-DE" sz="3000" dirty="0"/>
@@ -1332,7 +1240,7 @@
           <a:blip r:embed="rId2" cstate="print">
             <a:extLst>
               <a:ext uri="{28A0092B-C50C-407E-A947-70E740481C1C}">
-                <a14:useLocalDpi xmlns:a14="http://schemas.microsoft.com/office/drawing/2010/main" xmlns="" val="0"/>
+                <a14:useLocalDpi xmlns="" xmlns:a14="http://schemas.microsoft.com/office/drawing/2010/main" val="0"/>
               </a:ext>
             </a:extLst>
           </a:blip>
@@ -1350,7 +1258,7 @@
           <a:noFill/>
           <a:extLst>
             <a:ext uri="{909E8E84-426E-40DD-AFC4-6F175D3DCCD1}">
-              <a14:hiddenFill xmlns:a14="http://schemas.microsoft.com/office/drawing/2010/main" xmlns="">
+              <a14:hiddenFill xmlns="" xmlns:a14="http://schemas.microsoft.com/office/drawing/2010/main">
                 <a:solidFill>
                   <a:srgbClr val="FFFFFF"/>
                 </a:solidFill>
@@ -1471,11 +1379,7 @@
             </a:r>
             <a:r>
               <a:rPr lang="de-DE" sz="3000" dirty="0" smtClean="0"/>
-              <a:t>voraus. </a:t>
-            </a:r>
-            <a:r>
-              <a:rPr lang="de-DE" sz="3000" dirty="0" smtClean="0"/>
-              <a:t>Dieser Fall wurde in der vorliegenden Applikation nicht berücksichtigt, da Linux dies direkt unterstützt.</a:t>
+              <a:t>voraus. Dieser Fall wurde in der vorliegenden Applikation nicht berücksichtigt, da Linux dies direkt unterstützt.</a:t>
             </a:r>
           </a:p>
           <a:p>
@@ -1498,39 +1402,7 @@
             </a:r>
             <a:r>
               <a:rPr lang="de-DE" sz="3000" dirty="0" smtClean="0"/>
-              <a:t> Joysticks von Logitech angepasst, obwohl das genutzte </a:t>
-            </a:r>
-            <a:r>
-              <a:rPr lang="de-DE" sz="3000" dirty="0" smtClean="0"/>
-              <a:t>Modul die </a:t>
-            </a:r>
-            <a:r>
-              <a:rPr lang="de-DE" sz="3000" dirty="0" smtClean="0"/>
-              <a:t>Einbindung beliebiger Controller gestattet. Dies liegt darin begründet, dass jeder Controller ein eigenes </a:t>
-            </a:r>
-            <a:r>
-              <a:rPr lang="de-DE" sz="3000" dirty="0" smtClean="0"/>
-              <a:t>Button Layout benutzt. </a:t>
-            </a:r>
-            <a:r>
-              <a:rPr lang="de-DE" sz="3000" dirty="0" smtClean="0"/>
-              <a:t>Bei einer Weiterentwicklung wäre e</a:t>
-            </a:r>
-            <a:r>
-              <a:rPr lang="de-DE" sz="3000" dirty="0" smtClean="0"/>
-              <a:t>ine </a:t>
-            </a:r>
-            <a:r>
-              <a:rPr lang="de-DE" sz="3000" dirty="0" smtClean="0"/>
-              <a:t>Zuweisung der Tasten auf die korrespondierenden Aktionen der Drohne per </a:t>
-            </a:r>
-            <a:r>
-              <a:rPr lang="de-DE" sz="3000" dirty="0" smtClean="0"/>
-              <a:t>Konfigurationsdateien denkbar</a:t>
-            </a:r>
-            <a:r>
-              <a:rPr lang="de-DE" sz="3000" dirty="0" smtClean="0"/>
-              <a:t>.</a:t>
+              <a:t> Joysticks von Logitech angepasst, obwohl das genutzte Modul die Einbindung beliebiger Controller gestattet. Dies liegt darin begründet, dass jeder Controller ein eigenes Button Layout benutzt. Bei einer Weiterentwicklung wäre eine Zuweisung der Tasten auf die korrespondierenden Aktionen der Drohne per Konfigurationsdateien denkbar.</a:t>
             </a:r>
             <a:endParaRPr lang="de-DE" sz="3000" dirty="0">
               <a:solidFill>
@@ -1660,15 +1532,7 @@
                   <a:srgbClr val="262626"/>
                 </a:solidFill>
               </a:rPr>
-              <a:t> </a:t>
-            </a:r>
-            <a:r>
-              <a:rPr lang="en-US" sz="2400" dirty="0" smtClean="0">
-                <a:solidFill>
-                  <a:srgbClr val="262626"/>
-                </a:solidFill>
-              </a:rPr>
-              <a:t> 2016</a:t>
+              <a:t>  2016</a:t>
             </a:r>
             <a:r>
               <a:rPr lang="en-US" sz="2400" dirty="0">
@@ -2116,7 +1980,7 @@
               </a:clrChange>
               <a:extLst>
                 <a:ext uri="{28A0092B-C50C-407E-A947-70E740481C1C}">
-                  <a14:useLocalDpi xmlns:a14="http://schemas.microsoft.com/office/drawing/2010/main" xmlns="" val="0"/>
+                  <a14:useLocalDpi xmlns="" xmlns:a14="http://schemas.microsoft.com/office/drawing/2010/main" val="0"/>
                 </a:ext>
               </a:extLst>
             </a:blip>
@@ -2133,13 +1997,11 @@
             </a:prstGeom>
             <a:noFill/>
             <a:ln>
-              <a:solidFill>
-                <a:srgbClr val="000000"/>
-              </a:solidFill>
+              <a:noFill/>
             </a:ln>
             <a:extLst>
               <a:ext uri="{53640926-AAD7-44D8-BBD7-CCE9431645EC}">
-                <a14:shadowObscured xmlns:a14="http://schemas.microsoft.com/office/drawing/2010/main" xmlns=""/>
+                <a14:shadowObscured xmlns="" xmlns:a14="http://schemas.microsoft.com/office/drawing/2010/main"/>
               </a:ext>
             </a:extLst>
           </p:spPr>
@@ -2156,7 +2018,7 @@
             <a:blip r:embed="rId9" cstate="print">
               <a:extLst>
                 <a:ext uri="{28A0092B-C50C-407E-A947-70E740481C1C}">
-                  <a14:useLocalDpi xmlns:a14="http://schemas.microsoft.com/office/drawing/2010/main" xmlns="" val="0"/>
+                  <a14:useLocalDpi xmlns="" xmlns:a14="http://schemas.microsoft.com/office/drawing/2010/main" val="0"/>
                 </a:ext>
               </a:extLst>
             </a:blip>
@@ -2173,9 +2035,7 @@
               <a:avLst/>
             </a:prstGeom>
             <a:ln>
-              <a:solidFill>
-                <a:srgbClr val="000000"/>
-              </a:solidFill>
+              <a:noFill/>
             </a:ln>
           </p:spPr>
         </p:pic>
@@ -2191,7 +2051,7 @@
             <a:blip r:embed="rId10" cstate="print">
               <a:extLst>
                 <a:ext uri="{BEBA8EAE-BF5A-486C-A8C5-ECC9F3942E4B}">
-                  <a14:imgProps xmlns:a14="http://schemas.microsoft.com/office/drawing/2010/main" xmlns="">
+                  <a14:imgProps xmlns="" xmlns:a14="http://schemas.microsoft.com/office/drawing/2010/main">
                     <a14:imgLayer r:embed="rId11">
                       <a14:imgEffect>
                         <a14:artisticPlasticWrap/>
@@ -2200,7 +2060,7 @@
                   </a14:imgProps>
                 </a:ext>
                 <a:ext uri="{28A0092B-C50C-407E-A947-70E740481C1C}">
-                  <a14:useLocalDpi xmlns:a14="http://schemas.microsoft.com/office/drawing/2010/main" xmlns="" val="0"/>
+                  <a14:useLocalDpi xmlns="" xmlns:a14="http://schemas.microsoft.com/office/drawing/2010/main" val="0"/>
                 </a:ext>
               </a:extLst>
             </a:blip>
@@ -2219,9 +2079,7 @@
             </a:prstGeom>
             <a:noFill/>
             <a:ln>
-              <a:solidFill>
-                <a:srgbClr val="000000"/>
-              </a:solidFill>
+              <a:noFill/>
             </a:ln>
           </p:spPr>
         </p:pic>
@@ -2237,7 +2095,7 @@
             <a:blip r:embed="rId12" cstate="print">
               <a:extLst>
                 <a:ext uri="{BEBA8EAE-BF5A-486C-A8C5-ECC9F3942E4B}">
-                  <a14:imgProps xmlns:a14="http://schemas.microsoft.com/office/drawing/2010/main" xmlns="">
+                  <a14:imgProps xmlns="" xmlns:a14="http://schemas.microsoft.com/office/drawing/2010/main">
                     <a14:imgLayer r:embed="rId13">
                       <a14:imgEffect>
                         <a14:artisticPlasticWrap/>
@@ -2246,7 +2104,7 @@
                   </a14:imgProps>
                 </a:ext>
                 <a:ext uri="{28A0092B-C50C-407E-A947-70E740481C1C}">
-                  <a14:useLocalDpi xmlns:a14="http://schemas.microsoft.com/office/drawing/2010/main" xmlns="" val="0"/>
+                  <a14:useLocalDpi xmlns="" xmlns:a14="http://schemas.microsoft.com/office/drawing/2010/main" val="0"/>
                 </a:ext>
               </a:extLst>
             </a:blip>
@@ -2263,9 +2121,7 @@
               <a:avLst/>
             </a:prstGeom>
             <a:ln>
-              <a:solidFill>
-                <a:srgbClr val="000000"/>
-              </a:solidFill>
+              <a:noFill/>
             </a:ln>
           </p:spPr>
         </p:pic>
@@ -2281,7 +2137,7 @@
             <a:blip r:embed="rId14" cstate="print">
               <a:extLst>
                 <a:ext uri="{28A0092B-C50C-407E-A947-70E740481C1C}">
-                  <a14:useLocalDpi xmlns:a14="http://schemas.microsoft.com/office/drawing/2010/main" xmlns="" val="0"/>
+                  <a14:useLocalDpi xmlns="" xmlns:a14="http://schemas.microsoft.com/office/drawing/2010/main" val="0"/>
                 </a:ext>
               </a:extLst>
             </a:blip>
@@ -2298,9 +2154,7 @@
               <a:avLst/>
             </a:prstGeom>
             <a:ln>
-              <a:solidFill>
-                <a:srgbClr val="000000"/>
-              </a:solidFill>
+              <a:noFill/>
             </a:ln>
           </p:spPr>
         </p:pic>
@@ -2326,7 +2180,7 @@
               </a:clrChange>
               <a:extLst>
                 <a:ext uri="{BEBA8EAE-BF5A-486C-A8C5-ECC9F3942E4B}">
-                  <a14:imgProps xmlns:a14="http://schemas.microsoft.com/office/drawing/2010/main" xmlns="">
+                  <a14:imgProps xmlns="" xmlns:a14="http://schemas.microsoft.com/office/drawing/2010/main">
                     <a14:imgLayer r:embed="rId16">
                       <a14:imgEffect>
                         <a14:saturation sat="0"/>
@@ -2335,7 +2189,7 @@
                   </a14:imgProps>
                 </a:ext>
                 <a:ext uri="{28A0092B-C50C-407E-A947-70E740481C1C}">
-                  <a14:useLocalDpi xmlns:a14="http://schemas.microsoft.com/office/drawing/2010/main" xmlns="" val="0"/>
+                  <a14:useLocalDpi xmlns="" xmlns:a14="http://schemas.microsoft.com/office/drawing/2010/main" val="0"/>
                 </a:ext>
               </a:extLst>
             </a:blip>
@@ -2352,13 +2206,11 @@
             </a:prstGeom>
             <a:noFill/>
             <a:ln>
-              <a:solidFill>
-                <a:srgbClr val="000000"/>
-              </a:solidFill>
+              <a:noFill/>
             </a:ln>
             <a:extLst>
               <a:ext uri="{53640926-AAD7-44D8-BBD7-CCE9431645EC}">
-                <a14:shadowObscured xmlns:a14="http://schemas.microsoft.com/office/drawing/2010/main" xmlns=""/>
+                <a14:shadowObscured xmlns="" xmlns:a14="http://schemas.microsoft.com/office/drawing/2010/main"/>
               </a:ext>
             </a:extLst>
           </p:spPr>
@@ -2375,7 +2227,7 @@
             <a:blip r:embed="rId17" cstate="print">
               <a:extLst>
                 <a:ext uri="{28A0092B-C50C-407E-A947-70E740481C1C}">
-                  <a14:useLocalDpi xmlns:a14="http://schemas.microsoft.com/office/drawing/2010/main" xmlns="" val="0"/>
+                  <a14:useLocalDpi xmlns="" xmlns:a14="http://schemas.microsoft.com/office/drawing/2010/main" val="0"/>
                 </a:ext>
               </a:extLst>
             </a:blip>
@@ -2398,7 +2250,7 @@
             </a:ln>
             <a:extLst>
               <a:ext uri="{53640926-AAD7-44D8-BBD7-CCE9431645EC}">
-                <a14:shadowObscured xmlns:a14="http://schemas.microsoft.com/office/drawing/2010/main" xmlns=""/>
+                <a14:shadowObscured xmlns="" xmlns:a14="http://schemas.microsoft.com/office/drawing/2010/main"/>
               </a:ext>
             </a:extLst>
           </p:spPr>
@@ -2415,7 +2267,7 @@
             <a:blip r:embed="rId18" cstate="print">
               <a:extLst>
                 <a:ext uri="{28A0092B-C50C-407E-A947-70E740481C1C}">
-                  <a14:useLocalDpi xmlns:a14="http://schemas.microsoft.com/office/drawing/2010/main" xmlns="" val="0"/>
+                  <a14:useLocalDpi xmlns="" xmlns:a14="http://schemas.microsoft.com/office/drawing/2010/main" val="0"/>
                 </a:ext>
               </a:extLst>
             </a:blip>
@@ -2706,35 +2558,7 @@
             </a:r>
             <a:r>
               <a:rPr lang="de-DE" sz="3000" dirty="0" smtClean="0"/>
-              <a:t> ist eine JavaScript </a:t>
-            </a:r>
-            <a:r>
-              <a:rPr lang="de-DE" sz="3000" dirty="0" smtClean="0"/>
-              <a:t>Laufzeitumgebung, die </a:t>
-            </a:r>
-            <a:r>
-              <a:rPr lang="de-DE" sz="3000" dirty="0" smtClean="0"/>
-              <a:t>Google Chromes V8 JavaScript Engine </a:t>
-            </a:r>
-            <a:r>
-              <a:rPr lang="de-DE" sz="3000" dirty="0" smtClean="0"/>
-              <a:t>verwendet</a:t>
-            </a:r>
-            <a:r>
-              <a:rPr lang="de-DE" sz="3000" dirty="0" smtClean="0"/>
-              <a:t>. </a:t>
-            </a:r>
-            <a:r>
-              <a:rPr lang="de-DE" sz="3000" dirty="0" smtClean="0"/>
-              <a:t>Sowohl der Aktor (Drohne) als auch die meisten Sensoren (</a:t>
-            </a:r>
-            <a:r>
-              <a:rPr lang="de-DE" sz="3000" dirty="0" smtClean="0"/>
-              <a:t>Xbox </a:t>
-            </a:r>
-            <a:r>
-              <a:rPr lang="de-DE" sz="3000" dirty="0" smtClean="0"/>
-              <a:t>Controller, Tastatur und Joystick) werden mit Hilfe entsprechender </a:t>
+              <a:t> ist eine JavaScript Laufzeitumgebung, die Google Chromes V8 JavaScript Engine verwendet. Sowohl der Aktor (Drohne) als auch die meisten Sensoren (Xbox Controller, Tastatur und Joystick) werden mit Hilfe entsprechender </a:t>
             </a:r>
             <a:r>
               <a:rPr lang="de-DE" sz="3000" dirty="0" err="1" smtClean="0"/>
@@ -2752,7 +2576,6 @@
               <a:rPr lang="de-DE" sz="3000" dirty="0" smtClean="0"/>
               <a:t>) eingebunden.</a:t>
             </a:r>
-            <a:endParaRPr lang="de-DE" sz="3000" dirty="0" smtClean="0"/>
           </a:p>
           <a:p>
             <a:pPr algn="just"/>
@@ -2897,23 +2720,7 @@
             </a:r>
             <a:r>
               <a:rPr lang="de-DE" sz="3000" dirty="0" smtClean="0"/>
-              <a:t>. Dazwischen wird die benötigte Zeit zur Bewältigung des Parcours </a:t>
-            </a:r>
-            <a:r>
-              <a:rPr lang="de-DE" sz="3000" dirty="0" smtClean="0"/>
-              <a:t>für jedes Peripheriegerät gemessen </a:t>
-            </a:r>
-            <a:r>
-              <a:rPr lang="de-DE" sz="3000" dirty="0" smtClean="0"/>
-              <a:t>und bei Landung am </a:t>
-            </a:r>
-            <a:r>
-              <a:rPr lang="de-DE" sz="3000" dirty="0" smtClean="0"/>
-              <a:t>Zielpunkt in eine </a:t>
-            </a:r>
-            <a:r>
-              <a:rPr lang="de-DE" sz="3000" dirty="0" smtClean="0"/>
-              <a:t>Tabelle übernommen. </a:t>
+              <a:t>. Dazwischen wird die benötigte Zeit zur Bewältigung des Parcours für jedes Peripheriegerät gemessen und bei Landung am Zielpunkt in eine Tabelle übernommen. </a:t>
             </a:r>
           </a:p>
           <a:p>
@@ -2924,23 +2731,7 @@
             <a:pPr algn="just"/>
             <a:r>
               <a:rPr lang="de-DE" sz="3000" dirty="0" smtClean="0"/>
-              <a:t>Das Spielfeld kann durch die Festlegung eines GPS Wertes als </a:t>
-            </a:r>
-            <a:r>
-              <a:rPr lang="de-DE" sz="3000" dirty="0" smtClean="0"/>
-              <a:t>Mittelpunkt und </a:t>
-            </a:r>
-            <a:r>
-              <a:rPr lang="de-DE" sz="3000" dirty="0" smtClean="0"/>
-              <a:t>die Angabe eines Radius (in Meter) begrenzt werden. Da die Position seitens der Drohne nur sekündlich aktualisiert </a:t>
-            </a:r>
-            <a:r>
-              <a:rPr lang="de-DE" sz="3000" dirty="0" smtClean="0"/>
-              <a:t>wird, </a:t>
-            </a:r>
-            <a:r>
-              <a:rPr lang="de-DE" sz="3000" dirty="0" smtClean="0"/>
-              <a:t>ist sie bei steigender Geschwindigkeit relativ ungenau. Aus diesem Grund wird aktuell noch ein menschlicher </a:t>
+              <a:t>Das Spielfeld kann durch die Festlegung eines GPS Wertes als Mittelpunkt und die Angabe eines Radius (in Meter) begrenzt werden. Da die Position seitens der Drohne nur sekündlich aktualisiert wird, ist sie bei steigender Geschwindigkeit relativ ungenau. Aus diesem Grund wird aktuell noch ein menschlicher </a:t>
             </a:r>
             <a:r>
               <a:rPr lang="de-DE" sz="3000" dirty="0"/>
@@ -2964,15 +2755,7 @@
             </a:r>
             <a:r>
               <a:rPr lang="de-DE" sz="3000" dirty="0" smtClean="0"/>
-              <a:t>. Da für das Wii Balance Board keine sinnvolle Start- und Landemöglichkeit existiert, werden Start und Landung in diesem Fall </a:t>
-            </a:r>
-            <a:r>
-              <a:rPr lang="de-DE" sz="3000" dirty="0" smtClean="0"/>
-              <a:t>vom Bediener der zentralen Steuereinheit mit der Tastatur </a:t>
-            </a:r>
-            <a:r>
-              <a:rPr lang="de-DE" sz="3000" dirty="0" smtClean="0"/>
-              <a:t>durchgeführt.</a:t>
+              <a:t>. Da für das Wii Balance Board keine sinnvolle Start- und Landemöglichkeit existiert, werden Start und Landung in diesem Fall vom Bediener der zentralen Steuereinheit mit der Tastatur durchgeführt.</a:t>
             </a:r>
           </a:p>
         </p:txBody>
@@ -3101,27 +2884,7 @@
             <a:pPr algn="just"/>
             <a:r>
               <a:rPr lang="de-DE" sz="3000" dirty="0" smtClean="0"/>
-              <a:t>Aus Sicherheitsgründen kann die Steuerung der Drohne jederzeit </a:t>
-            </a:r>
-            <a:r>
-              <a:rPr lang="de-DE" sz="3000" dirty="0" smtClean="0"/>
-              <a:t>mit der Tastatur </a:t>
-            </a:r>
-            <a:r>
-              <a:rPr lang="de-DE" sz="3000" dirty="0" smtClean="0"/>
-              <a:t>der </a:t>
-            </a:r>
-            <a:r>
-              <a:rPr lang="de-DE" sz="3000" dirty="0" smtClean="0"/>
-              <a:t>zentralen Steuereinheit </a:t>
-            </a:r>
-            <a:r>
-              <a:rPr lang="de-DE" sz="3000" dirty="0" smtClean="0"/>
-              <a:t>übernommen </a:t>
-            </a:r>
-            <a:r>
-              <a:rPr lang="de-DE" sz="3000" dirty="0" smtClean="0"/>
-              <a:t>und alle Peripheriegeräte separat aktiviert bzw. deaktiviert werden.</a:t>
+              <a:t>Aus Sicherheitsgründen kann die Steuerung der Drohne jederzeit mit der Tastatur der zentralen Steuereinheit übernommen und alle Peripheriegeräte separat aktiviert bzw. deaktiviert werden.</a:t>
             </a:r>
             <a:endParaRPr lang="de-DE" sz="3000" dirty="0"/>
           </a:p>
@@ -3139,7 +2902,7 @@
           <a:blip r:embed="rId19" cstate="print">
             <a:extLst>
               <a:ext uri="{BEBA8EAE-BF5A-486C-A8C5-ECC9F3942E4B}">
-                <a14:imgProps xmlns:a14="http://schemas.microsoft.com/office/drawing/2010/main" xmlns="">
+                <a14:imgProps xmlns="" xmlns:a14="http://schemas.microsoft.com/office/drawing/2010/main">
                   <a14:imgLayer r:embed="rId20">
                     <a14:imgEffect>
                       <a14:artisticPlasticWrap/>
@@ -3148,7 +2911,7 @@
                 </a14:imgProps>
               </a:ext>
               <a:ext uri="{28A0092B-C50C-407E-A947-70E740481C1C}">
-                <a14:useLocalDpi xmlns:a14="http://schemas.microsoft.com/office/drawing/2010/main" xmlns="" val="0"/>
+                <a14:useLocalDpi xmlns="" xmlns:a14="http://schemas.microsoft.com/office/drawing/2010/main" val="0"/>
               </a:ext>
             </a:extLst>
           </a:blip>
@@ -3172,14 +2935,14 @@
           <a:effectLst/>
           <a:extLst>
             <a:ext uri="{909E8E84-426E-40DD-AFC4-6F175D3DCCD1}">
-              <a14:hiddenFill xmlns:a14="http://schemas.microsoft.com/office/drawing/2010/main" xmlns="">
+              <a14:hiddenFill xmlns="" xmlns:a14="http://schemas.microsoft.com/office/drawing/2010/main">
                 <a:solidFill>
                   <a:schemeClr val="accent1"/>
                 </a:solidFill>
               </a14:hiddenFill>
             </a:ext>
             <a:ext uri="{91240B29-F687-4F45-9708-019B960494DF}">
-              <a14:hiddenLine xmlns:a14="http://schemas.microsoft.com/office/drawing/2010/main" xmlns="" w="9525">
+              <a14:hiddenLine xmlns="" xmlns:a14="http://schemas.microsoft.com/office/drawing/2010/main" w="9525">
                 <a:solidFill>
                   <a:schemeClr val="tx1"/>
                 </a:solidFill>
@@ -3189,7 +2952,7 @@
               </a14:hiddenLine>
             </a:ext>
             <a:ext uri="{AF507438-7753-43E0-B8FC-AC1667EBCBE1}">
-              <a14:hiddenEffects xmlns:a14="http://schemas.microsoft.com/office/drawing/2010/main" xmlns="">
+              <a14:hiddenEffects xmlns="" xmlns:a14="http://schemas.microsoft.com/office/drawing/2010/main">
                 <a:effectLst>
                   <a:outerShdw dist="35921" dir="2700000" algn="ctr" rotWithShape="0">
                     <a:schemeClr val="bg2"/>
@@ -3212,7 +2975,7 @@
           <a:blip r:embed="rId21" cstate="print">
             <a:extLst>
               <a:ext uri="{28A0092B-C50C-407E-A947-70E740481C1C}">
-                <a14:useLocalDpi xmlns:a14="http://schemas.microsoft.com/office/drawing/2010/main" xmlns="" val="0"/>
+                <a14:useLocalDpi xmlns="" xmlns:a14="http://schemas.microsoft.com/office/drawing/2010/main" val="0"/>
               </a:ext>
             </a:extLst>
           </a:blip>
@@ -3236,14 +2999,14 @@
           <a:effectLst/>
           <a:extLst>
             <a:ext uri="{909E8E84-426E-40DD-AFC4-6F175D3DCCD1}">
-              <a14:hiddenFill xmlns:a14="http://schemas.microsoft.com/office/drawing/2010/main" xmlns="">
+              <a14:hiddenFill xmlns="" xmlns:a14="http://schemas.microsoft.com/office/drawing/2010/main">
                 <a:solidFill>
                   <a:schemeClr val="accent1"/>
                 </a:solidFill>
               </a14:hiddenFill>
             </a:ext>
             <a:ext uri="{91240B29-F687-4F45-9708-019B960494DF}">
-              <a14:hiddenLine xmlns:a14="http://schemas.microsoft.com/office/drawing/2010/main" xmlns="" w="9525">
+              <a14:hiddenLine xmlns="" xmlns:a14="http://schemas.microsoft.com/office/drawing/2010/main" w="9525">
                 <a:solidFill>
                   <a:schemeClr val="tx1"/>
                 </a:solidFill>
@@ -3253,7 +3016,7 @@
               </a14:hiddenLine>
             </a:ext>
             <a:ext uri="{AF507438-7753-43E0-B8FC-AC1667EBCBE1}">
-              <a14:hiddenEffects xmlns:a14="http://schemas.microsoft.com/office/drawing/2010/main" xmlns="">
+              <a14:hiddenEffects xmlns="" xmlns:a14="http://schemas.microsoft.com/office/drawing/2010/main">
                 <a:effectLst>
                   <a:outerShdw dist="35921" dir="2700000" algn="ctr" rotWithShape="0">
                     <a:schemeClr val="bg2"/>
@@ -3267,7 +3030,7 @@
     </p:spTree>
     <p:extLst>
       <p:ext uri="{BB962C8B-B14F-4D97-AF65-F5344CB8AC3E}">
-        <p14:creationId xmlns:p14="http://schemas.microsoft.com/office/powerpoint/2010/main" xmlns="" val="4058847616"/>
+        <p14:creationId xmlns="" xmlns:p14="http://schemas.microsoft.com/office/powerpoint/2010/main" val="4058847616"/>
       </p:ext>
     </p:extLst>
   </p:cSld>

</xml_diff>

<commit_message>
Zentrale Steuereinheit in Tower umbenannt
Tower vs zentrale Steuereinheit
</commit_message>
<xml_diff>
--- a/doc/Poster.pptx
+++ b/doc/Poster.pptx
@@ -748,23 +748,7 @@
                   <a:schemeClr val="accent5"/>
                 </a:solidFill>
               </a:rPr>
-              <a:t> </a:t>
-            </a:r>
-            <a:r>
-              <a:rPr lang="de-DE" sz="7000" b="1" dirty="0" smtClean="0">
-                <a:solidFill>
-                  <a:schemeClr val="accent5"/>
-                </a:solidFill>
-              </a:rPr>
-              <a:t>Racing </a:t>
-            </a:r>
-            <a:r>
-              <a:rPr lang="de-DE" sz="7000" b="1" dirty="0" smtClean="0">
-                <a:solidFill>
-                  <a:schemeClr val="accent5"/>
-                </a:solidFill>
-              </a:rPr>
-              <a:t>Games</a:t>
+              <a:t> Racing Games</a:t>
             </a:r>
           </a:p>
           <a:p>
@@ -896,13 +880,6 @@
               </a:rPr>
               <a:t>Die Applikation</a:t>
             </a:r>
-            <a:endParaRPr lang="de-DE" sz="5400" dirty="0" smtClean="0">
-              <a:solidFill>
-                <a:schemeClr val="accent5"/>
-              </a:solidFill>
-              <a:latin typeface="+mj-lt"/>
-              <a:cs typeface="Times New Roman" pitchFamily="18" charset="0"/>
-            </a:endParaRPr>
           </a:p>
         </p:txBody>
       </p:sp>
@@ -914,8 +891,8 @@
         </p:nvSpPr>
         <p:spPr>
           <a:xfrm>
-            <a:off x="1674493" y="25292694"/>
-            <a:ext cx="12529392" cy="2494594"/>
+            <a:off x="1674493" y="25220686"/>
+            <a:ext cx="12529392" cy="3016210"/>
           </a:xfrm>
           <a:prstGeom prst="rect">
             <a:avLst/>
@@ -939,7 +916,7 @@
                   <a:srgbClr val="262626"/>
                 </a:solidFill>
               </a:rPr>
-              <a:t>Fast </a:t>
+              <a:t>Fast alle Eingabegeräte werden per USB Kabel mit einer zentralen Steuereinheit </a:t>
             </a:r>
             <a:r>
               <a:rPr lang="de-DE" sz="3000" dirty="0" smtClean="0">
@@ -947,7 +924,7 @@
                   <a:srgbClr val="262626"/>
                 </a:solidFill>
               </a:rPr>
-              <a:t>alle Eingabegeräte werden per USB Kabel mit einer zentralen Steuereinheit </a:t>
+              <a:t>(im Folgenden „Tower“ genannt), wie z.B. einem Laptop, </a:t>
             </a:r>
             <a:r>
               <a:rPr lang="de-DE" sz="3000" dirty="0" smtClean="0">
@@ -955,7 +932,7 @@
                   <a:srgbClr val="262626"/>
                 </a:solidFill>
               </a:rPr>
-              <a:t>(Tower) </a:t>
+              <a:t>verbunden. Die einzige Ausnahme bildet das Wii </a:t>
             </a:r>
             <a:r>
               <a:rPr lang="de-DE" sz="3000" dirty="0" smtClean="0">
@@ -963,7 +940,31 @@
                   <a:srgbClr val="262626"/>
                 </a:solidFill>
               </a:rPr>
-              <a:t>verbunden. Die einzige Ausnahme bildet das Wii Balance Board, welches per Bluetooth verbunden wird. </a:t>
+              <a:t>Balance </a:t>
+            </a:r>
+            <a:r>
+              <a:rPr lang="de-DE" sz="3000" dirty="0" smtClean="0">
+                <a:solidFill>
+                  <a:srgbClr val="262626"/>
+                </a:solidFill>
+              </a:rPr>
+              <a:t>Board, welches per Bluetooth </a:t>
+            </a:r>
+            <a:r>
+              <a:rPr lang="de-DE" sz="3000" dirty="0" smtClean="0">
+                <a:solidFill>
+                  <a:srgbClr val="262626"/>
+                </a:solidFill>
+              </a:rPr>
+              <a:t>angebunden wird</a:t>
+            </a:r>
+            <a:r>
+              <a:rPr lang="de-DE" sz="3000" dirty="0" smtClean="0">
+                <a:solidFill>
+                  <a:srgbClr val="262626"/>
+                </a:solidFill>
+              </a:rPr>
+              <a:t>. </a:t>
             </a:r>
             <a:r>
               <a:rPr lang="de-DE" sz="3000" dirty="0" smtClean="0"/>
@@ -983,17 +984,8 @@
             </a:r>
             <a:r>
               <a:rPr lang="de-DE" sz="3000" dirty="0" smtClean="0"/>
-              <a:t>WLAN-Schnittstelle,, die vom </a:t>
-            </a:r>
-            <a:r>
-              <a:rPr lang="de-DE" sz="3000" dirty="0" smtClean="0"/>
-              <a:t>verwendeten Framework angesprochen wird</a:t>
-            </a:r>
-            <a:r>
-              <a:rPr lang="de-DE" sz="3000" dirty="0" smtClean="0"/>
-              <a:t>.</a:t>
-            </a:r>
-            <a:endParaRPr lang="de-DE" sz="3000" dirty="0" smtClean="0"/>
+              <a:t>WLAN-Schnittstelle,, die vom verwendeten Framework angesprochen wird.</a:t>
+            </a:r>
           </a:p>
         </p:txBody>
       </p:sp>
@@ -1136,11 +1128,7 @@
             </a:r>
             <a:r>
               <a:rPr lang="de-DE" sz="3000" dirty="0" smtClean="0"/>
-              <a:t> im Bereich der Spiele nur wenig verbreitet sind,</a:t>
-            </a:r>
-            <a:r>
-              <a:rPr lang="de-DE" sz="3000" dirty="0" smtClean="0"/>
-              <a:t> </a:t>
+              <a:t> im Bereich der Spiele nur wenig verbreitet sind, </a:t>
             </a:r>
             <a:r>
               <a:rPr lang="de-DE" sz="3000" dirty="0"/>
@@ -1296,13 +1284,8 @@
             <a:pPr algn="just"/>
             <a:r>
               <a:rPr lang="de-DE" sz="3000" dirty="0" smtClean="0"/>
-              <a:t>In einem ersten Schritt wurde mit der Anbindung mehrerer Eingabegeräte zur Steuerung der Drohne eine Basis für weitere Untersuchungen geschaffen. Im nächsten Schritt kann nun evaluiert werden, welches der Eingabegeräte sich als besonders effektiv zur Steuerung der Drohne herausstellt. </a:t>
-            </a:r>
-            <a:r>
-              <a:rPr lang="de-DE" sz="3000" dirty="0" smtClean="0"/>
-              <a:t>Die Konzipierung des Projekts als kompetitives Rennspiel fördert dies, da zu erwarten steht, dass ein Benutzer eine möglichst genaue Steuerung  anstrebt.</a:t>
-            </a:r>
-            <a:endParaRPr lang="de-DE" sz="3000" dirty="0" smtClean="0"/>
+              <a:t>In einem ersten Schritt wurde mit der Anbindung mehrerer Eingabegeräte zur Steuerung der Drohne eine Basis für weitere Untersuchungen geschaffen. Im nächsten Schritt kann nun evaluiert werden, welches der Eingabegeräte sich als besonders effektiv zur Steuerung der Drohne herausstellt. Die Konzipierung des Projekts als kompetitives Rennspiel fördert dies, da zu erwarten steht, dass ein Benutzer eine möglichst genaue Steuerung  anstrebt.</a:t>
+            </a:r>
           </a:p>
           <a:p>
             <a:pPr algn="just"/>
@@ -1314,7 +1297,6 @@
               <a:rPr lang="de-DE" sz="3000" dirty="0" smtClean="0"/>
               <a:t>Denkbar wäre darüber hinaus eine Untersuchung der Unterschiede zwischen verschiedenen Benutzergruppen. Von besonderem Interesse sind vor allem die Auswirkung von Geschlecht, Alter und technischer Erfahrung bzw. Spieleerfahrung auf das subjektive Empfinden der Testperson bei der Steuerung und der Fähigkeit zur Bewältigung des Parcours.</a:t>
             </a:r>
-            <a:endParaRPr lang="de-DE" sz="3000" dirty="0" smtClean="0"/>
           </a:p>
         </p:txBody>
       </p:sp>
@@ -1850,11 +1832,7 @@
             </a:r>
             <a:r>
               <a:rPr lang="de-DE" sz="3000" dirty="0" smtClean="0"/>
-              <a:t>) eingebunden</a:t>
-            </a:r>
-            <a:r>
-              <a:rPr lang="de-DE" sz="3000" dirty="0" smtClean="0"/>
-              <a:t>.</a:t>
+              <a:t>) eingebunden.</a:t>
             </a:r>
           </a:p>
           <a:p>
@@ -1935,11 +1913,7 @@
             </a:r>
             <a:r>
               <a:rPr lang="de-DE" sz="3000" dirty="0" smtClean="0"/>
-              <a:t>von</a:t>
-            </a:r>
-            <a:r>
-              <a:rPr lang="de-DE" sz="3000" dirty="0" smtClean="0"/>
-              <a:t> </a:t>
+              <a:t>von </a:t>
             </a:r>
             <a:r>
               <a:rPr lang="de-DE" sz="3000" dirty="0"/>
@@ -1999,15 +1973,7 @@
             </a:r>
             <a:r>
               <a:rPr lang="de-DE" sz="3000" dirty="0" smtClean="0"/>
-              <a:t>. Dazwischen </a:t>
-            </a:r>
-            <a:r>
-              <a:rPr lang="de-DE" sz="3000" dirty="0" smtClean="0"/>
-              <a:t>wird die </a:t>
-            </a:r>
-            <a:r>
-              <a:rPr lang="de-DE" sz="3000" dirty="0" smtClean="0"/>
-              <a:t>benötigte Zeit zur Bewältigung des Parcours für jedes Peripheriegerät gemessen und bei Landung am Zielpunkt in eine Tabelle übernommen. </a:t>
+              <a:t>. Dazwischen wird die benötigte Zeit zur Bewältigung des Parcours für jedes Peripheriegerät gemessen und bei Landung am Zielpunkt in eine Tabelle übernommen. </a:t>
             </a:r>
             <a:r>
               <a:rPr lang="de-DE" sz="3000" dirty="0"/>
@@ -2023,23 +1989,7 @@
             <a:pPr algn="just"/>
             <a:r>
               <a:rPr lang="de-DE" sz="3000" dirty="0" smtClean="0"/>
-              <a:t>Das Spielfeld kann durch die Festlegung eines GPS Wertes als Mittelpunkt und die Angabe eines Radius (in Meter) begrenzt werden. Da die Position seitens der Drohne nur sekündlich aktualisiert wird, ist sie bei steigender Geschwindigkeit relativ ungenau. </a:t>
-            </a:r>
-            <a:r>
-              <a:rPr lang="de-DE" sz="3000" dirty="0" smtClean="0"/>
-              <a:t>Darum </a:t>
-            </a:r>
-            <a:r>
-              <a:rPr lang="de-DE" sz="3000" dirty="0" smtClean="0"/>
-              <a:t>wird </a:t>
-            </a:r>
-            <a:r>
-              <a:rPr lang="de-DE" sz="3000" dirty="0" smtClean="0"/>
-              <a:t>ein </a:t>
-            </a:r>
-            <a:r>
-              <a:rPr lang="de-DE" sz="3000" dirty="0" smtClean="0"/>
-              <a:t>menschlicher </a:t>
+              <a:t>Das Spielfeld kann durch die Festlegung eines GPS Wertes als Mittelpunkt und die Angabe eines Radius (in Meter) begrenzt werden. Da die Position seitens der Drohne nur sekündlich aktualisiert wird, ist sie bei steigender Geschwindigkeit relativ ungenau. Darum wird ein menschlicher </a:t>
             </a:r>
             <a:r>
               <a:rPr lang="de-DE" sz="3000" dirty="0"/>
@@ -2063,15 +2013,15 @@
             </a:r>
             <a:r>
               <a:rPr lang="de-DE" sz="3000" dirty="0" smtClean="0"/>
-              <a:t>. Da für das Wii Balance Board keine sinnvolle Start- und Landemöglichkeit existiert, werden Start und Landung in diesem Fall vom Bediener </a:t>
-            </a:r>
-            <a:r>
-              <a:rPr lang="de-DE" sz="3000" dirty="0" smtClean="0"/>
-              <a:t>der zentralen </a:t>
-            </a:r>
-            <a:r>
-              <a:rPr lang="de-DE" sz="3000" dirty="0" smtClean="0"/>
-              <a:t>Steuereinheit mit der Tastatur durchgeführt.</a:t>
+              <a:t>. Da für das Wii Balance Board keine sinnvolle Start- und Landemöglichkeit existiert, werden Start und Landung in diesem Fall vom </a:t>
+            </a:r>
+            <a:r>
+              <a:rPr lang="de-DE" sz="3000" dirty="0" smtClean="0"/>
+              <a:t>Schiedsrichter </a:t>
+            </a:r>
+            <a:r>
+              <a:rPr lang="de-DE" sz="3000" dirty="0" smtClean="0"/>
+              <a:t>mit der Tastatur durchgeführt.</a:t>
             </a:r>
           </a:p>
         </p:txBody>
@@ -2200,7 +2150,19 @@
             <a:pPr algn="just"/>
             <a:r>
               <a:rPr lang="de-DE" sz="3000" dirty="0" smtClean="0"/>
-              <a:t>Aus Sicherheitsgründen kann die Steuerung der Drohne jederzeit mit der Tastatur der zentralen Steuereinheit übernommen und alle Peripheriegeräte separat aktiviert bzw. deaktiviert werden.</a:t>
+              <a:t>Aus Sicherheitsgründen kann die Steuerung der Drohne jederzeit mit der Tastatur </a:t>
+            </a:r>
+            <a:r>
+              <a:rPr lang="de-DE" sz="3000" dirty="0" smtClean="0"/>
+              <a:t>des </a:t>
+            </a:r>
+            <a:r>
+              <a:rPr lang="de-DE" sz="3000" smtClean="0"/>
+              <a:t>Towers übernommen </a:t>
+            </a:r>
+            <a:r>
+              <a:rPr lang="de-DE" sz="3000" dirty="0" smtClean="0"/>
+              <a:t>und alle Peripheriegeräte separat aktiviert bzw. deaktiviert werden.</a:t>
             </a:r>
             <a:endParaRPr lang="de-DE" sz="3000" dirty="0"/>
           </a:p>
@@ -2287,7 +2249,7 @@
         </p:nvGrpSpPr>
         <p:grpSpPr>
           <a:xfrm>
-            <a:off x="1674491" y="28173014"/>
+            <a:off x="1674491" y="28338822"/>
             <a:ext cx="12209205" cy="7683064"/>
             <a:chOff x="28287685" y="22920931"/>
             <a:chExt cx="12209205" cy="7683064"/>
@@ -3020,13 +2982,6 @@
               </a:rPr>
               <a:t>Die Umsetzung</a:t>
             </a:r>
-            <a:endParaRPr lang="de-DE" sz="5400" dirty="0" smtClean="0">
-              <a:solidFill>
-                <a:schemeClr val="accent5"/>
-              </a:solidFill>
-              <a:latin typeface="+mj-lt"/>
-              <a:cs typeface="Times New Roman" pitchFamily="18" charset="0"/>
-            </a:endParaRPr>
           </a:p>
         </p:txBody>
       </p:sp>
@@ -3055,11 +3010,7 @@
             <a:pPr algn="just"/>
             <a:r>
               <a:rPr lang="de-DE" sz="3000" dirty="0" smtClean="0"/>
-              <a:t>Die </a:t>
-            </a:r>
-            <a:r>
-              <a:rPr lang="de-DE" sz="3000" dirty="0" smtClean="0"/>
-              <a:t>Hauptkomponenten funktionieren auch unter Windows und MacOS, wobei das Balance Board unter Windows nur mit einem passenden JSR082 Bluetooth Stack (z.B. </a:t>
+              <a:t>Die Hauptkomponenten funktionieren auch unter Windows und MacOS, wobei das Balance Board unter Windows nur mit einem passenden JSR082 Bluetooth Stack (z.B. </a:t>
             </a:r>
             <a:r>
               <a:rPr lang="de-DE" sz="3000" dirty="0" err="1" smtClean="0"/>
@@ -3100,8 +3051,12 @@
               <a:t>Zielplattform </a:t>
             </a:r>
             <a:r>
+              <a:rPr lang="de-DE" sz="3000" dirty="0" smtClean="0"/>
+              <a:t>des Towers </a:t>
+            </a:r>
+            <a:r>
               <a:rPr lang="de-DE" sz="3000" dirty="0"/>
-              <a:t>des Projekts ist eine der verbreiteten </a:t>
+              <a:t>ist eine der verbreiteten </a:t>
             </a:r>
             <a:r>
               <a:rPr lang="de-DE" sz="3000" dirty="0" err="1"/>
@@ -3109,11 +3064,11 @@
             </a:r>
             <a:r>
               <a:rPr lang="de-DE" sz="3000" dirty="0"/>
-              <a:t> (z.B. Debian oder Ubuntu) auf einem </a:t>
-            </a:r>
-            <a:r>
-              <a:rPr lang="de-DE" sz="3000" dirty="0" smtClean="0"/>
-              <a:t>Laptop, </a:t>
+              <a:t> (z.B. Debian oder Ubuntu</a:t>
+            </a:r>
+            <a:r>
+              <a:rPr lang="de-DE" sz="3000" dirty="0" smtClean="0"/>
+              <a:t>), </a:t>
             </a:r>
             <a:r>
               <a:rPr lang="de-DE" sz="3000" dirty="0"/>

</xml_diff>

<commit_message>
DOC: Installationsanleitung, Finale Version Poster als PPTX und PDF
</commit_message>
<xml_diff>
--- a/doc/Poster.pptx
+++ b/doc/Poster.pptx
@@ -303,7 +303,7 @@
             <a:fld id="{D2ED235E-9080-4719-A145-5B05AC56BA2B}" type="datetimeFigureOut">
               <a:rPr lang="de-DE" smtClean="0"/>
               <a:pPr/>
-              <a:t>06.07.2016</a:t>
+              <a:t>07.07.2016</a:t>
             </a:fld>
             <a:endParaRPr lang="de-DE"/>
           </a:p>
@@ -719,12 +719,12 @@
               </a:lnSpc>
             </a:pPr>
             <a:r>
-              <a:rPr lang="de-DE" sz="7000" dirty="0" smtClean="0">
+              <a:rPr lang="de-DE" sz="7000" b="1" dirty="0" smtClean="0">
                 <a:solidFill>
                   <a:schemeClr val="accent5"/>
                 </a:solidFill>
               </a:rPr>
-              <a:t>GAME OF DRONES</a:t>
+              <a:t>GAME OF </a:t>
             </a:r>
             <a:r>
               <a:rPr lang="de-DE" sz="7000" b="1" dirty="0" smtClean="0">
@@ -732,18 +732,41 @@
                   <a:schemeClr val="accent5"/>
                 </a:solidFill>
               </a:rPr>
-              <a:t> – Erstellung eines Multiple-Input </a:t>
-            </a:r>
-            <a:r>
-              <a:rPr lang="de-DE" sz="7000" b="1" dirty="0" err="1" smtClean="0">
+              <a:t>DRONES</a:t>
+            </a:r>
+          </a:p>
+          <a:p>
+            <a:pPr>
+              <a:lnSpc>
+                <a:spcPts val="9000"/>
+              </a:lnSpc>
+            </a:pPr>
+            <a:r>
+              <a:rPr lang="de-DE" sz="6600" dirty="0" smtClean="0">
                 <a:solidFill>
                   <a:schemeClr val="accent5"/>
                 </a:solidFill>
               </a:rPr>
+              <a:t>Erstellung </a:t>
+            </a:r>
+            <a:r>
+              <a:rPr lang="de-DE" sz="6600" dirty="0" smtClean="0">
+                <a:solidFill>
+                  <a:schemeClr val="accent5"/>
+                </a:solidFill>
+              </a:rPr>
+              <a:t>eines Multiple-Input </a:t>
+            </a:r>
+            <a:r>
+              <a:rPr lang="de-DE" sz="6600" dirty="0" err="1" smtClean="0">
+                <a:solidFill>
+                  <a:schemeClr val="accent5"/>
+                </a:solidFill>
+              </a:rPr>
               <a:t>Drone</a:t>
             </a:r>
             <a:r>
-              <a:rPr lang="de-DE" sz="7000" b="1" dirty="0" smtClean="0">
+              <a:rPr lang="de-DE" sz="6600" dirty="0" smtClean="0">
                 <a:solidFill>
                   <a:schemeClr val="accent5"/>
                 </a:solidFill>
@@ -768,8 +791,45 @@
                   <a:srgbClr val="262626"/>
                 </a:solidFill>
               </a:rPr>
-              <a:t>Fabian Kalweit, Stefan Templin, Tobias Puderer, Florian Oswald </a:t>
-            </a:r>
+              <a:t>Fabian Kalweit</a:t>
+            </a:r>
+            <a:r>
+              <a:rPr lang="de-DE" sz="4400" b="1" dirty="0">
+                <a:solidFill>
+                  <a:srgbClr val="262626"/>
+                </a:solidFill>
+              </a:rPr>
+              <a:t>, Florian </a:t>
+            </a:r>
+            <a:r>
+              <a:rPr lang="de-DE" sz="4400" b="1" dirty="0" smtClean="0">
+                <a:solidFill>
+                  <a:srgbClr val="262626"/>
+                </a:solidFill>
+              </a:rPr>
+              <a:t>Oswald,</a:t>
+            </a:r>
+            <a:r>
+              <a:rPr lang="de-DE" sz="4400" b="1" dirty="0" smtClean="0">
+                <a:solidFill>
+                  <a:srgbClr val="262626"/>
+                </a:solidFill>
+              </a:rPr>
+              <a:t> Tobias Puderer</a:t>
+            </a:r>
+            <a:r>
+              <a:rPr lang="de-DE" sz="4400" b="1" dirty="0">
+                <a:solidFill>
+                  <a:srgbClr val="262626"/>
+                </a:solidFill>
+              </a:rPr>
+              <a:t>, Stefan Templin</a:t>
+            </a:r>
+            <a:endParaRPr lang="de-DE" sz="4400" b="1" dirty="0" smtClean="0">
+              <a:solidFill>
+                <a:srgbClr val="262626"/>
+              </a:solidFill>
+            </a:endParaRPr>
           </a:p>
           <a:p>
             <a:r>
@@ -786,7 +846,15 @@
                   <a:srgbClr val="262626"/>
                 </a:solidFill>
               </a:rPr>
-              <a:t> Kaiserslautern - University of Applied Sciences</a:t>
+              <a:t> </a:t>
+            </a:r>
+            <a:r>
+              <a:rPr lang="en-US" sz="4400" spc="-100" dirty="0" smtClean="0">
+                <a:solidFill>
+                  <a:srgbClr val="262626"/>
+                </a:solidFill>
+              </a:rPr>
+              <a:t>Kaiserslautern - University of Applied Sciences</a:t>
             </a:r>
           </a:p>
           <a:p>
@@ -843,7 +911,55 @@
                   <a:srgbClr val="262626"/>
                 </a:solidFill>
               </a:rPr>
-              <a:t>&lt;faka0004 | stte0002 | topu0001 | flos0001&gt; @stud.hs-kl.de</a:t>
+              <a:t>&lt; faka0004 </a:t>
+            </a:r>
+            <a:r>
+              <a:rPr lang="de-DE" sz="4400" dirty="0" smtClean="0">
+                <a:solidFill>
+                  <a:srgbClr val="262626"/>
+                </a:solidFill>
+              </a:rPr>
+              <a:t>| </a:t>
+            </a:r>
+            <a:r>
+              <a:rPr lang="de-DE" sz="4400" dirty="0" smtClean="0">
+                <a:solidFill>
+                  <a:srgbClr val="262626"/>
+                </a:solidFill>
+              </a:rPr>
+              <a:t>flos0001 </a:t>
+            </a:r>
+            <a:r>
+              <a:rPr lang="de-DE" sz="4400" dirty="0" smtClean="0">
+                <a:solidFill>
+                  <a:srgbClr val="262626"/>
+                </a:solidFill>
+              </a:rPr>
+              <a:t>| </a:t>
+            </a:r>
+            <a:r>
+              <a:rPr lang="de-DE" sz="4400" dirty="0" smtClean="0">
+                <a:solidFill>
+                  <a:srgbClr val="262626"/>
+                </a:solidFill>
+              </a:rPr>
+              <a:t>topu0001 | </a:t>
+            </a:r>
+            <a:r>
+              <a:rPr lang="de-DE" sz="4400" dirty="0">
+                <a:solidFill>
+                  <a:srgbClr val="262626"/>
+                </a:solidFill>
+              </a:rPr>
+              <a:t>stte0002 &gt; </a:t>
+            </a:r>
+            <a:r>
+              <a:rPr lang="de-DE" sz="4400" dirty="0" smtClean="0">
+                <a:solidFill>
+                  <a:srgbClr val="262626"/>
+                </a:solidFill>
+              </a:rPr>
+              <a:t>@stud.hs-kl.de</a:t>
             </a:r>
           </a:p>
         </p:txBody>
@@ -856,7 +972,7 @@
         </p:nvSpPr>
         <p:spPr>
           <a:xfrm>
-            <a:off x="1630000" y="13987438"/>
+            <a:off x="1652246" y="13987438"/>
             <a:ext cx="12529392" cy="923330"/>
           </a:xfrm>
           <a:prstGeom prst="rect">
@@ -891,8 +1007,8 @@
         </p:nvSpPr>
         <p:spPr>
           <a:xfrm>
-            <a:off x="1674493" y="25220686"/>
-            <a:ext cx="12529392" cy="3016210"/>
+            <a:off x="1652246" y="25220686"/>
+            <a:ext cx="12529392" cy="3469219"/>
           </a:xfrm>
           <a:prstGeom prst="rect">
             <a:avLst/>
@@ -916,7 +1032,7 @@
                   <a:srgbClr val="262626"/>
                 </a:solidFill>
               </a:rPr>
-              <a:t>Fast alle Eingabegeräte werden per USB Kabel mit einer zentralen Steuereinheit </a:t>
+              <a:t>Fast alle Eingabegeräte werden per USB Kabel mit einer zentralen </a:t>
             </a:r>
             <a:r>
               <a:rPr lang="de-DE" sz="3000" dirty="0" smtClean="0">
@@ -924,7 +1040,23 @@
                   <a:srgbClr val="262626"/>
                 </a:solidFill>
               </a:rPr>
-              <a:t>(im Folgenden „Tower“ genannt), wie z.B. einem Laptop, </a:t>
+              <a:t>Steuereinheit verbunden. Die </a:t>
+            </a:r>
+            <a:r>
+              <a:rPr lang="de-DE" sz="3000" dirty="0">
+                <a:solidFill>
+                  <a:srgbClr val="262626"/>
+                </a:solidFill>
+              </a:rPr>
+              <a:t>einzige Ausnahme bildet das Wii Balance Board, welches per Bluetooth angebunden wird. </a:t>
+            </a:r>
+            <a:r>
+              <a:rPr lang="de-DE" sz="3000" dirty="0"/>
+              <a:t>Die Kommunikation mit der Drohne erfolgt über deren WLAN-Schnittstelle, die vom verwendeten Framework angesprochen wird</a:t>
+            </a:r>
+            <a:r>
+              <a:rPr lang="de-DE" sz="3000" dirty="0" smtClean="0"/>
+              <a:t>. Als zentrale Steuereinheit diente im Projekt ein Laptop, welcher </a:t>
             </a:r>
             <a:r>
               <a:rPr lang="de-DE" sz="3000" dirty="0" smtClean="0">
@@ -932,7 +1064,7 @@
                   <a:srgbClr val="262626"/>
                 </a:solidFill>
               </a:rPr>
-              <a:t>verbunden. Die einzige Ausnahme bildet das Wii </a:t>
+              <a:t>im </a:t>
             </a:r>
             <a:r>
               <a:rPr lang="de-DE" sz="3000" dirty="0" smtClean="0">
@@ -940,7 +1072,7 @@
                   <a:srgbClr val="262626"/>
                 </a:solidFill>
               </a:rPr>
-              <a:t>Balance </a:t>
+              <a:t>Folgenden „Tower“ </a:t>
             </a:r>
             <a:r>
               <a:rPr lang="de-DE" sz="3000" dirty="0" smtClean="0">
@@ -948,44 +1080,16 @@
                   <a:srgbClr val="262626"/>
                 </a:solidFill>
               </a:rPr>
-              <a:t>Board, welches per Bluetooth </a:t>
-            </a:r>
-            <a:r>
-              <a:rPr lang="de-DE" sz="3000" dirty="0" smtClean="0">
-                <a:solidFill>
-                  <a:srgbClr val="262626"/>
-                </a:solidFill>
-              </a:rPr>
-              <a:t>angebunden wird</a:t>
-            </a:r>
-            <a:r>
-              <a:rPr lang="de-DE" sz="3000" dirty="0" smtClean="0">
-                <a:solidFill>
-                  <a:srgbClr val="262626"/>
-                </a:solidFill>
-              </a:rPr>
-              <a:t>. </a:t>
-            </a:r>
-            <a:r>
-              <a:rPr lang="de-DE" sz="3000" dirty="0" smtClean="0"/>
-              <a:t>Die </a:t>
-            </a:r>
-            <a:r>
-              <a:rPr lang="de-DE" sz="3000" dirty="0"/>
-              <a:t>Kommunikation mit der Drohne </a:t>
-            </a:r>
-            <a:r>
-              <a:rPr lang="de-DE" sz="3000" dirty="0" smtClean="0"/>
-              <a:t>erfolgt über </a:t>
-            </a:r>
-            <a:r>
-              <a:rPr lang="de-DE" sz="3000" dirty="0"/>
-              <a:t>deren </a:t>
-            </a:r>
-            <a:r>
-              <a:rPr lang="de-DE" sz="3000" dirty="0" smtClean="0"/>
-              <a:t>WLAN-Schnittstelle,, die vom verwendeten Framework angesprochen wird.</a:t>
-            </a:r>
+              <a:t>genannt wird.</a:t>
+            </a:r>
+          </a:p>
+          <a:p>
+            <a:pPr algn="just">
+              <a:lnSpc>
+                <a:spcPts val="3800"/>
+              </a:lnSpc>
+            </a:pPr>
+            <a:endParaRPr lang="de-DE" sz="3000" dirty="0" smtClean="0"/>
           </a:p>
         </p:txBody>
       </p:sp>
@@ -997,7 +1101,7 @@
         </p:nvSpPr>
         <p:spPr>
           <a:xfrm>
-            <a:off x="1630000" y="8082782"/>
+            <a:off x="1652246" y="8082782"/>
             <a:ext cx="12486534" cy="923330"/>
           </a:xfrm>
           <a:prstGeom prst="rect">
@@ -1032,7 +1136,7 @@
         </p:nvSpPr>
         <p:spPr>
           <a:xfrm>
-            <a:off x="1630000" y="9024974"/>
+            <a:off x="1652246" y="9024974"/>
             <a:ext cx="12529392" cy="5026331"/>
           </a:xfrm>
           <a:prstGeom prst="rect">
@@ -1061,7 +1165,15 @@
             </a:r>
             <a:r>
               <a:rPr lang="de-DE" sz="3000" dirty="0" smtClean="0"/>
-              <a:t>angebotene Smartphone-Applikation für Android und IOS vorgesehen. Zusätzlich </a:t>
+              <a:t>angebotene Smartphone-Applikation für Android und </a:t>
+            </a:r>
+            <a:r>
+              <a:rPr lang="de-DE" sz="3000" dirty="0" smtClean="0"/>
+              <a:t>iOS </a:t>
+            </a:r>
+            <a:r>
+              <a:rPr lang="de-DE" sz="3000" dirty="0" smtClean="0"/>
+              <a:t>vorgesehen. Zusätzlich </a:t>
             </a:r>
             <a:r>
               <a:rPr lang="de-DE" sz="3000" dirty="0"/>
@@ -1104,35 +1216,35 @@
             <a:pPr algn="just"/>
             <a:r>
               <a:rPr lang="de-DE" sz="3000" dirty="0" smtClean="0"/>
-              <a:t>Die in diesem Projekt erstellte </a:t>
+              <a:t>In diesem Projekt wurde ein </a:t>
             </a:r>
             <a:r>
               <a:rPr lang="de-DE" sz="3000" dirty="0"/>
-              <a:t>Anwendung </a:t>
-            </a:r>
-            <a:r>
-              <a:rPr lang="de-DE" sz="3000" dirty="0" smtClean="0"/>
-              <a:t>ist </a:t>
+              <a:t>Spiel mit einem freien Flugmodus und </a:t>
+            </a:r>
+            <a:r>
+              <a:rPr lang="de-DE" sz="3000" dirty="0" smtClean="0"/>
+              <a:t>einem </a:t>
             </a:r>
             <a:r>
               <a:rPr lang="de-DE" sz="3000" dirty="0"/>
-              <a:t>als Spiel mit einem freien Flugmodus und einen kompetitiven Rennmodus </a:t>
-            </a:r>
-            <a:r>
-              <a:rPr lang="de-DE" sz="3000" dirty="0" smtClean="0"/>
-              <a:t>konzipiert. Da </a:t>
-            </a:r>
-            <a:r>
-              <a:rPr lang="de-DE" sz="3000" dirty="0" err="1" smtClean="0"/>
-              <a:t>Touchoberflächen</a:t>
-            </a:r>
-            <a:r>
-              <a:rPr lang="de-DE" sz="3000" dirty="0" smtClean="0"/>
-              <a:t> im Bereich der Spiele nur wenig verbreitet sind, </a:t>
+              <a:t>kompetitiven Rennmodus </a:t>
+            </a:r>
+            <a:r>
+              <a:rPr lang="de-DE" sz="3000" dirty="0" smtClean="0"/>
+              <a:t>konzipiert</a:t>
+            </a:r>
+            <a:r>
+              <a:rPr lang="de-DE" sz="3000" dirty="0" smtClean="0"/>
+              <a:t>. Da die Steuerung einer Drohne mit einem Touchscreen ohne fühlbare Tasten mitunter schwierig ist, </a:t>
+            </a:r>
+            <a:r>
+              <a:rPr lang="de-DE" sz="3000" dirty="0" smtClean="0"/>
+              <a:t>wurden mit </a:t>
             </a:r>
             <a:r>
               <a:rPr lang="de-DE" sz="3000" dirty="0"/>
-              <a:t>wurden mit Hilfe von </a:t>
+              <a:t>Hilfe von </a:t>
             </a:r>
             <a:r>
               <a:rPr lang="de-DE" sz="3000" dirty="0" err="1"/>
@@ -1144,7 +1256,23 @@
             </a:r>
             <a:r>
               <a:rPr lang="de-DE" sz="3000" dirty="0" smtClean="0"/>
-              <a:t>mehrere typische Eingabegeräte aus dem Spieleumfeld angebunden. </a:t>
+              <a:t>mehrere typische </a:t>
+            </a:r>
+            <a:r>
+              <a:rPr lang="de-DE" sz="3000" dirty="0" smtClean="0"/>
+              <a:t>Eingabegeräte aus </a:t>
+            </a:r>
+            <a:r>
+              <a:rPr lang="de-DE" sz="3000" dirty="0" smtClean="0"/>
+              <a:t>dem </a:t>
+            </a:r>
+            <a:r>
+              <a:rPr lang="de-DE" sz="3000" dirty="0" smtClean="0"/>
+              <a:t>Umfeld der Computerspiele angebunden</a:t>
+            </a:r>
+            <a:r>
+              <a:rPr lang="de-DE" sz="3000" dirty="0" smtClean="0"/>
+              <a:t>, welche diesen Vorteil bieten.</a:t>
             </a:r>
             <a:endParaRPr lang="de-DE" sz="3000" dirty="0"/>
           </a:p>
@@ -1232,7 +1360,7 @@
         </p:nvSpPr>
         <p:spPr>
           <a:xfrm>
-            <a:off x="15735971" y="27711349"/>
+            <a:off x="15690317" y="27711349"/>
             <a:ext cx="5883556" cy="923330"/>
           </a:xfrm>
           <a:prstGeom prst="rect">
@@ -1267,7 +1395,7 @@
         </p:nvSpPr>
         <p:spPr>
           <a:xfrm>
-            <a:off x="15758296" y="28789946"/>
+            <a:off x="15690317" y="28789946"/>
             <a:ext cx="12529393" cy="6872990"/>
           </a:xfrm>
           <a:prstGeom prst="rect">
@@ -1284,7 +1412,27 @@
             <a:pPr algn="just"/>
             <a:r>
               <a:rPr lang="de-DE" sz="3000" dirty="0" smtClean="0"/>
-              <a:t>In einem ersten Schritt wurde mit der Anbindung mehrerer Eingabegeräte zur Steuerung der Drohne eine Basis für weitere Untersuchungen geschaffen. Im nächsten Schritt kann nun evaluiert werden, welches der Eingabegeräte sich als besonders effektiv zur Steuerung der Drohne herausstellt. Die Konzipierung des Projekts als kompetitives Rennspiel fördert dies, da zu erwarten steht, dass ein Benutzer eine möglichst genaue Steuerung  anstrebt.</a:t>
+              <a:t>In diesem Projekt wurde </a:t>
+            </a:r>
+            <a:r>
+              <a:rPr lang="de-DE" sz="3000" dirty="0" smtClean="0"/>
+              <a:t>mit der Anbindung mehrerer Eingabegeräte zur Steuerung der Drohne </a:t>
+            </a:r>
+            <a:r>
+              <a:rPr lang="de-DE" sz="3000" dirty="0" smtClean="0"/>
+              <a:t>die Basis </a:t>
+            </a:r>
+            <a:r>
+              <a:rPr lang="de-DE" sz="3000" dirty="0" smtClean="0"/>
+              <a:t>für weitere Untersuchungen geschaffen. Im nächsten Schritt kann nun evaluiert werden, welches der Eingabegeräte sich als besonders effektiv zur Steuerung der Drohne herausstellt. </a:t>
+            </a:r>
+            <a:r>
+              <a:rPr lang="de-DE" sz="3000" dirty="0" smtClean="0"/>
+              <a:t>Da das Projekt als kompetitives Rennspiel konzipiert wurde, bietet es sich für eine solche Studie an</a:t>
+            </a:r>
+            <a:r>
+              <a:rPr lang="de-DE" sz="3000" dirty="0" smtClean="0"/>
+              <a:t>, denn es ist zu erwarten, dass ein Benutzer hierbei eine möglichst genaue Steuerung anstrebt.</a:t>
             </a:r>
           </a:p>
           <a:p>
@@ -1295,7 +1443,23 @@
             <a:pPr algn="just"/>
             <a:r>
               <a:rPr lang="de-DE" sz="3000" dirty="0" smtClean="0"/>
-              <a:t>Denkbar wäre darüber hinaus eine Untersuchung der Unterschiede zwischen verschiedenen Benutzergruppen. Von besonderem Interesse sind vor allem die Auswirkung von Geschlecht, Alter und technischer Erfahrung bzw. Spieleerfahrung auf das subjektive Empfinden der Testperson bei der Steuerung und der Fähigkeit zur Bewältigung des Parcours.</a:t>
+              <a:t>Denkbar </a:t>
+            </a:r>
+            <a:r>
+              <a:rPr lang="de-DE" sz="3000" dirty="0" smtClean="0"/>
+              <a:t>wäre darüber hinaus eine Untersuchung der Unterschiede zwischen verschiedenen Benutzergruppen. Von besonderem Interesse sind vor allem die Auswirkung von </a:t>
+            </a:r>
+            <a:r>
+              <a:rPr lang="de-DE" sz="3000" dirty="0" smtClean="0"/>
+              <a:t>Alter, Geschlecht</a:t>
+            </a:r>
+            <a:r>
+              <a:rPr lang="de-DE" sz="3000" dirty="0" smtClean="0"/>
+              <a:t> und </a:t>
+            </a:r>
+            <a:r>
+              <a:rPr lang="de-DE" sz="3000" dirty="0" smtClean="0"/>
+              <a:t>technischer Erfahrung bzw. Spieleerfahrung auf das subjektive Empfinden der Testperson bei der Steuerung und der Fähigkeit zur Bewältigung des Parcours.</a:t>
             </a:r>
           </a:p>
         </p:txBody>
@@ -1308,7 +1472,7 @@
         </p:nvSpPr>
         <p:spPr>
           <a:xfrm>
-            <a:off x="15758295" y="35454247"/>
+            <a:off x="15690317" y="35454247"/>
             <a:ext cx="12529393" cy="923330"/>
           </a:xfrm>
           <a:prstGeom prst="rect">
@@ -1343,7 +1507,7 @@
         </p:nvSpPr>
         <p:spPr>
           <a:xfrm>
-            <a:off x="15758295" y="36377577"/>
+            <a:off x="15690317" y="36377577"/>
             <a:ext cx="12529390" cy="1948565"/>
           </a:xfrm>
           <a:prstGeom prst="rect">
@@ -1365,69 +1529,27 @@
               <a:buChar char="•"/>
             </a:pPr>
             <a:r>
-              <a:rPr lang="en-US" sz="2400" dirty="0" smtClean="0">
-                <a:solidFill>
-                  <a:srgbClr val="262626"/>
-                </a:solidFill>
-              </a:rPr>
+              <a:rPr lang="en-US" sz="2400" b="1" dirty="0" smtClean="0"/>
               <a:t>Parrot</a:t>
             </a:r>
             <a:r>
-              <a:rPr lang="en-US" sz="2400" dirty="0">
-                <a:solidFill>
-                  <a:srgbClr val="262626"/>
-                </a:solidFill>
-              </a:rPr>
-              <a:t>, </a:t>
-            </a:r>
-            <a:r>
-              <a:rPr lang="en-US" sz="2400" dirty="0">
-                <a:solidFill>
-                  <a:srgbClr val="262626"/>
-                </a:solidFill>
-                <a:hlinkClick r:id="rId3"/>
-              </a:rPr>
-              <a:t>http://www.parrot.com/de/produkte/bebop2</a:t>
-            </a:r>
-            <a:r>
-              <a:rPr lang="en-US" sz="2400" dirty="0" smtClean="0">
-                <a:solidFill>
-                  <a:srgbClr val="262626"/>
-                </a:solidFill>
-                <a:hlinkClick r:id="rId3"/>
-              </a:rPr>
-              <a:t>/</a:t>
-            </a:r>
-            <a:r>
-              <a:rPr lang="en-US" sz="2400" dirty="0" smtClean="0">
-                <a:solidFill>
-                  <a:srgbClr val="262626"/>
-                </a:solidFill>
-              </a:rPr>
-              <a:t> (5. </a:t>
-            </a:r>
-            <a:r>
-              <a:rPr lang="en-US" sz="2400" dirty="0" err="1" smtClean="0">
-                <a:solidFill>
-                  <a:srgbClr val="262626"/>
-                </a:solidFill>
-              </a:rPr>
+              <a:rPr lang="en-US" sz="2400" dirty="0"/>
+              <a:t>, http://www.parrot.com/de/produkte/bebop2</a:t>
+            </a:r>
+            <a:r>
+              <a:rPr lang="en-US" sz="2400" dirty="0" smtClean="0"/>
+              <a:t>/ (5. </a:t>
+            </a:r>
+            <a:r>
+              <a:rPr lang="en-US" sz="2400" dirty="0" err="1" smtClean="0"/>
               <a:t>Juli</a:t>
             </a:r>
             <a:r>
-              <a:rPr lang="en-US" sz="2400" dirty="0" smtClean="0">
-                <a:solidFill>
-                  <a:srgbClr val="262626"/>
-                </a:solidFill>
-              </a:rPr>
+              <a:rPr lang="en-US" sz="2400" dirty="0" smtClean="0"/>
               <a:t>  2016</a:t>
             </a:r>
             <a:r>
-              <a:rPr lang="en-US" sz="2400" dirty="0">
-                <a:solidFill>
-                  <a:srgbClr val="262626"/>
-                </a:solidFill>
-              </a:rPr>
+              <a:rPr lang="en-US" sz="2400" dirty="0"/>
               <a:t>)</a:t>
             </a:r>
           </a:p>
@@ -1440,76 +1562,30 @@
               <a:buChar char="•"/>
             </a:pPr>
             <a:r>
-              <a:rPr lang="en-US" sz="2400" dirty="0" err="1" smtClean="0">
-                <a:solidFill>
-                  <a:srgbClr val="262626"/>
-                </a:solidFill>
-              </a:rPr>
+              <a:rPr lang="en-US" sz="2400" b="1" dirty="0" err="1" smtClean="0"/>
               <a:t>NodeJS</a:t>
             </a:r>
             <a:r>
-              <a:rPr lang="en-US" sz="2400" dirty="0" smtClean="0">
-                <a:solidFill>
-                  <a:srgbClr val="262626"/>
-                </a:solidFill>
-              </a:rPr>
+              <a:rPr lang="en-US" sz="2400" dirty="0" smtClean="0"/>
               <a:t>,</a:t>
             </a:r>
             <a:r>
-              <a:rPr lang="en-US" sz="2400" dirty="0">
-                <a:solidFill>
-                  <a:srgbClr val="262626"/>
-                </a:solidFill>
-              </a:rPr>
-              <a:t>  </a:t>
-            </a:r>
-            <a:r>
-              <a:rPr lang="en-US" sz="2400" dirty="0">
-                <a:solidFill>
-                  <a:srgbClr val="262626"/>
-                </a:solidFill>
-                <a:hlinkClick r:id="rId4"/>
-              </a:rPr>
-              <a:t>https://nodejs.org/en</a:t>
-            </a:r>
-            <a:r>
-              <a:rPr lang="en-US" sz="2400" dirty="0" smtClean="0">
-                <a:solidFill>
-                  <a:srgbClr val="262626"/>
-                </a:solidFill>
-                <a:hlinkClick r:id="rId4"/>
-              </a:rPr>
-              <a:t>/</a:t>
-            </a:r>
-            <a:r>
-              <a:rPr lang="en-US" sz="2400" dirty="0" smtClean="0">
-                <a:solidFill>
-                  <a:srgbClr val="262626"/>
-                </a:solidFill>
-              </a:rPr>
-              <a:t> (5. </a:t>
-            </a:r>
-            <a:r>
-              <a:rPr lang="en-US" sz="2400" dirty="0" err="1" smtClean="0">
-                <a:solidFill>
-                  <a:srgbClr val="262626"/>
-                </a:solidFill>
-              </a:rPr>
+              <a:rPr lang="en-US" sz="2400" dirty="0"/>
+              <a:t>  https://nodejs.org/en</a:t>
+            </a:r>
+            <a:r>
+              <a:rPr lang="en-US" sz="2400" dirty="0" smtClean="0"/>
+              <a:t>/ (5. </a:t>
+            </a:r>
+            <a:r>
+              <a:rPr lang="en-US" sz="2400" dirty="0" err="1" smtClean="0"/>
               <a:t>Juli</a:t>
             </a:r>
             <a:r>
-              <a:rPr lang="en-US" sz="2400" dirty="0" smtClean="0">
-                <a:solidFill>
-                  <a:srgbClr val="262626"/>
-                </a:solidFill>
-              </a:rPr>
+              <a:rPr lang="en-US" sz="2400" dirty="0" smtClean="0"/>
               <a:t>  2016)</a:t>
             </a:r>
-            <a:endParaRPr lang="de-DE" sz="2400" dirty="0">
-              <a:solidFill>
-                <a:srgbClr val="262626"/>
-              </a:solidFill>
-            </a:endParaRPr>
+            <a:endParaRPr lang="de-DE" sz="2400" dirty="0"/>
           </a:p>
           <a:p>
             <a:pPr marL="457200" indent="-457200">
@@ -1520,68 +1596,26 @@
               <a:buChar char="•"/>
             </a:pPr>
             <a:r>
-              <a:rPr lang="en-US" sz="2400" dirty="0" err="1" smtClean="0">
-                <a:solidFill>
-                  <a:srgbClr val="262626"/>
-                </a:solidFill>
-              </a:rPr>
+              <a:rPr lang="en-US" sz="2400" b="1" dirty="0" err="1" smtClean="0"/>
               <a:t>WiiRemoteJ</a:t>
             </a:r>
             <a:r>
-              <a:rPr lang="en-US" sz="2400" dirty="0">
-                <a:solidFill>
-                  <a:srgbClr val="262626"/>
-                </a:solidFill>
-              </a:rPr>
-              <a:t>, </a:t>
-            </a:r>
-            <a:r>
-              <a:rPr lang="en-US" sz="2400" dirty="0">
-                <a:solidFill>
-                  <a:srgbClr val="262626"/>
-                </a:solidFill>
-                <a:hlinkClick r:id="rId5"/>
-              </a:rPr>
-              <a:t>https://</a:t>
-            </a:r>
-            <a:r>
-              <a:rPr lang="en-US" sz="2400" dirty="0" smtClean="0">
-                <a:solidFill>
-                  <a:srgbClr val="262626"/>
-                </a:solidFill>
-                <a:hlinkClick r:id="rId5"/>
-              </a:rPr>
-              <a:t>github.com/micromu/WiiRemoteJ</a:t>
-            </a:r>
-            <a:r>
-              <a:rPr lang="en-US" sz="2400" dirty="0" smtClean="0">
-                <a:solidFill>
-                  <a:srgbClr val="262626"/>
-                </a:solidFill>
-              </a:rPr>
-              <a:t> (5. </a:t>
-            </a:r>
-            <a:r>
-              <a:rPr lang="en-US" sz="2400" dirty="0" err="1" smtClean="0">
-                <a:solidFill>
-                  <a:srgbClr val="262626"/>
-                </a:solidFill>
-              </a:rPr>
+              <a:rPr lang="en-US" sz="2400" dirty="0"/>
+              <a:t>, https://</a:t>
+            </a:r>
+            <a:r>
+              <a:rPr lang="en-US" sz="2400" dirty="0" smtClean="0"/>
+              <a:t>github.com/micromu/WiiRemoteJ (5. </a:t>
+            </a:r>
+            <a:r>
+              <a:rPr lang="en-US" sz="2400" dirty="0" err="1" smtClean="0"/>
               <a:t>Juli</a:t>
             </a:r>
             <a:r>
-              <a:rPr lang="en-US" sz="2400" dirty="0" smtClean="0">
-                <a:solidFill>
-                  <a:srgbClr val="262626"/>
-                </a:solidFill>
-              </a:rPr>
+              <a:rPr lang="en-US" sz="2400" dirty="0" smtClean="0"/>
               <a:t> 2016)</a:t>
             </a:r>
-            <a:endParaRPr lang="en-US" sz="2400" dirty="0">
-              <a:solidFill>
-                <a:srgbClr val="262626"/>
-              </a:solidFill>
-            </a:endParaRPr>
+            <a:endParaRPr lang="en-US" sz="2400" dirty="0"/>
           </a:p>
           <a:p>
             <a:pPr marL="457200" indent="-457200">
@@ -1592,62 +1626,24 @@
               <a:buChar char="•"/>
             </a:pPr>
             <a:r>
-              <a:rPr lang="en-US" sz="2400" dirty="0" smtClean="0">
-                <a:solidFill>
-                  <a:srgbClr val="262626"/>
-                </a:solidFill>
-              </a:rPr>
+              <a:rPr lang="en-US" sz="2400" b="1" dirty="0" smtClean="0"/>
               <a:t>GitHub </a:t>
             </a:r>
             <a:r>
-              <a:rPr lang="en-US" sz="2400" dirty="0" err="1" smtClean="0">
-                <a:solidFill>
-                  <a:srgbClr val="262626"/>
-                </a:solidFill>
-              </a:rPr>
+              <a:rPr lang="en-US" sz="2400" b="1" dirty="0" err="1" smtClean="0"/>
               <a:t>Projekt</a:t>
             </a:r>
             <a:r>
-              <a:rPr lang="en-US" sz="2400" dirty="0" smtClean="0">
-                <a:solidFill>
-                  <a:srgbClr val="262626"/>
-                </a:solidFill>
-              </a:rPr>
+              <a:rPr lang="en-US" sz="2400" dirty="0" smtClean="0"/>
               <a:t>,</a:t>
             </a:r>
             <a:r>
-              <a:rPr lang="en-US" sz="2400" dirty="0">
-                <a:solidFill>
-                  <a:srgbClr val="262626"/>
-                </a:solidFill>
-              </a:rPr>
-              <a:t>  </a:t>
-            </a:r>
-            <a:r>
-              <a:rPr lang="en-US" sz="2400" dirty="0">
-                <a:solidFill>
-                  <a:srgbClr val="262626"/>
-                </a:solidFill>
-                <a:hlinkClick r:id="rId6"/>
-              </a:rPr>
-              <a:t>https://</a:t>
-            </a:r>
-            <a:r>
-              <a:rPr lang="en-US" sz="2400" dirty="0" smtClean="0">
-                <a:solidFill>
-                  <a:srgbClr val="262626"/>
-                </a:solidFill>
-                <a:hlinkClick r:id="rId6"/>
-              </a:rPr>
-              <a:t>github.com/fog1992/AIS-Drone</a:t>
-            </a:r>
-            <a:r>
-              <a:rPr lang="en-US" sz="2400" dirty="0" smtClean="0">
-                <a:solidFill>
-                  <a:srgbClr val="262626"/>
-                </a:solidFill>
-              </a:rPr>
-              <a:t> (5. </a:t>
+              <a:rPr lang="en-US" sz="2400" dirty="0"/>
+              <a:t>  https://</a:t>
+            </a:r>
+            <a:r>
+              <a:rPr lang="en-US" sz="2400" dirty="0" smtClean="0"/>
+              <a:t>github.com/fog1992/AIS-Drone (5. </a:t>
             </a:r>
             <a:r>
               <a:rPr lang="en-US" sz="2400" dirty="0" err="1" smtClean="0">
@@ -1720,14 +1716,14 @@
           <p:nvPr/>
         </p:nvPicPr>
         <p:blipFill>
-          <a:blip r:embed="rId7" cstate="print"/>
+          <a:blip r:embed="rId3" cstate="print"/>
           <a:stretch>
             <a:fillRect/>
           </a:stretch>
         </p:blipFill>
         <p:spPr>
           <a:xfrm>
-            <a:off x="15690317" y="18307918"/>
+            <a:off x="15750120" y="18307918"/>
             <a:ext cx="12495323" cy="5897644"/>
           </a:xfrm>
           <a:prstGeom prst="rect">
@@ -1751,7 +1747,7 @@
         </p:nvSpPr>
         <p:spPr>
           <a:xfrm>
-            <a:off x="15728258" y="10819086"/>
+            <a:off x="15690317" y="10819086"/>
             <a:ext cx="12529390" cy="7067430"/>
           </a:xfrm>
           <a:prstGeom prst="rect">
@@ -1824,7 +1820,23 @@
             </a:r>
             <a:r>
               <a:rPr lang="de-DE" sz="3000" dirty="0" smtClean="0"/>
-              <a:t>-Module (existierende Softwarepakete in </a:t>
+              <a:t>-Module </a:t>
+            </a:r>
+            <a:r>
+              <a:rPr lang="de-DE" sz="3000" dirty="0" smtClean="0"/>
+              <a:t>eingebunden. </a:t>
+            </a:r>
+            <a:r>
+              <a:rPr lang="de-DE" sz="3000" dirty="0" err="1" smtClean="0"/>
+              <a:t>Node</a:t>
+            </a:r>
+            <a:r>
+              <a:rPr lang="de-DE" sz="3000" dirty="0" smtClean="0"/>
+              <a:t>-Module </a:t>
+            </a:r>
+            <a:r>
+              <a:rPr lang="de-DE" sz="3000" dirty="0"/>
+              <a:t>sind existierende Softwarepakete in </a:t>
             </a:r>
             <a:r>
               <a:rPr lang="de-DE" sz="3000" dirty="0" err="1" smtClean="0"/>
@@ -1832,8 +1844,9 @@
             </a:r>
             <a:r>
               <a:rPr lang="de-DE" sz="3000" dirty="0" smtClean="0"/>
-              <a:t>) eingebunden.</a:t>
-            </a:r>
+              <a:t>.</a:t>
+            </a:r>
+            <a:endParaRPr lang="de-DE" sz="3000" dirty="0" smtClean="0"/>
           </a:p>
           <a:p>
             <a:pPr algn="just"/>
@@ -1851,15 +1864,39 @@
             </a:r>
             <a:r>
               <a:rPr lang="de-DE" sz="3000" dirty="0"/>
-              <a:t> zum Einsatz, die eine bequeme Anbindung Wii-bezogener Peripherie ermöglicht. Hierzu wurde eine separate Java- Applikation entwickelt, welche zu Beginn des Hauptprogramms gestartet wird. Die Kommunikation der dafür benötigten, selbst erstellten Java- Applikation mit der </a:t>
-            </a:r>
-            <a:r>
-              <a:rPr lang="de-DE" sz="3000" dirty="0" err="1"/>
+              <a:t> zum Einsatz, die eine bequeme </a:t>
+            </a:r>
+            <a:r>
+              <a:rPr lang="de-DE" sz="3000" dirty="0" smtClean="0"/>
+              <a:t>Anbindung von Wii-Peripheriegeräten </a:t>
+            </a:r>
+            <a:r>
+              <a:rPr lang="de-DE" sz="3000" dirty="0"/>
+              <a:t>ermöglicht. Hierzu wurde eine separate Java- Applikation entwickelt, welche zu Beginn des Hauptprogramms gestartet wird. Die Kommunikation der </a:t>
+            </a:r>
+            <a:r>
+              <a:rPr lang="de-DE" sz="3000" dirty="0" smtClean="0"/>
+              <a:t>Java-Applikation </a:t>
+            </a:r>
+            <a:r>
+              <a:rPr lang="de-DE" sz="3000" dirty="0"/>
+              <a:t>mit der </a:t>
+            </a:r>
+            <a:r>
+              <a:rPr lang="de-DE" sz="3000" dirty="0" err="1" smtClean="0"/>
               <a:t>NodeJS</a:t>
             </a:r>
             <a:r>
+              <a:rPr lang="de-DE" sz="3000" dirty="0" smtClean="0"/>
+              <a:t>-</a:t>
+            </a:r>
+            <a:r>
+              <a:rPr lang="de-DE" sz="3000" dirty="0" smtClean="0"/>
+              <a:t>Anwendung </a:t>
+            </a:r>
+            <a:r>
               <a:rPr lang="de-DE" sz="3000" dirty="0"/>
-              <a:t> Schicht findet über TCP-Sockets statt.</a:t>
+              <a:t>findet über TCP-Sockets statt.</a:t>
             </a:r>
           </a:p>
           <a:p>
@@ -1880,7 +1917,7 @@
         </p:nvSpPr>
         <p:spPr>
           <a:xfrm>
-            <a:off x="1674493" y="15056301"/>
+            <a:off x="1652246" y="15056301"/>
             <a:ext cx="12529390" cy="8933237"/>
           </a:xfrm>
           <a:prstGeom prst="rect">
@@ -1929,10 +1966,26 @@
                   <a:srgbClr val="262626"/>
                 </a:solidFill>
               </a:rPr>
-              <a:t>Als Eingabegeräte kommen Tastatur, Xbox Controller, Logitech </a:t>
-            </a:r>
-            <a:r>
-              <a:rPr lang="de-DE" sz="3000" dirty="0" err="1">
+              <a:t>Als Eingabegeräte kommen Tastatur, </a:t>
+            </a:r>
+            <a:r>
+              <a:rPr lang="de-DE" sz="3000" dirty="0" smtClean="0">
+                <a:solidFill>
+                  <a:srgbClr val="262626"/>
+                </a:solidFill>
+              </a:rPr>
+              <a:t>Xbox 360 </a:t>
+            </a:r>
+            <a:r>
+              <a:rPr lang="de-DE" sz="3000" dirty="0">
+                <a:solidFill>
+                  <a:srgbClr val="262626"/>
+                </a:solidFill>
+              </a:rPr>
+              <a:t>Controller, Logitech </a:t>
+            </a:r>
+            <a:r>
+              <a:rPr lang="de-DE" sz="3000" dirty="0" err="1" smtClean="0">
                 <a:solidFill>
                   <a:srgbClr val="262626"/>
                 </a:solidFill>
@@ -1940,12 +1993,20 @@
               <a:t>Attack</a:t>
             </a:r>
             <a:r>
+              <a:rPr lang="de-DE" sz="3000" dirty="0" smtClean="0">
+                <a:solidFill>
+                  <a:srgbClr val="262626"/>
+                </a:solidFill>
+              </a:rPr>
+              <a:t> 3 </a:t>
+            </a:r>
+            <a:r>
               <a:rPr lang="de-DE" sz="3000" dirty="0">
                 <a:solidFill>
                   <a:srgbClr val="262626"/>
                 </a:solidFill>
               </a:rPr>
-              <a:t> Joystick und das Wii Balance Board von Nintendo zum Einsatz. </a:t>
+              <a:t>Joystick und das Wii Balance Board von Nintendo zum Einsatz. </a:t>
             </a:r>
             <a:r>
               <a:rPr lang="de-DE" sz="3000" dirty="0" smtClean="0"/>
@@ -1973,7 +2034,15 @@
             </a:r>
             <a:r>
               <a:rPr lang="de-DE" sz="3000" dirty="0" smtClean="0"/>
-              <a:t>. Dazwischen wird die benötigte Zeit zur Bewältigung des Parcours für jedes Peripheriegerät gemessen und bei Landung am Zielpunkt in eine Tabelle übernommen. </a:t>
+              <a:t>. Dazwischen wird die benötigte Zeit zur Bewältigung des Parcours für jedes Peripheriegerät gemessen und bei Landung </a:t>
+            </a:r>
+            <a:r>
+              <a:rPr lang="de-DE" sz="3000" dirty="0" smtClean="0"/>
+              <a:t>im Zielbereich </a:t>
+            </a:r>
+            <a:r>
+              <a:rPr lang="de-DE" sz="3000" dirty="0" smtClean="0"/>
+              <a:t>in eine Tabelle übernommen. </a:t>
             </a:r>
             <a:r>
               <a:rPr lang="de-DE" sz="3000" dirty="0"/>
@@ -1989,7 +2058,7 @@
             <a:pPr algn="just"/>
             <a:r>
               <a:rPr lang="de-DE" sz="3000" dirty="0" smtClean="0"/>
-              <a:t>Das Spielfeld kann durch die Festlegung eines GPS Wertes als Mittelpunkt und die Angabe eines Radius (in Meter) begrenzt werden. Da die Position seitens der Drohne nur sekündlich aktualisiert wird, ist sie bei steigender Geschwindigkeit relativ ungenau. Darum wird ein menschlicher </a:t>
+              <a:t>Das Spielfeld kann durch die Festlegung eines GPS Wertes als Mittelpunkt und die Angabe eines Radius (in Meter) kreisförmig begrenzt werden. Da die Position seitens der Drohne nur sekündlich aktualisiert wird, ist sie bei steigender Geschwindigkeit relativ ungenau. Darum wird ein menschlicher </a:t>
             </a:r>
             <a:r>
               <a:rPr lang="de-DE" sz="3000" dirty="0"/>
@@ -2013,15 +2082,7 @@
             </a:r>
             <a:r>
               <a:rPr lang="de-DE" sz="3000" dirty="0" smtClean="0"/>
-              <a:t>. Da für das Wii Balance Board keine sinnvolle Start- und Landemöglichkeit existiert, werden Start und Landung in diesem Fall vom </a:t>
-            </a:r>
-            <a:r>
-              <a:rPr lang="de-DE" sz="3000" dirty="0" smtClean="0"/>
-              <a:t>Schiedsrichter </a:t>
-            </a:r>
-            <a:r>
-              <a:rPr lang="de-DE" sz="3000" dirty="0" smtClean="0"/>
-              <a:t>mit der Tastatur durchgeführt.</a:t>
+              <a:t>. Da für das Wii Balance Board keine sinnvolle Start- und Landemöglichkeit existiert, werden Start und Landung in diesem Fall vom Schiedsrichter mit der Tastatur durchgeführt.</a:t>
             </a:r>
           </a:p>
         </p:txBody>
@@ -2034,8 +2095,8 @@
         </p:nvSpPr>
         <p:spPr>
           <a:xfrm>
-            <a:off x="6942364" y="39988985"/>
-            <a:ext cx="11844231" cy="1446550"/>
+            <a:off x="6942364" y="39982326"/>
+            <a:ext cx="11844231" cy="1569660"/>
           </a:xfrm>
           <a:prstGeom prst="rect">
             <a:avLst/>
@@ -2049,17 +2110,30 @@
           <a:lstStyle/>
           <a:p>
             <a:r>
-              <a:rPr lang="de-DE" sz="4400" dirty="0" smtClean="0">
-                <a:solidFill>
-                  <a:srgbClr val="262626"/>
-                </a:solidFill>
-              </a:rPr>
-              <a:t>Informatik Master</a:t>
-            </a:r>
-          </a:p>
-          <a:p>
-            <a:r>
-              <a:rPr lang="de-DE" sz="4400" dirty="0" err="1" smtClean="0">
+              <a:rPr lang="de-DE" sz="3200" dirty="0" smtClean="0">
+                <a:solidFill>
+                  <a:srgbClr val="262626"/>
+                </a:solidFill>
+              </a:rPr>
+              <a:t>Master-Studiengang Informatik</a:t>
+            </a:r>
+            <a:endParaRPr lang="de-DE" sz="3200" dirty="0" smtClean="0">
+              <a:solidFill>
+                <a:srgbClr val="262626"/>
+              </a:solidFill>
+            </a:endParaRPr>
+          </a:p>
+          <a:p>
+            <a:r>
+              <a:rPr lang="de-DE" sz="3200" dirty="0" smtClean="0">
+                <a:solidFill>
+                  <a:srgbClr val="262626"/>
+                </a:solidFill>
+              </a:rPr>
+              <a:t>Modul </a:t>
+            </a:r>
+            <a:r>
+              <a:rPr lang="de-DE" sz="3200" dirty="0" err="1" smtClean="0">
                 <a:solidFill>
                   <a:srgbClr val="262626"/>
                 </a:solidFill>
@@ -2067,29 +2141,49 @@
               <a:t>Advanced</a:t>
             </a:r>
             <a:r>
-              <a:rPr lang="de-DE" sz="4400" dirty="0" smtClean="0">
-                <a:solidFill>
-                  <a:srgbClr val="262626"/>
-                </a:solidFill>
-              </a:rPr>
-              <a:t> Interactive Systems (</a:t>
-            </a:r>
-            <a:r>
-              <a:rPr lang="de-DE" sz="4400" dirty="0" err="1" smtClean="0">
-                <a:solidFill>
-                  <a:srgbClr val="262626"/>
-                </a:solidFill>
-              </a:rPr>
-              <a:t>SoSe</a:t>
-            </a:r>
-            <a:r>
-              <a:rPr lang="de-DE" sz="4400" dirty="0" smtClean="0">
-                <a:solidFill>
-                  <a:srgbClr val="262626"/>
-                </a:solidFill>
-              </a:rPr>
-              <a:t> 2016)</a:t>
-            </a:r>
+              <a:rPr lang="de-DE" sz="3200" dirty="0" smtClean="0">
+                <a:solidFill>
+                  <a:srgbClr val="262626"/>
+                </a:solidFill>
+              </a:rPr>
+              <a:t> </a:t>
+            </a:r>
+            <a:r>
+              <a:rPr lang="de-DE" sz="3200" dirty="0" smtClean="0">
+                <a:solidFill>
+                  <a:srgbClr val="262626"/>
+                </a:solidFill>
+              </a:rPr>
+              <a:t>Interactive Systems </a:t>
+            </a:r>
+            <a:endParaRPr lang="de-DE" sz="3200" dirty="0" smtClean="0">
+              <a:solidFill>
+                <a:srgbClr val="262626"/>
+              </a:solidFill>
+            </a:endParaRPr>
+          </a:p>
+          <a:p>
+            <a:r>
+              <a:rPr lang="de-DE" sz="3200" dirty="0" smtClean="0">
+                <a:solidFill>
+                  <a:srgbClr val="262626"/>
+                </a:solidFill>
+              </a:rPr>
+              <a:t>Sommersemester</a:t>
+            </a:r>
+            <a:r>
+              <a:rPr lang="de-DE" sz="3200" dirty="0" smtClean="0">
+                <a:solidFill>
+                  <a:srgbClr val="262626"/>
+                </a:solidFill>
+              </a:rPr>
+              <a:t> 2016</a:t>
+            </a:r>
+            <a:endParaRPr lang="de-DE" sz="3200" dirty="0" smtClean="0">
+              <a:solidFill>
+                <a:srgbClr val="262626"/>
+              </a:solidFill>
+            </a:endParaRPr>
           </a:p>
         </p:txBody>
       </p:sp>
@@ -2150,19 +2244,7 @@
             <a:pPr algn="just"/>
             <a:r>
               <a:rPr lang="de-DE" sz="3000" dirty="0" smtClean="0"/>
-              <a:t>Aus Sicherheitsgründen kann die Steuerung der Drohne jederzeit mit der Tastatur </a:t>
-            </a:r>
-            <a:r>
-              <a:rPr lang="de-DE" sz="3000" dirty="0" smtClean="0"/>
-              <a:t>des </a:t>
-            </a:r>
-            <a:r>
-              <a:rPr lang="de-DE" sz="3000" smtClean="0"/>
-              <a:t>Towers übernommen </a:t>
-            </a:r>
-            <a:r>
-              <a:rPr lang="de-DE" sz="3000" dirty="0" smtClean="0"/>
-              <a:t>und alle Peripheriegeräte separat aktiviert bzw. deaktiviert werden.</a:t>
+              <a:t>Aus Sicherheitsgründen kann die Steuerung der Drohne jederzeit mit der Tastatur des Towers übernommen und alle Peripheriegeräte separat aktiviert bzw. deaktiviert werden.</a:t>
             </a:r>
             <a:endParaRPr lang="de-DE" sz="3000" dirty="0"/>
           </a:p>
@@ -2177,11 +2259,11 @@
           <p:nvPr/>
         </p:nvPicPr>
         <p:blipFill>
-          <a:blip r:embed="rId8" cstate="print">
+          <a:blip r:embed="rId4" cstate="print">
             <a:extLst>
               <a:ext uri="{BEBA8EAE-BF5A-486C-A8C5-ECC9F3942E4B}">
                 <a14:imgProps xmlns:a14="http://schemas.microsoft.com/office/drawing/2010/main">
-                  <a14:imgLayer r:embed="rId9">
+                  <a14:imgLayer r:embed="rId5">
                     <a14:imgEffect>
                       <a14:artisticPlasticWrap/>
                     </a14:imgEffect>
@@ -2241,430 +2323,802 @@
           </a:extLst>
         </p:spPr>
       </p:pic>
+      <p:sp>
+        <p:nvSpPr>
+          <p:cNvPr id="38" name="Textfeld 37"/>
+          <p:cNvSpPr txBox="1"/>
+          <p:nvPr/>
+        </p:nvSpPr>
+        <p:spPr>
+          <a:xfrm>
+            <a:off x="1652246" y="24068558"/>
+            <a:ext cx="12529392" cy="923330"/>
+          </a:xfrm>
+          <a:prstGeom prst="rect">
+            <a:avLst/>
+          </a:prstGeom>
+          <a:noFill/>
+        </p:spPr>
+        <p:txBody>
+          <a:bodyPr wrap="square" rtlCol="0">
+            <a:spAutoFit/>
+          </a:bodyPr>
+          <a:lstStyle/>
+          <a:p>
+            <a:r>
+              <a:rPr lang="de-DE" sz="5400" dirty="0" smtClean="0">
+                <a:solidFill>
+                  <a:schemeClr val="accent5"/>
+                </a:solidFill>
+                <a:latin typeface="+mj-lt"/>
+                <a:cs typeface="Times New Roman" pitchFamily="18" charset="0"/>
+              </a:rPr>
+              <a:t>Die Umsetzung</a:t>
+            </a:r>
+          </a:p>
+        </p:txBody>
+      </p:sp>
+      <p:sp>
+        <p:nvSpPr>
+          <p:cNvPr id="45" name="Textfeld 44"/>
+          <p:cNvSpPr txBox="1"/>
+          <p:nvPr/>
+        </p:nvSpPr>
+        <p:spPr>
+          <a:xfrm>
+            <a:off x="15690317" y="9006112"/>
+            <a:ext cx="12529392" cy="1477328"/>
+          </a:xfrm>
+          <a:prstGeom prst="rect">
+            <a:avLst/>
+          </a:prstGeom>
+          <a:noFill/>
+        </p:spPr>
+        <p:txBody>
+          <a:bodyPr wrap="square" rtlCol="0">
+            <a:spAutoFit/>
+          </a:bodyPr>
+          <a:lstStyle/>
+          <a:p>
+            <a:pPr algn="just"/>
+            <a:r>
+              <a:rPr lang="de-DE" sz="3000" dirty="0" smtClean="0"/>
+              <a:t>Die Hauptkomponenten funktionieren auch unter Windows und MacOS, wobei das Balance Board unter Windows nur mit einem passenden JSR082 Bluetooth Stack (z.B. </a:t>
+            </a:r>
+            <a:r>
+              <a:rPr lang="de-DE" sz="3000" dirty="0" err="1" smtClean="0"/>
+              <a:t>Widcomm</a:t>
+            </a:r>
+            <a:r>
+              <a:rPr lang="de-DE" sz="3000" dirty="0" smtClean="0"/>
+              <a:t>) anzubinden ist.</a:t>
+            </a:r>
+          </a:p>
+        </p:txBody>
+      </p:sp>
+      <p:sp>
+        <p:nvSpPr>
+          <p:cNvPr id="46" name="Textfeld 45"/>
+          <p:cNvSpPr txBox="1"/>
+          <p:nvPr/>
+        </p:nvSpPr>
+        <p:spPr>
+          <a:xfrm>
+            <a:off x="1652246" y="36416766"/>
+            <a:ext cx="12529392" cy="1477328"/>
+          </a:xfrm>
+          <a:prstGeom prst="rect">
+            <a:avLst/>
+          </a:prstGeom>
+          <a:noFill/>
+        </p:spPr>
+        <p:txBody>
+          <a:bodyPr wrap="square" rtlCol="0">
+            <a:spAutoFit/>
+          </a:bodyPr>
+          <a:lstStyle/>
+          <a:p>
+            <a:pPr algn="just"/>
+            <a:r>
+              <a:rPr lang="de-DE" sz="3000" dirty="0" smtClean="0"/>
+              <a:t>Präferierte Zielplattform der Tower-Anwendung </a:t>
+            </a:r>
+            <a:r>
+              <a:rPr lang="de-DE" sz="3000" dirty="0"/>
+              <a:t>ist eine der verbreiteten </a:t>
+            </a:r>
+            <a:r>
+              <a:rPr lang="de-DE" sz="3000" dirty="0" err="1"/>
+              <a:t>Linuxdistributionen</a:t>
+            </a:r>
+            <a:r>
+              <a:rPr lang="de-DE" sz="3000" dirty="0"/>
+              <a:t> (z.B. Debian oder Ubuntu</a:t>
+            </a:r>
+            <a:r>
+              <a:rPr lang="de-DE" sz="3000" dirty="0" smtClean="0"/>
+              <a:t>), </a:t>
+            </a:r>
+            <a:r>
+              <a:rPr lang="de-DE" sz="3000" dirty="0"/>
+              <a:t>da </a:t>
+            </a:r>
+            <a:r>
+              <a:rPr lang="de-DE" sz="3000" dirty="0" smtClean="0"/>
+              <a:t>hier alle </a:t>
+            </a:r>
+            <a:r>
+              <a:rPr lang="de-DE" sz="3000" dirty="0"/>
+              <a:t>benötigten Komponenten problemlos anzubinden sind. </a:t>
+            </a:r>
+            <a:endParaRPr lang="de-DE" sz="3000" dirty="0" smtClean="0"/>
+          </a:p>
+        </p:txBody>
+      </p:sp>
       <p:grpSp>
         <p:nvGrpSpPr>
-          <p:cNvPr id="2" name="Gruppieren 1"/>
+          <p:cNvPr id="3" name="Gruppieren 2"/>
           <p:cNvGrpSpPr/>
           <p:nvPr/>
         </p:nvGrpSpPr>
         <p:grpSpPr>
           <a:xfrm>
-            <a:off x="1674491" y="28338822"/>
-            <a:ext cx="12209205" cy="7683064"/>
-            <a:chOff x="28287685" y="22920931"/>
-            <a:chExt cx="12209205" cy="7683064"/>
+            <a:off x="1778654" y="28636146"/>
+            <a:ext cx="12209205" cy="7313732"/>
+            <a:chOff x="1674491" y="28338822"/>
+            <a:chExt cx="12209205" cy="7313732"/>
           </a:xfrm>
         </p:grpSpPr>
-        <p:sp>
-          <p:nvSpPr>
-            <p:cNvPr id="44" name="Textfeld 43"/>
-            <p:cNvSpPr txBox="1"/>
-            <p:nvPr/>
-          </p:nvSpPr>
-          <p:spPr>
-            <a:xfrm>
-              <a:off x="30843047" y="29772998"/>
-              <a:ext cx="6042999" cy="830997"/>
-            </a:xfrm>
-            <a:prstGeom prst="rect">
-              <a:avLst/>
-            </a:prstGeom>
-            <a:noFill/>
-          </p:spPr>
-          <p:txBody>
-            <a:bodyPr wrap="square" rtlCol="0">
-              <a:spAutoFit/>
-            </a:bodyPr>
-            <a:lstStyle/>
-            <a:p>
-              <a:pPr algn="ctr"/>
-              <a:r>
-                <a:rPr lang="de-DE" sz="2400" b="1" dirty="0" smtClean="0">
-                  <a:solidFill>
-                    <a:srgbClr val="262626"/>
-                  </a:solidFill>
-                </a:rPr>
-                <a:t>Abbildung 1: Anbindung der Peripherie per USB und  Bluetooth</a:t>
-              </a:r>
-              <a:endParaRPr lang="de-DE" sz="2400" b="1" dirty="0">
-                <a:solidFill>
-                  <a:srgbClr val="262626"/>
-                </a:solidFill>
-              </a:endParaRPr>
-            </a:p>
-          </p:txBody>
-        </p:sp>
         <p:grpSp>
           <p:nvGrpSpPr>
-            <p:cNvPr id="75" name="Gruppieren 74"/>
+            <p:cNvPr id="2" name="Gruppieren 1"/>
             <p:cNvGrpSpPr/>
             <p:nvPr/>
           </p:nvGrpSpPr>
           <p:grpSpPr>
             <a:xfrm>
-              <a:off x="28287685" y="22920931"/>
-              <a:ext cx="12209205" cy="6624736"/>
-              <a:chOff x="1630000" y="21836311"/>
-              <a:chExt cx="12306202" cy="6624736"/>
+              <a:off x="1674491" y="28338822"/>
+              <a:ext cx="12209205" cy="7313732"/>
+              <a:chOff x="28287685" y="22920931"/>
+              <a:chExt cx="12209205" cy="7313732"/>
             </a:xfrm>
           </p:grpSpPr>
           <p:sp>
             <p:nvSpPr>
-              <p:cNvPr id="74" name="Rechteck 73"/>
-              <p:cNvSpPr/>
+              <p:cNvPr id="44" name="Textfeld 43"/>
+              <p:cNvSpPr txBox="1"/>
               <p:nvPr/>
             </p:nvSpPr>
             <p:spPr>
               <a:xfrm>
-                <a:off x="1630000" y="21836311"/>
-                <a:ext cx="12306202" cy="6624736"/>
-              </a:xfrm>
-              <a:prstGeom prst="rect">
-                <a:avLst/>
-              </a:prstGeom>
-              <a:solidFill>
-                <a:srgbClr val="002060">
-                  <a:alpha val="5000"/>
-                </a:srgbClr>
-              </a:solidFill>
-              <a:ln>
-                <a:solidFill>
-                  <a:srgbClr val="000000"/>
-                </a:solidFill>
-              </a:ln>
-            </p:spPr>
-            <p:style>
-              <a:lnRef idx="2">
-                <a:schemeClr val="accent1">
-                  <a:shade val="50000"/>
-                </a:schemeClr>
-              </a:lnRef>
-              <a:fillRef idx="1">
-                <a:schemeClr val="accent1"/>
-              </a:fillRef>
-              <a:effectRef idx="0">
-                <a:schemeClr val="accent1"/>
-              </a:effectRef>
-              <a:fontRef idx="minor">
-                <a:schemeClr val="lt1"/>
-              </a:fontRef>
-            </p:style>
-            <p:txBody>
-              <a:bodyPr rtlCol="0" anchor="ctr"/>
-              <a:lstStyle/>
-              <a:p>
-                <a:pPr algn="ctr"/>
-                <a:endParaRPr lang="de-DE"/>
-              </a:p>
-            </p:txBody>
-          </p:sp>
-          <p:pic>
-            <p:nvPicPr>
-              <p:cNvPr id="48" name="Grafik 47" descr="https://dri1.img.digitalrivercontent.net/Storefront/Company/msintl/images/English/en-INTL-Parrot-Bebop-Drone-2-White-Cntrlr-Bndl-QK9-00022/en-INTL-L-Parrot-Bebop-Drone-2-White-Cntrlr-Bndl-QK9-00022-RM5-mnco.jpg"/>
-              <p:cNvPicPr>
-                <a:picLocks noChangeAspect="1"/>
-              </p:cNvPicPr>
-              <p:nvPr/>
-            </p:nvPicPr>
-            <p:blipFill rotWithShape="1">
-              <a:blip r:embed="rId10" cstate="print">
-                <a:clrChange>
-                  <a:clrFrom>
-                    <a:srgbClr val="FFFFFF"/>
-                  </a:clrFrom>
-                  <a:clrTo>
-                    <a:srgbClr val="FFFFFF">
-                      <a:alpha val="0"/>
-                    </a:srgbClr>
-                  </a:clrTo>
-                </a:clrChange>
-                <a:extLst>
-                  <a:ext uri="{28A0092B-C50C-407E-A947-70E740481C1C}">
-                    <a14:useLocalDpi xmlns:a14="http://schemas.microsoft.com/office/drawing/2010/main" val="0"/>
-                  </a:ext>
-                </a:extLst>
-              </a:blip>
-              <a:srcRect l="9830" t="26205" r="14828" b="29217"/>
-              <a:stretch/>
-            </p:blipFill>
-            <p:spPr bwMode="auto">
-              <a:xfrm>
-                <a:off x="9999352" y="23025018"/>
-                <a:ext cx="3701160" cy="1288727"/>
+                <a:off x="28287685" y="29772998"/>
+                <a:ext cx="12209205" cy="461665"/>
               </a:xfrm>
               <a:prstGeom prst="rect">
                 <a:avLst/>
               </a:prstGeom>
               <a:noFill/>
-              <a:ln>
+            </p:spPr>
+            <p:txBody>
+              <a:bodyPr wrap="square" rtlCol="0">
+                <a:spAutoFit/>
+              </a:bodyPr>
+              <a:lstStyle/>
+              <a:p>
+                <a:pPr algn="ctr"/>
+                <a:r>
+                  <a:rPr lang="de-DE" sz="2400" b="1" dirty="0" smtClean="0">
+                    <a:solidFill>
+                      <a:srgbClr val="262626"/>
+                    </a:solidFill>
+                  </a:rPr>
+                  <a:t>Abbildung 1: Anbindung der Peripherie per USB und  Bluetooth</a:t>
+                </a:r>
+                <a:endParaRPr lang="de-DE" sz="2400" b="1" dirty="0">
+                  <a:solidFill>
+                    <a:srgbClr val="262626"/>
+                  </a:solidFill>
+                </a:endParaRPr>
+              </a:p>
+            </p:txBody>
+          </p:sp>
+          <p:grpSp>
+            <p:nvGrpSpPr>
+              <p:cNvPr id="75" name="Gruppieren 74"/>
+              <p:cNvGrpSpPr/>
+              <p:nvPr/>
+            </p:nvGrpSpPr>
+            <p:grpSpPr>
+              <a:xfrm>
+                <a:off x="28287685" y="22920931"/>
+                <a:ext cx="12209205" cy="6624736"/>
+                <a:chOff x="1630000" y="21836311"/>
+                <a:chExt cx="12306202" cy="6624736"/>
+              </a:xfrm>
+            </p:grpSpPr>
+            <p:sp>
+              <p:nvSpPr>
+                <p:cNvPr id="74" name="Rechteck 73"/>
+                <p:cNvSpPr/>
+                <p:nvPr/>
+              </p:nvSpPr>
+              <p:spPr>
+                <a:xfrm>
+                  <a:off x="1630000" y="21836311"/>
+                  <a:ext cx="12306202" cy="6624736"/>
+                </a:xfrm>
+                <a:prstGeom prst="rect">
+                  <a:avLst/>
+                </a:prstGeom>
+                <a:solidFill>
+                  <a:srgbClr val="002060">
+                    <a:alpha val="5000"/>
+                  </a:srgbClr>
+                </a:solidFill>
+                <a:ln>
+                  <a:solidFill>
+                    <a:srgbClr val="000000"/>
+                  </a:solidFill>
+                </a:ln>
+              </p:spPr>
+              <p:style>
+                <a:lnRef idx="2">
+                  <a:schemeClr val="accent1">
+                    <a:shade val="50000"/>
+                  </a:schemeClr>
+                </a:lnRef>
+                <a:fillRef idx="1">
+                  <a:schemeClr val="accent1"/>
+                </a:fillRef>
+                <a:effectRef idx="0">
+                  <a:schemeClr val="accent1"/>
+                </a:effectRef>
+                <a:fontRef idx="minor">
+                  <a:schemeClr val="lt1"/>
+                </a:fontRef>
+              </p:style>
+              <p:txBody>
+                <a:bodyPr rtlCol="0" anchor="ctr"/>
+                <a:lstStyle/>
+                <a:p>
+                  <a:pPr algn="ctr"/>
+                  <a:endParaRPr lang="de-DE"/>
+                </a:p>
+              </p:txBody>
+            </p:sp>
+            <p:pic>
+              <p:nvPicPr>
+                <p:cNvPr id="48" name="Grafik 47" descr="https://dri1.img.digitalrivercontent.net/Storefront/Company/msintl/images/English/en-INTL-Parrot-Bebop-Drone-2-White-Cntrlr-Bndl-QK9-00022/en-INTL-L-Parrot-Bebop-Drone-2-White-Cntrlr-Bndl-QK9-00022-RM5-mnco.jpg"/>
+                <p:cNvPicPr>
+                  <a:picLocks noChangeAspect="1"/>
+                </p:cNvPicPr>
+                <p:nvPr/>
+              </p:nvPicPr>
+              <p:blipFill rotWithShape="1">
+                <a:blip r:embed="rId6" cstate="print">
+                  <a:clrChange>
+                    <a:clrFrom>
+                      <a:srgbClr val="FFFFFF"/>
+                    </a:clrFrom>
+                    <a:clrTo>
+                      <a:srgbClr val="FFFFFF">
+                        <a:alpha val="0"/>
+                      </a:srgbClr>
+                    </a:clrTo>
+                  </a:clrChange>
+                  <a:extLst>
+                    <a:ext uri="{28A0092B-C50C-407E-A947-70E740481C1C}">
+                      <a14:useLocalDpi xmlns:a14="http://schemas.microsoft.com/office/drawing/2010/main" val="0"/>
+                    </a:ext>
+                  </a:extLst>
+                </a:blip>
+                <a:srcRect l="9830" t="26205" r="14828" b="29217"/>
+                <a:stretch/>
+              </p:blipFill>
+              <p:spPr bwMode="auto">
+                <a:xfrm>
+                  <a:off x="9999352" y="23025018"/>
+                  <a:ext cx="3701160" cy="1288727"/>
+                </a:xfrm>
+                <a:prstGeom prst="rect">
+                  <a:avLst/>
+                </a:prstGeom>
                 <a:noFill/>
-              </a:ln>
-              <a:extLst>
-                <a:ext uri="{53640926-AAD7-44D8-BBD7-CCE9431645EC}">
-                  <a14:shadowObscured xmlns:a14="http://schemas.microsoft.com/office/drawing/2010/main"/>
-                </a:ext>
-              </a:extLst>
-            </p:spPr>
-          </p:pic>
+                <a:ln>
+                  <a:noFill/>
+                </a:ln>
+                <a:extLst>
+                  <a:ext uri="{53640926-AAD7-44D8-BBD7-CCE9431645EC}">
+                    <a14:shadowObscured xmlns:a14="http://schemas.microsoft.com/office/drawing/2010/main"/>
+                  </a:ext>
+                </a:extLst>
+              </p:spPr>
+            </p:pic>
+            <p:pic>
+              <p:nvPicPr>
+                <p:cNvPr id="50" name="Grafik 49"/>
+                <p:cNvPicPr>
+                  <a:picLocks noChangeAspect="1"/>
+                </p:cNvPicPr>
+                <p:nvPr/>
+              </p:nvPicPr>
+              <p:blipFill>
+                <a:blip r:embed="rId7" cstate="print">
+                  <a:extLst>
+                    <a:ext uri="{28A0092B-C50C-407E-A947-70E740481C1C}">
+                      <a14:useLocalDpi xmlns:a14="http://schemas.microsoft.com/office/drawing/2010/main" val="0"/>
+                    </a:ext>
+                  </a:extLst>
+                </a:blip>
+                <a:stretch>
+                  <a:fillRect/>
+                </a:stretch>
+              </p:blipFill>
+              <p:spPr>
+                <a:xfrm>
+                  <a:off x="6669543" y="22124343"/>
+                  <a:ext cx="2457820" cy="2071328"/>
+                </a:xfrm>
+                <a:prstGeom prst="rect">
+                  <a:avLst/>
+                </a:prstGeom>
+                <a:ln>
+                  <a:noFill/>
+                </a:ln>
+              </p:spPr>
+            </p:pic>
+            <p:pic>
+              <p:nvPicPr>
+                <p:cNvPr id="51" name="Grafik 50" descr="Joystick, Game Controller, Spiel, Kontrolle, Gerät"/>
+                <p:cNvPicPr>
+                  <a:picLocks noChangeAspect="1"/>
+                </p:cNvPicPr>
+                <p:nvPr/>
+              </p:nvPicPr>
+              <p:blipFill>
+                <a:blip r:embed="rId8" cstate="print">
+                  <a:extLst>
+                    <a:ext uri="{BEBA8EAE-BF5A-486C-A8C5-ECC9F3942E4B}">
+                      <a14:imgProps xmlns:a14="http://schemas.microsoft.com/office/drawing/2010/main">
+                        <a14:imgLayer r:embed="rId9">
+                          <a14:imgEffect>
+                            <a14:artisticPlasticWrap/>
+                          </a14:imgEffect>
+                        </a14:imgLayer>
+                      </a14:imgProps>
+                    </a:ext>
+                    <a:ext uri="{28A0092B-C50C-407E-A947-70E740481C1C}">
+                      <a14:useLocalDpi xmlns:a14="http://schemas.microsoft.com/office/drawing/2010/main" val="0"/>
+                    </a:ext>
+                  </a:extLst>
+                </a:blip>
+                <a:srcRect/>
+                <a:stretch>
+                  <a:fillRect/>
+                </a:stretch>
+              </p:blipFill>
+              <p:spPr bwMode="auto">
+                <a:xfrm>
+                  <a:off x="8072584" y="26369706"/>
+                  <a:ext cx="1529157" cy="1572310"/>
+                </a:xfrm>
+                <a:prstGeom prst="rect">
+                  <a:avLst/>
+                </a:prstGeom>
+                <a:noFill/>
+                <a:ln>
+                  <a:noFill/>
+                </a:ln>
+              </p:spPr>
+            </p:pic>
+            <p:pic>
+              <p:nvPicPr>
+                <p:cNvPr id="52" name="Grafik 51"/>
+                <p:cNvPicPr>
+                  <a:picLocks noChangeAspect="1"/>
+                </p:cNvPicPr>
+                <p:nvPr/>
+              </p:nvPicPr>
+              <p:blipFill>
+                <a:blip r:embed="rId10" cstate="print">
+                  <a:extLst>
+                    <a:ext uri="{BEBA8EAE-BF5A-486C-A8C5-ECC9F3942E4B}">
+                      <a14:imgProps xmlns:a14="http://schemas.microsoft.com/office/drawing/2010/main">
+                        <a14:imgLayer r:embed="rId11">
+                          <a14:imgEffect>
+                            <a14:artisticPlasticWrap/>
+                          </a14:imgEffect>
+                        </a14:imgLayer>
+                      </a14:imgProps>
+                    </a:ext>
+                    <a:ext uri="{28A0092B-C50C-407E-A947-70E740481C1C}">
+                      <a14:useLocalDpi xmlns:a14="http://schemas.microsoft.com/office/drawing/2010/main" val="0"/>
+                    </a:ext>
+                  </a:extLst>
+                </a:blip>
+                <a:stretch>
+                  <a:fillRect/>
+                </a:stretch>
+              </p:blipFill>
+              <p:spPr>
+                <a:xfrm>
+                  <a:off x="5912847" y="26551763"/>
+                  <a:ext cx="1513393" cy="1390253"/>
+                </a:xfrm>
+                <a:prstGeom prst="rect">
+                  <a:avLst/>
+                </a:prstGeom>
+                <a:ln>
+                  <a:noFill/>
+                </a:ln>
+              </p:spPr>
+            </p:pic>
+            <p:pic>
+              <p:nvPicPr>
+                <p:cNvPr id="53" name="Grafik 52"/>
+                <p:cNvPicPr>
+                  <a:picLocks noChangeAspect="1"/>
+                </p:cNvPicPr>
+                <p:nvPr/>
+              </p:nvPicPr>
+              <p:blipFill>
+                <a:blip r:embed="rId12" cstate="print">
+                  <a:extLst>
+                    <a:ext uri="{28A0092B-C50C-407E-A947-70E740481C1C}">
+                      <a14:useLocalDpi xmlns:a14="http://schemas.microsoft.com/office/drawing/2010/main" val="0"/>
+                    </a:ext>
+                  </a:extLst>
+                </a:blip>
+                <a:stretch>
+                  <a:fillRect/>
+                </a:stretch>
+              </p:blipFill>
+              <p:spPr>
+                <a:xfrm>
+                  <a:off x="1908662" y="26783472"/>
+                  <a:ext cx="3294782" cy="1158544"/>
+                </a:xfrm>
+                <a:prstGeom prst="rect">
+                  <a:avLst/>
+                </a:prstGeom>
+                <a:ln>
+                  <a:noFill/>
+                </a:ln>
+              </p:spPr>
+            </p:pic>
+            <p:pic>
+              <p:nvPicPr>
+                <p:cNvPr id="57" name="Grafik 56" descr="C:\Users\Puderer\AppData\Local\Microsoft\Windows\INetCache\IE\A3QJ7VIY\wireless-connection-icon[1].jpg"/>
+                <p:cNvPicPr>
+                  <a:picLocks noChangeAspect="1"/>
+                </p:cNvPicPr>
+                <p:nvPr/>
+              </p:nvPicPr>
+              <p:blipFill rotWithShape="1">
+                <a:blip r:embed="rId13" cstate="print">
+                  <a:clrChange>
+                    <a:clrFrom>
+                      <a:srgbClr val="FFFFFF"/>
+                    </a:clrFrom>
+                    <a:clrTo>
+                      <a:srgbClr val="FFFFFF">
+                        <a:alpha val="0"/>
+                      </a:srgbClr>
+                    </a:clrTo>
+                  </a:clrChange>
+                  <a:extLst>
+                    <a:ext uri="{BEBA8EAE-BF5A-486C-A8C5-ECC9F3942E4B}">
+                      <a14:imgProps xmlns:a14="http://schemas.microsoft.com/office/drawing/2010/main">
+                        <a14:imgLayer r:embed="rId14">
+                          <a14:imgEffect>
+                            <a14:saturation sat="0"/>
+                          </a14:imgEffect>
+                        </a14:imgLayer>
+                      </a14:imgProps>
+                    </a:ext>
+                    <a:ext uri="{28A0092B-C50C-407E-A947-70E740481C1C}">
+                      <a14:useLocalDpi xmlns:a14="http://schemas.microsoft.com/office/drawing/2010/main" val="0"/>
+                    </a:ext>
+                  </a:extLst>
+                </a:blip>
+                <a:srcRect l="11755" t="7454" r="9602" b="5383"/>
+                <a:stretch/>
+              </p:blipFill>
+              <p:spPr bwMode="auto">
+                <a:xfrm>
+                  <a:off x="11382314" y="22052335"/>
+                  <a:ext cx="915972" cy="873913"/>
+                </a:xfrm>
+                <a:prstGeom prst="rect">
+                  <a:avLst/>
+                </a:prstGeom>
+                <a:noFill/>
+                <a:ln>
+                  <a:noFill/>
+                </a:ln>
+                <a:extLst>
+                  <a:ext uri="{53640926-AAD7-44D8-BBD7-CCE9431645EC}">
+                    <a14:shadowObscured xmlns:a14="http://schemas.microsoft.com/office/drawing/2010/main"/>
+                  </a:ext>
+                </a:extLst>
+              </p:spPr>
+            </p:pic>
+            <p:pic>
+              <p:nvPicPr>
+                <p:cNvPr id="63" name="Grafik 62" descr="C:\Users\Puderer\AppData\Local\Microsoft\Windows\INetCache\IE\DW9SJ4A0\bluetooth[1].png"/>
+                <p:cNvPicPr>
+                  <a:picLocks noChangeAspect="1"/>
+                </p:cNvPicPr>
+                <p:nvPr/>
+              </p:nvPicPr>
+              <p:blipFill rotWithShape="1">
+                <a:blip r:embed="rId15" cstate="print">
+                  <a:extLst>
+                    <a:ext uri="{28A0092B-C50C-407E-A947-70E740481C1C}">
+                      <a14:useLocalDpi xmlns:a14="http://schemas.microsoft.com/office/drawing/2010/main" val="0"/>
+                    </a:ext>
+                  </a:extLst>
+                </a:blip>
+                <a:srcRect l="16423" t="8211" r="16716" b="8211"/>
+                <a:stretch/>
+              </p:blipFill>
+              <p:spPr bwMode="auto">
+                <a:xfrm>
+                  <a:off x="13159605" y="25889738"/>
+                  <a:ext cx="425642" cy="562721"/>
+                </a:xfrm>
+                <a:prstGeom prst="rect">
+                  <a:avLst/>
+                </a:prstGeom>
+                <a:noFill/>
+                <a:ln>
+                  <a:noFill/>
+                </a:ln>
+                <a:extLst>
+                  <a:ext uri="{53640926-AAD7-44D8-BBD7-CCE9431645EC}">
+                    <a14:shadowObscured xmlns:a14="http://schemas.microsoft.com/office/drawing/2010/main"/>
+                  </a:ext>
+                </a:extLst>
+              </p:spPr>
+            </p:pic>
+            <p:pic>
+              <p:nvPicPr>
+                <p:cNvPr id="64" name="Grafik 63" descr="C:\Users\Puderer\AppData\Local\Microsoft\Windows\INetCache\IE\DW9SJ4A0\1280px-USB_Icon.svg[1].png"/>
+                <p:cNvPicPr>
+                  <a:picLocks noChangeAspect="1"/>
+                </p:cNvPicPr>
+                <p:nvPr/>
+              </p:nvPicPr>
+              <p:blipFill>
+                <a:blip r:embed="rId16" cstate="print">
+                  <a:extLst>
+                    <a:ext uri="{28A0092B-C50C-407E-A947-70E740481C1C}">
+                      <a14:useLocalDpi xmlns:a14="http://schemas.microsoft.com/office/drawing/2010/main" val="0"/>
+                    </a:ext>
+                  </a:extLst>
+                </a:blip>
+                <a:srcRect/>
+                <a:stretch>
+                  <a:fillRect/>
+                </a:stretch>
+              </p:blipFill>
+              <p:spPr bwMode="auto">
+                <a:xfrm>
+                  <a:off x="1845604" y="25889738"/>
+                  <a:ext cx="882812" cy="446867"/>
+                </a:xfrm>
+                <a:prstGeom prst="rect">
+                  <a:avLst/>
+                </a:prstGeom>
+                <a:noFill/>
+                <a:ln>
+                  <a:noFill/>
+                </a:ln>
+              </p:spPr>
+            </p:pic>
+            <p:sp>
+              <p:nvSpPr>
+                <p:cNvPr id="65" name="Rechteck 64"/>
+                <p:cNvSpPr/>
+                <p:nvPr/>
+              </p:nvSpPr>
+              <p:spPr>
+                <a:xfrm>
+                  <a:off x="1782546" y="25823535"/>
+                  <a:ext cx="7929546" cy="2432943"/>
+                </a:xfrm>
+                <a:prstGeom prst="rect">
+                  <a:avLst/>
+                </a:prstGeom>
+                <a:noFill/>
+                <a:ln>
+                  <a:solidFill>
+                    <a:srgbClr val="000000"/>
+                  </a:solidFill>
+                  <a:prstDash val="dash"/>
+                </a:ln>
+              </p:spPr>
+              <p:style>
+                <a:lnRef idx="2">
+                  <a:schemeClr val="accent1">
+                    <a:shade val="50000"/>
+                  </a:schemeClr>
+                </a:lnRef>
+                <a:fillRef idx="1">
+                  <a:schemeClr val="accent1"/>
+                </a:fillRef>
+                <a:effectRef idx="0">
+                  <a:schemeClr val="accent1"/>
+                </a:effectRef>
+                <a:fontRef idx="minor">
+                  <a:schemeClr val="lt1"/>
+                </a:fontRef>
+              </p:style>
+              <p:txBody>
+                <a:bodyPr rot="0" spcFirstLastPara="0" vert="horz" wrap="square" lIns="91440" tIns="45720" rIns="91440" bIns="45720" numCol="1" spcCol="0" rtlCol="0" fromWordArt="0" anchor="ctr" anchorCtr="0" forceAA="0" compatLnSpc="1">
+                  <a:prstTxWarp prst="textNoShape">
+                    <a:avLst/>
+                  </a:prstTxWarp>
+                  <a:noAutofit/>
+                </a:bodyPr>
+                <a:lstStyle/>
+                <a:p>
+                  <a:endParaRPr lang="de-DE"/>
+                </a:p>
+              </p:txBody>
+            </p:sp>
+            <p:sp>
+              <p:nvSpPr>
+                <p:cNvPr id="66" name="Rechteck 65"/>
+                <p:cNvSpPr/>
+                <p:nvPr/>
+              </p:nvSpPr>
+              <p:spPr>
+                <a:xfrm>
+                  <a:off x="9980089" y="25823535"/>
+                  <a:ext cx="3720423" cy="2432943"/>
+                </a:xfrm>
+                <a:prstGeom prst="rect">
+                  <a:avLst/>
+                </a:prstGeom>
+                <a:noFill/>
+                <a:ln>
+                  <a:solidFill>
+                    <a:srgbClr val="000000"/>
+                  </a:solidFill>
+                  <a:prstDash val="dash"/>
+                </a:ln>
+              </p:spPr>
+              <p:style>
+                <a:lnRef idx="2">
+                  <a:schemeClr val="accent6">
+                    <a:shade val="50000"/>
+                  </a:schemeClr>
+                </a:lnRef>
+                <a:fillRef idx="1">
+                  <a:schemeClr val="accent6"/>
+                </a:fillRef>
+                <a:effectRef idx="0">
+                  <a:schemeClr val="accent6"/>
+                </a:effectRef>
+                <a:fontRef idx="minor">
+                  <a:schemeClr val="lt1"/>
+                </a:fontRef>
+              </p:style>
+              <p:txBody>
+                <a:bodyPr rot="0" spcFirstLastPara="0" vert="horz" wrap="square" lIns="91440" tIns="45720" rIns="91440" bIns="45720" numCol="1" spcCol="0" rtlCol="0" fromWordArt="0" anchor="ctr" anchorCtr="0" forceAA="0" compatLnSpc="1">
+                  <a:prstTxWarp prst="textNoShape">
+                    <a:avLst/>
+                  </a:prstTxWarp>
+                  <a:noAutofit/>
+                </a:bodyPr>
+                <a:lstStyle/>
+                <a:p>
+                  <a:endParaRPr lang="de-DE"/>
+                </a:p>
+              </p:txBody>
+            </p:sp>
+            <p:sp>
+              <p:nvSpPr>
+                <p:cNvPr id="11" name="Pfeil nach oben 10"/>
+                <p:cNvSpPr/>
+                <p:nvPr/>
+              </p:nvSpPr>
+              <p:spPr>
+                <a:xfrm>
+                  <a:off x="6907313" y="24428599"/>
+                  <a:ext cx="1774385" cy="647868"/>
+                </a:xfrm>
+                <a:prstGeom prst="upArrow">
+                  <a:avLst/>
+                </a:prstGeom>
+                <a:ln>
+                  <a:solidFill>
+                    <a:srgbClr val="000000"/>
+                  </a:solidFill>
+                </a:ln>
+              </p:spPr>
+              <p:style>
+                <a:lnRef idx="2">
+                  <a:schemeClr val="accent1">
+                    <a:shade val="50000"/>
+                  </a:schemeClr>
+                </a:lnRef>
+                <a:fillRef idx="1">
+                  <a:schemeClr val="accent1"/>
+                </a:fillRef>
+                <a:effectRef idx="0">
+                  <a:schemeClr val="accent1"/>
+                </a:effectRef>
+                <a:fontRef idx="minor">
+                  <a:schemeClr val="lt1"/>
+                </a:fontRef>
+              </p:style>
+              <p:txBody>
+                <a:bodyPr rtlCol="0" anchor="ctr"/>
+                <a:lstStyle/>
+                <a:p>
+                  <a:pPr algn="ctr"/>
+                  <a:endParaRPr lang="de-DE"/>
+                </a:p>
+              </p:txBody>
+            </p:sp>
+            <p:sp>
+              <p:nvSpPr>
+                <p:cNvPr id="68" name="Pfeil nach oben 67"/>
+                <p:cNvSpPr/>
+                <p:nvPr/>
+              </p:nvSpPr>
+              <p:spPr>
+                <a:xfrm rot="5400000">
+                  <a:off x="9005471" y="22957016"/>
+                  <a:ext cx="1180090" cy="647868"/>
+                </a:xfrm>
+                <a:prstGeom prst="upArrow">
+                  <a:avLst/>
+                </a:prstGeom>
+                <a:ln>
+                  <a:solidFill>
+                    <a:srgbClr val="000000"/>
+                  </a:solidFill>
+                </a:ln>
+              </p:spPr>
+              <p:style>
+                <a:lnRef idx="2">
+                  <a:schemeClr val="accent1">
+                    <a:shade val="50000"/>
+                  </a:schemeClr>
+                </a:lnRef>
+                <a:fillRef idx="1">
+                  <a:schemeClr val="accent1"/>
+                </a:fillRef>
+                <a:effectRef idx="0">
+                  <a:schemeClr val="accent1"/>
+                </a:effectRef>
+                <a:fontRef idx="minor">
+                  <a:schemeClr val="lt1"/>
+                </a:fontRef>
+              </p:style>
+              <p:txBody>
+                <a:bodyPr rtlCol="0" anchor="ctr"/>
+                <a:lstStyle/>
+                <a:p>
+                  <a:pPr algn="ctr"/>
+                  <a:endParaRPr lang="de-DE"/>
+                </a:p>
+              </p:txBody>
+            </p:sp>
+          </p:grpSp>
           <p:pic>
             <p:nvPicPr>
-              <p:cNvPr id="50" name="Grafik 49"/>
+              <p:cNvPr id="1032" name="Picture 8"/>
               <p:cNvPicPr>
-                <a:picLocks noChangeAspect="1"/>
+                <a:picLocks noChangeAspect="1" noChangeArrowheads="1"/>
               </p:cNvPicPr>
               <p:nvPr/>
             </p:nvPicPr>
             <p:blipFill>
-              <a:blip r:embed="rId11" cstate="print">
-                <a:extLst>
-                  <a:ext uri="{28A0092B-C50C-407E-A947-70E740481C1C}">
-                    <a14:useLocalDpi xmlns:a14="http://schemas.microsoft.com/office/drawing/2010/main" val="0"/>
-                  </a:ext>
-                </a:extLst>
-              </a:blip>
-              <a:stretch>
-                <a:fillRect/>
-              </a:stretch>
-            </p:blipFill>
-            <p:spPr>
-              <a:xfrm>
-                <a:off x="6669543" y="22124343"/>
-                <a:ext cx="2457820" cy="2071328"/>
-              </a:xfrm>
-              <a:prstGeom prst="rect">
-                <a:avLst/>
-              </a:prstGeom>
-              <a:ln>
-                <a:noFill/>
-              </a:ln>
-            </p:spPr>
-          </p:pic>
-          <p:pic>
-            <p:nvPicPr>
-              <p:cNvPr id="51" name="Grafik 50" descr="Joystick, Game Controller, Spiel, Kontrolle, Gerät"/>
-              <p:cNvPicPr>
-                <a:picLocks noChangeAspect="1"/>
-              </p:cNvPicPr>
-              <p:nvPr/>
-            </p:nvPicPr>
-            <p:blipFill>
-              <a:blip r:embed="rId12" cstate="print">
-                <a:extLst>
-                  <a:ext uri="{BEBA8EAE-BF5A-486C-A8C5-ECC9F3942E4B}">
-                    <a14:imgProps xmlns:a14="http://schemas.microsoft.com/office/drawing/2010/main">
-                      <a14:imgLayer r:embed="rId13">
-                        <a14:imgEffect>
-                          <a14:artisticPlasticWrap/>
-                        </a14:imgEffect>
-                      </a14:imgLayer>
-                    </a14:imgProps>
-                  </a:ext>
-                  <a:ext uri="{28A0092B-C50C-407E-A947-70E740481C1C}">
-                    <a14:useLocalDpi xmlns:a14="http://schemas.microsoft.com/office/drawing/2010/main" val="0"/>
-                  </a:ext>
-                </a:extLst>
-              </a:blip>
-              <a:srcRect/>
-              <a:stretch>
-                <a:fillRect/>
-              </a:stretch>
-            </p:blipFill>
-            <p:spPr bwMode="auto">
-              <a:xfrm>
-                <a:off x="8072584" y="26369706"/>
-                <a:ext cx="1529157" cy="1572310"/>
-              </a:xfrm>
-              <a:prstGeom prst="rect">
-                <a:avLst/>
-              </a:prstGeom>
-              <a:noFill/>
-              <a:ln>
-                <a:noFill/>
-              </a:ln>
-            </p:spPr>
-          </p:pic>
-          <p:pic>
-            <p:nvPicPr>
-              <p:cNvPr id="52" name="Grafik 51"/>
-              <p:cNvPicPr>
-                <a:picLocks noChangeAspect="1"/>
-              </p:cNvPicPr>
-              <p:nvPr/>
-            </p:nvPicPr>
-            <p:blipFill>
-              <a:blip r:embed="rId14" cstate="print">
-                <a:extLst>
-                  <a:ext uri="{BEBA8EAE-BF5A-486C-A8C5-ECC9F3942E4B}">
-                    <a14:imgProps xmlns:a14="http://schemas.microsoft.com/office/drawing/2010/main">
-                      <a14:imgLayer r:embed="rId15">
-                        <a14:imgEffect>
-                          <a14:artisticPlasticWrap/>
-                        </a14:imgEffect>
-                      </a14:imgLayer>
-                    </a14:imgProps>
-                  </a:ext>
-                  <a:ext uri="{28A0092B-C50C-407E-A947-70E740481C1C}">
-                    <a14:useLocalDpi xmlns:a14="http://schemas.microsoft.com/office/drawing/2010/main" val="0"/>
-                  </a:ext>
-                </a:extLst>
-              </a:blip>
-              <a:stretch>
-                <a:fillRect/>
-              </a:stretch>
-            </p:blipFill>
-            <p:spPr>
-              <a:xfrm>
-                <a:off x="5912847" y="26551763"/>
-                <a:ext cx="1513393" cy="1390253"/>
-              </a:xfrm>
-              <a:prstGeom prst="rect">
-                <a:avLst/>
-              </a:prstGeom>
-              <a:ln>
-                <a:noFill/>
-              </a:ln>
-            </p:spPr>
-          </p:pic>
-          <p:pic>
-            <p:nvPicPr>
-              <p:cNvPr id="53" name="Grafik 52"/>
-              <p:cNvPicPr>
-                <a:picLocks noChangeAspect="1"/>
-              </p:cNvPicPr>
-              <p:nvPr/>
-            </p:nvPicPr>
-            <p:blipFill>
-              <a:blip r:embed="rId16" cstate="print">
-                <a:extLst>
-                  <a:ext uri="{28A0092B-C50C-407E-A947-70E740481C1C}">
-                    <a14:useLocalDpi xmlns:a14="http://schemas.microsoft.com/office/drawing/2010/main" val="0"/>
-                  </a:ext>
-                </a:extLst>
-              </a:blip>
-              <a:stretch>
-                <a:fillRect/>
-              </a:stretch>
-            </p:blipFill>
-            <p:spPr>
-              <a:xfrm>
-                <a:off x="1908662" y="26783472"/>
-                <a:ext cx="3294782" cy="1158544"/>
-              </a:xfrm>
-              <a:prstGeom prst="rect">
-                <a:avLst/>
-              </a:prstGeom>
-              <a:ln>
-                <a:noFill/>
-              </a:ln>
-            </p:spPr>
-          </p:pic>
-          <p:pic>
-            <p:nvPicPr>
-              <p:cNvPr id="57" name="Grafik 56" descr="C:\Users\Puderer\AppData\Local\Microsoft\Windows\INetCache\IE\A3QJ7VIY\wireless-connection-icon[1].jpg"/>
-              <p:cNvPicPr>
-                <a:picLocks noChangeAspect="1"/>
-              </p:cNvPicPr>
-              <p:nvPr/>
-            </p:nvPicPr>
-            <p:blipFill rotWithShape="1">
               <a:blip r:embed="rId17" cstate="print">
-                <a:clrChange>
-                  <a:clrFrom>
-                    <a:srgbClr val="FFFFFF"/>
-                  </a:clrFrom>
-                  <a:clrTo>
-                    <a:srgbClr val="FFFFFF">
-                      <a:alpha val="0"/>
-                    </a:srgbClr>
-                  </a:clrTo>
-                </a:clrChange>
-                <a:extLst>
-                  <a:ext uri="{BEBA8EAE-BF5A-486C-A8C5-ECC9F3942E4B}">
-                    <a14:imgProps xmlns:a14="http://schemas.microsoft.com/office/drawing/2010/main">
-                      <a14:imgLayer r:embed="rId18">
-                        <a14:imgEffect>
-                          <a14:saturation sat="0"/>
-                        </a14:imgEffect>
-                      </a14:imgLayer>
-                    </a14:imgProps>
-                  </a:ext>
-                  <a:ext uri="{28A0092B-C50C-407E-A947-70E740481C1C}">
-                    <a14:useLocalDpi xmlns:a14="http://schemas.microsoft.com/office/drawing/2010/main" val="0"/>
-                  </a:ext>
-                </a:extLst>
-              </a:blip>
-              <a:srcRect l="11755" t="7454" r="9602" b="5383"/>
-              <a:stretch/>
-            </p:blipFill>
-            <p:spPr bwMode="auto">
-              <a:xfrm>
-                <a:off x="11382314" y="22052335"/>
-                <a:ext cx="915972" cy="873913"/>
-              </a:xfrm>
-              <a:prstGeom prst="rect">
-                <a:avLst/>
-              </a:prstGeom>
-              <a:noFill/>
-              <a:ln>
-                <a:noFill/>
-              </a:ln>
-              <a:extLst>
-                <a:ext uri="{53640926-AAD7-44D8-BBD7-CCE9431645EC}">
-                  <a14:shadowObscured xmlns:a14="http://schemas.microsoft.com/office/drawing/2010/main"/>
-                </a:ext>
-              </a:extLst>
-            </p:spPr>
-          </p:pic>
-          <p:pic>
-            <p:nvPicPr>
-              <p:cNvPr id="63" name="Grafik 62" descr="C:\Users\Puderer\AppData\Local\Microsoft\Windows\INetCache\IE\DW9SJ4A0\bluetooth[1].png"/>
-              <p:cNvPicPr>
-                <a:picLocks noChangeAspect="1"/>
-              </p:cNvPicPr>
-              <p:nvPr/>
-            </p:nvPicPr>
-            <p:blipFill rotWithShape="1">
-              <a:blip r:embed="rId19" cstate="print">
-                <a:extLst>
-                  <a:ext uri="{28A0092B-C50C-407E-A947-70E740481C1C}">
-                    <a14:useLocalDpi xmlns:a14="http://schemas.microsoft.com/office/drawing/2010/main" val="0"/>
-                  </a:ext>
-                </a:extLst>
-              </a:blip>
-              <a:srcRect l="16423" t="8211" r="16716" b="8211"/>
-              <a:stretch/>
-            </p:blipFill>
-            <p:spPr bwMode="auto">
-              <a:xfrm>
-                <a:off x="13159605" y="25889738"/>
-                <a:ext cx="425642" cy="562721"/>
-              </a:xfrm>
-              <a:prstGeom prst="rect">
-                <a:avLst/>
-              </a:prstGeom>
-              <a:noFill/>
-              <a:ln>
-                <a:solidFill>
-                  <a:srgbClr val="000000"/>
-                </a:solidFill>
-              </a:ln>
-              <a:extLst>
-                <a:ext uri="{53640926-AAD7-44D8-BBD7-CCE9431645EC}">
-                  <a14:shadowObscured xmlns:a14="http://schemas.microsoft.com/office/drawing/2010/main"/>
-                </a:ext>
-              </a:extLst>
-            </p:spPr>
-          </p:pic>
-          <p:pic>
-            <p:nvPicPr>
-              <p:cNvPr id="64" name="Grafik 63" descr="C:\Users\Puderer\AppData\Local\Microsoft\Windows\INetCache\IE\DW9SJ4A0\1280px-USB_Icon.svg[1].png"/>
-              <p:cNvPicPr>
-                <a:picLocks noChangeAspect="1"/>
-              </p:cNvPicPr>
-              <p:nvPr/>
-            </p:nvPicPr>
-            <p:blipFill>
-              <a:blip r:embed="rId20" cstate="print">
                 <a:extLst>
                   <a:ext uri="{28A0092B-C50C-407E-A947-70E740481C1C}">
                     <a14:useLocalDpi xmlns:a14="http://schemas.microsoft.com/office/drawing/2010/main" val="0"/>
@@ -2678,522 +3132,157 @@
             </p:blipFill>
             <p:spPr bwMode="auto">
               <a:xfrm>
-                <a:off x="1845604" y="25889738"/>
-                <a:ext cx="882812" cy="446867"/>
+                <a:off x="36886046" y="27335606"/>
+                <a:ext cx="2724150" cy="1809750"/>
               </a:xfrm>
               <a:prstGeom prst="rect">
                 <a:avLst/>
               </a:prstGeom>
               <a:noFill/>
               <a:ln>
-                <a:solidFill>
-                  <a:srgbClr val="000000"/>
-                </a:solidFill>
+                <a:noFill/>
               </a:ln>
+              <a:effectLst/>
+              <a:extLst>
+                <a:ext uri="{909E8E84-426E-40DD-AFC4-6F175D3DCCD1}">
+                  <a14:hiddenFill xmlns:a14="http://schemas.microsoft.com/office/drawing/2010/main">
+                    <a:solidFill>
+                      <a:schemeClr val="accent1"/>
+                    </a:solidFill>
+                  </a14:hiddenFill>
+                </a:ext>
+                <a:ext uri="{91240B29-F687-4F45-9708-019B960494DF}">
+                  <a14:hiddenLine xmlns:a14="http://schemas.microsoft.com/office/drawing/2010/main" w="9525">
+                    <a:solidFill>
+                      <a:schemeClr val="tx1"/>
+                    </a:solidFill>
+                    <a:miter lim="800000"/>
+                    <a:headEnd/>
+                    <a:tailEnd/>
+                  </a14:hiddenLine>
+                </a:ext>
+                <a:ext uri="{AF507438-7753-43E0-B8FC-AC1667EBCBE1}">
+                  <a14:hiddenEffects xmlns:a14="http://schemas.microsoft.com/office/drawing/2010/main">
+                    <a:effectLst>
+                      <a:outerShdw dist="35921" dir="2700000" algn="ctr" rotWithShape="0">
+                        <a:schemeClr val="bg2"/>
+                      </a:outerShdw>
+                    </a:effectLst>
+                  </a14:hiddenEffects>
+                </a:ext>
+              </a:extLst>
             </p:spPr>
           </p:pic>
-          <p:sp>
-            <p:nvSpPr>
-              <p:cNvPr id="65" name="Rechteck 64"/>
-              <p:cNvSpPr/>
-              <p:nvPr/>
-            </p:nvSpPr>
-            <p:spPr>
-              <a:xfrm>
-                <a:off x="1782546" y="25823535"/>
-                <a:ext cx="7929546" cy="2432943"/>
-              </a:xfrm>
-              <a:prstGeom prst="rect">
-                <a:avLst/>
-              </a:prstGeom>
-              <a:noFill/>
-              <a:ln>
-                <a:solidFill>
-                  <a:srgbClr val="000000"/>
-                </a:solidFill>
-                <a:prstDash val="dash"/>
-              </a:ln>
-            </p:spPr>
-            <p:style>
-              <a:lnRef idx="2">
-                <a:schemeClr val="accent1">
-                  <a:shade val="50000"/>
-                </a:schemeClr>
-              </a:lnRef>
-              <a:fillRef idx="1">
-                <a:schemeClr val="accent1"/>
-              </a:fillRef>
-              <a:effectRef idx="0">
-                <a:schemeClr val="accent1"/>
-              </a:effectRef>
-              <a:fontRef idx="minor">
-                <a:schemeClr val="lt1"/>
-              </a:fontRef>
-            </p:style>
-            <p:txBody>
-              <a:bodyPr rot="0" spcFirstLastPara="0" vert="horz" wrap="square" lIns="91440" tIns="45720" rIns="91440" bIns="45720" numCol="1" spcCol="0" rtlCol="0" fromWordArt="0" anchor="ctr" anchorCtr="0" forceAA="0" compatLnSpc="1">
-                <a:prstTxWarp prst="textNoShape">
-                  <a:avLst/>
-                </a:prstTxWarp>
-                <a:noAutofit/>
-              </a:bodyPr>
-              <a:lstStyle/>
-              <a:p>
-                <a:endParaRPr lang="de-DE"/>
-              </a:p>
-            </p:txBody>
-          </p:sp>
-          <p:sp>
-            <p:nvSpPr>
-              <p:cNvPr id="66" name="Rechteck 65"/>
-              <p:cNvSpPr/>
-              <p:nvPr/>
-            </p:nvSpPr>
-            <p:spPr>
-              <a:xfrm>
-                <a:off x="9980089" y="25823535"/>
-                <a:ext cx="3720423" cy="2432943"/>
-              </a:xfrm>
-              <a:prstGeom prst="rect">
-                <a:avLst/>
-              </a:prstGeom>
-              <a:noFill/>
-              <a:ln>
-                <a:solidFill>
-                  <a:srgbClr val="000000"/>
-                </a:solidFill>
-                <a:prstDash val="dash"/>
-              </a:ln>
-            </p:spPr>
-            <p:style>
-              <a:lnRef idx="2">
-                <a:schemeClr val="accent6">
-                  <a:shade val="50000"/>
-                </a:schemeClr>
-              </a:lnRef>
-              <a:fillRef idx="1">
-                <a:schemeClr val="accent6"/>
-              </a:fillRef>
-              <a:effectRef idx="0">
-                <a:schemeClr val="accent6"/>
-              </a:effectRef>
-              <a:fontRef idx="minor">
-                <a:schemeClr val="lt1"/>
-              </a:fontRef>
-            </p:style>
-            <p:txBody>
-              <a:bodyPr rot="0" spcFirstLastPara="0" vert="horz" wrap="square" lIns="91440" tIns="45720" rIns="91440" bIns="45720" numCol="1" spcCol="0" rtlCol="0" fromWordArt="0" anchor="ctr" anchorCtr="0" forceAA="0" compatLnSpc="1">
-                <a:prstTxWarp prst="textNoShape">
-                  <a:avLst/>
-                </a:prstTxWarp>
-                <a:noAutofit/>
-              </a:bodyPr>
-              <a:lstStyle/>
-              <a:p>
-                <a:endParaRPr lang="de-DE"/>
-              </a:p>
-            </p:txBody>
-          </p:sp>
-          <p:sp>
-            <p:nvSpPr>
-              <p:cNvPr id="11" name="Pfeil nach oben 10"/>
-              <p:cNvSpPr/>
-              <p:nvPr/>
-            </p:nvSpPr>
-            <p:spPr>
-              <a:xfrm>
-                <a:off x="6907313" y="24428599"/>
-                <a:ext cx="1774385" cy="647868"/>
-              </a:xfrm>
-              <a:prstGeom prst="upArrow">
-                <a:avLst/>
-              </a:prstGeom>
-              <a:ln>
-                <a:solidFill>
-                  <a:srgbClr val="000000"/>
-                </a:solidFill>
-              </a:ln>
-            </p:spPr>
-            <p:style>
-              <a:lnRef idx="2">
-                <a:schemeClr val="accent1">
-                  <a:shade val="50000"/>
-                </a:schemeClr>
-              </a:lnRef>
-              <a:fillRef idx="1">
-                <a:schemeClr val="accent1"/>
-              </a:fillRef>
-              <a:effectRef idx="0">
-                <a:schemeClr val="accent1"/>
-              </a:effectRef>
-              <a:fontRef idx="minor">
-                <a:schemeClr val="lt1"/>
-              </a:fontRef>
-            </p:style>
-            <p:txBody>
-              <a:bodyPr rtlCol="0" anchor="ctr"/>
-              <a:lstStyle/>
-              <a:p>
-                <a:pPr algn="ctr"/>
-                <a:endParaRPr lang="de-DE"/>
-              </a:p>
-            </p:txBody>
-          </p:sp>
-          <p:sp>
-            <p:nvSpPr>
-              <p:cNvPr id="68" name="Pfeil nach oben 67"/>
-              <p:cNvSpPr/>
-              <p:nvPr/>
-            </p:nvSpPr>
-            <p:spPr>
-              <a:xfrm rot="5400000">
-                <a:off x="9005471" y="22957016"/>
-                <a:ext cx="1180090" cy="647868"/>
-              </a:xfrm>
-              <a:prstGeom prst="upArrow">
-                <a:avLst/>
-              </a:prstGeom>
-              <a:ln>
-                <a:solidFill>
-                  <a:srgbClr val="000000"/>
-                </a:solidFill>
-              </a:ln>
-            </p:spPr>
-            <p:style>
-              <a:lnRef idx="2">
-                <a:schemeClr val="accent1">
-                  <a:shade val="50000"/>
-                </a:schemeClr>
-              </a:lnRef>
-              <a:fillRef idx="1">
-                <a:schemeClr val="accent1"/>
-              </a:fillRef>
-              <a:effectRef idx="0">
-                <a:schemeClr val="accent1"/>
-              </a:effectRef>
-              <a:fontRef idx="minor">
-                <a:schemeClr val="lt1"/>
-              </a:fontRef>
-            </p:style>
-            <p:txBody>
-              <a:bodyPr rtlCol="0" anchor="ctr"/>
-              <a:lstStyle/>
-              <a:p>
-                <a:pPr algn="ctr"/>
-                <a:endParaRPr lang="de-DE"/>
-              </a:p>
-            </p:txBody>
-          </p:sp>
         </p:grpSp>
-        <p:pic>
-          <p:nvPicPr>
-            <p:cNvPr id="1032" name="Picture 8"/>
-            <p:cNvPicPr>
-              <a:picLocks noChangeAspect="1" noChangeArrowheads="1"/>
-            </p:cNvPicPr>
+        <p:sp>
+          <p:nvSpPr>
+            <p:cNvPr id="47" name="Textfeld 46"/>
+            <p:cNvSpPr txBox="1"/>
             <p:nvPr/>
-          </p:nvPicPr>
-          <p:blipFill>
-            <a:blip r:embed="rId21" cstate="print">
-              <a:extLst>
-                <a:ext uri="{28A0092B-C50C-407E-A947-70E740481C1C}">
-                  <a14:useLocalDpi xmlns:a14="http://schemas.microsoft.com/office/drawing/2010/main" val="0"/>
-                </a:ext>
-              </a:extLst>
-            </a:blip>
-            <a:srcRect/>
-            <a:stretch>
-              <a:fillRect/>
-            </a:stretch>
-          </p:blipFill>
-          <p:spPr bwMode="auto">
+          </p:nvSpPr>
+          <p:spPr>
             <a:xfrm>
-              <a:off x="36886046" y="27335606"/>
-              <a:ext cx="2724150" cy="1809750"/>
+              <a:off x="3638274" y="28800749"/>
+              <a:ext cx="2932761" cy="1748529"/>
             </a:xfrm>
             <a:prstGeom prst="rect">
               <a:avLst/>
             </a:prstGeom>
             <a:noFill/>
-            <a:ln>
-              <a:noFill/>
-            </a:ln>
-            <a:effectLst/>
-            <a:extLst>
-              <a:ext uri="{909E8E84-426E-40DD-AFC4-6F175D3DCCD1}">
-                <a14:hiddenFill xmlns:a14="http://schemas.microsoft.com/office/drawing/2010/main">
+          </p:spPr>
+          <p:txBody>
+            <a:bodyPr wrap="square" bIns="360000" numCol="1" spcCol="720000" rtlCol="0">
+              <a:noAutofit/>
+            </a:bodyPr>
+            <a:lstStyle/>
+            <a:p>
+              <a:pPr algn="ctr">
+                <a:lnSpc>
+                  <a:spcPts val="3800"/>
+                </a:lnSpc>
+              </a:pPr>
+              <a:r>
+                <a:rPr lang="de-DE" sz="3000" b="1" dirty="0" smtClean="0">
                   <a:solidFill>
-                    <a:schemeClr val="accent1"/>
+                    <a:srgbClr val="262626"/>
                   </a:solidFill>
-                </a14:hiddenFill>
-              </a:ext>
-              <a:ext uri="{91240B29-F687-4F45-9708-019B960494DF}">
-                <a14:hiddenLine xmlns:a14="http://schemas.microsoft.com/office/drawing/2010/main" w="9525">
+                </a:rPr>
+                <a:t>Tower</a:t>
+              </a:r>
+            </a:p>
+            <a:p>
+              <a:pPr algn="ctr">
+                <a:lnSpc>
+                  <a:spcPts val="3800"/>
+                </a:lnSpc>
+              </a:pPr>
+              <a:r>
+                <a:rPr lang="de-DE" sz="3000" dirty="0" smtClean="0"/>
+                <a:t>(zentrale </a:t>
+              </a:r>
+            </a:p>
+            <a:p>
+              <a:pPr algn="ctr">
+                <a:lnSpc>
+                  <a:spcPts val="3800"/>
+                </a:lnSpc>
+              </a:pPr>
+              <a:r>
+                <a:rPr lang="de-DE" sz="3000" dirty="0" smtClean="0"/>
+                <a:t>Steuereinheit)</a:t>
+              </a:r>
+              <a:endParaRPr lang="de-DE" sz="3000" dirty="0" smtClean="0">
+                <a:solidFill>
+                  <a:srgbClr val="262626"/>
+                </a:solidFill>
+              </a:endParaRPr>
+            </a:p>
+          </p:txBody>
+        </p:sp>
+        <p:sp>
+          <p:nvSpPr>
+            <p:cNvPr id="49" name="Textfeld 48"/>
+            <p:cNvSpPr txBox="1"/>
+            <p:nvPr/>
+          </p:nvSpPr>
+          <p:spPr>
+            <a:xfrm>
+              <a:off x="6324026" y="31701406"/>
+              <a:ext cx="2932761" cy="581692"/>
+            </a:xfrm>
+            <a:prstGeom prst="rect">
+              <a:avLst/>
+            </a:prstGeom>
+            <a:noFill/>
+          </p:spPr>
+          <p:txBody>
+            <a:bodyPr wrap="square" bIns="360000" numCol="1" spcCol="720000" rtlCol="0">
+              <a:noAutofit/>
+            </a:bodyPr>
+            <a:lstStyle/>
+            <a:p>
+              <a:pPr algn="ctr">
+                <a:lnSpc>
+                  <a:spcPts val="3800"/>
+                </a:lnSpc>
+              </a:pPr>
+              <a:r>
+                <a:rPr lang="de-DE" sz="3000" b="1" dirty="0" smtClean="0">
                   <a:solidFill>
-                    <a:schemeClr val="tx1"/>
+                    <a:srgbClr val="262626"/>
                   </a:solidFill>
-                  <a:miter lim="800000"/>
-                  <a:headEnd/>
-                  <a:tailEnd/>
-                </a14:hiddenLine>
-              </a:ext>
-              <a:ext uri="{AF507438-7753-43E0-B8FC-AC1667EBCBE1}">
-                <a14:hiddenEffects xmlns:a14="http://schemas.microsoft.com/office/drawing/2010/main">
-                  <a:effectLst>
-                    <a:outerShdw dist="35921" dir="2700000" algn="ctr" rotWithShape="0">
-                      <a:schemeClr val="bg2"/>
-                    </a:outerShdw>
-                  </a:effectLst>
-                </a14:hiddenEffects>
-              </a:ext>
-            </a:extLst>
-          </p:spPr>
-        </p:pic>
+                </a:rPr>
+                <a:t>Eingabegeräte</a:t>
+              </a:r>
+              <a:endParaRPr lang="de-DE" sz="3000" dirty="0" smtClean="0">
+                <a:solidFill>
+                  <a:srgbClr val="262626"/>
+                </a:solidFill>
+              </a:endParaRPr>
+            </a:p>
+          </p:txBody>
+        </p:sp>
       </p:grpSp>
-      <p:sp>
-        <p:nvSpPr>
-          <p:cNvPr id="38" name="Textfeld 37"/>
-          <p:cNvSpPr txBox="1"/>
-          <p:nvPr/>
-        </p:nvSpPr>
-        <p:spPr>
-          <a:xfrm>
-            <a:off x="1674491" y="24068558"/>
-            <a:ext cx="12529392" cy="923330"/>
-          </a:xfrm>
-          <a:prstGeom prst="rect">
-            <a:avLst/>
-          </a:prstGeom>
-          <a:noFill/>
-        </p:spPr>
-        <p:txBody>
-          <a:bodyPr wrap="square" rtlCol="0">
-            <a:spAutoFit/>
-          </a:bodyPr>
-          <a:lstStyle/>
-          <a:p>
-            <a:r>
-              <a:rPr lang="de-DE" sz="5400" dirty="0" smtClean="0">
-                <a:solidFill>
-                  <a:schemeClr val="accent5"/>
-                </a:solidFill>
-                <a:latin typeface="+mj-lt"/>
-                <a:cs typeface="Times New Roman" pitchFamily="18" charset="0"/>
-              </a:rPr>
-              <a:t>Die Umsetzung</a:t>
-            </a:r>
-          </a:p>
-        </p:txBody>
-      </p:sp>
-      <p:sp>
-        <p:nvSpPr>
-          <p:cNvPr id="45" name="Textfeld 44"/>
-          <p:cNvSpPr txBox="1"/>
-          <p:nvPr/>
-        </p:nvSpPr>
-        <p:spPr>
-          <a:xfrm>
-            <a:off x="15758296" y="9006112"/>
-            <a:ext cx="12529392" cy="1477328"/>
-          </a:xfrm>
-          <a:prstGeom prst="rect">
-            <a:avLst/>
-          </a:prstGeom>
-          <a:noFill/>
-        </p:spPr>
-        <p:txBody>
-          <a:bodyPr wrap="square" rtlCol="0">
-            <a:spAutoFit/>
-          </a:bodyPr>
-          <a:lstStyle/>
-          <a:p>
-            <a:pPr algn="just"/>
-            <a:r>
-              <a:rPr lang="de-DE" sz="3000" dirty="0" smtClean="0"/>
-              <a:t>Die Hauptkomponenten funktionieren auch unter Windows und MacOS, wobei das Balance Board unter Windows nur mit einem passenden JSR082 Bluetooth Stack (z.B. </a:t>
-            </a:r>
-            <a:r>
-              <a:rPr lang="de-DE" sz="3000" dirty="0" err="1" smtClean="0"/>
-              <a:t>Widcomm</a:t>
-            </a:r>
-            <a:r>
-              <a:rPr lang="de-DE" sz="3000" dirty="0" smtClean="0"/>
-              <a:t>) anzubinden ist.</a:t>
-            </a:r>
-          </a:p>
-        </p:txBody>
-      </p:sp>
-      <p:sp>
-        <p:nvSpPr>
-          <p:cNvPr id="46" name="Textfeld 45"/>
-          <p:cNvSpPr txBox="1"/>
-          <p:nvPr/>
-        </p:nvSpPr>
-        <p:spPr>
-          <a:xfrm>
-            <a:off x="1630000" y="36416766"/>
-            <a:ext cx="12529392" cy="1477328"/>
-          </a:xfrm>
-          <a:prstGeom prst="rect">
-            <a:avLst/>
-          </a:prstGeom>
-          <a:noFill/>
-        </p:spPr>
-        <p:txBody>
-          <a:bodyPr wrap="square" rtlCol="0">
-            <a:spAutoFit/>
-          </a:bodyPr>
-          <a:lstStyle/>
-          <a:p>
-            <a:pPr algn="just"/>
-            <a:r>
-              <a:rPr lang="de-DE" sz="3000" dirty="0" smtClean="0"/>
-              <a:t>Zielplattform </a:t>
-            </a:r>
-            <a:r>
-              <a:rPr lang="de-DE" sz="3000" dirty="0" smtClean="0"/>
-              <a:t>des Towers </a:t>
-            </a:r>
-            <a:r>
-              <a:rPr lang="de-DE" sz="3000" dirty="0"/>
-              <a:t>ist eine der verbreiteten </a:t>
-            </a:r>
-            <a:r>
-              <a:rPr lang="de-DE" sz="3000" dirty="0" err="1"/>
-              <a:t>Linuxdistributionen</a:t>
-            </a:r>
-            <a:r>
-              <a:rPr lang="de-DE" sz="3000" dirty="0"/>
-              <a:t> (z.B. Debian oder Ubuntu</a:t>
-            </a:r>
-            <a:r>
-              <a:rPr lang="de-DE" sz="3000" dirty="0" smtClean="0"/>
-              <a:t>), </a:t>
-            </a:r>
-            <a:r>
-              <a:rPr lang="de-DE" sz="3000" dirty="0"/>
-              <a:t>da </a:t>
-            </a:r>
-            <a:r>
-              <a:rPr lang="de-DE" sz="3000" dirty="0" smtClean="0"/>
-              <a:t>hier alle </a:t>
-            </a:r>
-            <a:r>
-              <a:rPr lang="de-DE" sz="3000" dirty="0"/>
-              <a:t>benötigten Komponenten problemlos anzubinden sind. </a:t>
-            </a:r>
-            <a:endParaRPr lang="de-DE" sz="3000" dirty="0" smtClean="0"/>
-          </a:p>
-        </p:txBody>
-      </p:sp>
-      <p:sp>
-        <p:nvSpPr>
-          <p:cNvPr id="47" name="Textfeld 46"/>
-          <p:cNvSpPr txBox="1"/>
-          <p:nvPr/>
-        </p:nvSpPr>
-        <p:spPr>
-          <a:xfrm>
-            <a:off x="3638274" y="28800749"/>
-            <a:ext cx="2932761" cy="1748529"/>
-          </a:xfrm>
-          <a:prstGeom prst="rect">
-            <a:avLst/>
-          </a:prstGeom>
-          <a:noFill/>
-        </p:spPr>
-        <p:txBody>
-          <a:bodyPr wrap="square" bIns="360000" numCol="1" spcCol="720000" rtlCol="0">
-            <a:noAutofit/>
-          </a:bodyPr>
-          <a:lstStyle/>
-          <a:p>
-            <a:pPr algn="ctr">
-              <a:lnSpc>
-                <a:spcPts val="3800"/>
-              </a:lnSpc>
-            </a:pPr>
-            <a:r>
-              <a:rPr lang="de-DE" sz="3000" b="1" dirty="0" smtClean="0">
-                <a:solidFill>
-                  <a:srgbClr val="262626"/>
-                </a:solidFill>
-              </a:rPr>
-              <a:t>Tower</a:t>
-            </a:r>
-          </a:p>
-          <a:p>
-            <a:pPr algn="ctr">
-              <a:lnSpc>
-                <a:spcPts val="3800"/>
-              </a:lnSpc>
-            </a:pPr>
-            <a:r>
-              <a:rPr lang="de-DE" sz="3000" dirty="0" smtClean="0"/>
-              <a:t>(zentrale </a:t>
-            </a:r>
-          </a:p>
-          <a:p>
-            <a:pPr algn="ctr">
-              <a:lnSpc>
-                <a:spcPts val="3800"/>
-              </a:lnSpc>
-            </a:pPr>
-            <a:r>
-              <a:rPr lang="de-DE" sz="3000" dirty="0" smtClean="0"/>
-              <a:t>Steuereinheit)</a:t>
-            </a:r>
-            <a:endParaRPr lang="de-DE" sz="3000" dirty="0" smtClean="0">
-              <a:solidFill>
-                <a:srgbClr val="262626"/>
-              </a:solidFill>
-            </a:endParaRPr>
-          </a:p>
-        </p:txBody>
-      </p:sp>
-      <p:sp>
-        <p:nvSpPr>
-          <p:cNvPr id="49" name="Textfeld 48"/>
-          <p:cNvSpPr txBox="1"/>
-          <p:nvPr/>
-        </p:nvSpPr>
-        <p:spPr>
-          <a:xfrm>
-            <a:off x="6324026" y="31485382"/>
-            <a:ext cx="2932761" cy="581692"/>
-          </a:xfrm>
-          <a:prstGeom prst="rect">
-            <a:avLst/>
-          </a:prstGeom>
-          <a:noFill/>
-        </p:spPr>
-        <p:txBody>
-          <a:bodyPr wrap="square" bIns="360000" numCol="1" spcCol="720000" rtlCol="0">
-            <a:noAutofit/>
-          </a:bodyPr>
-          <a:lstStyle/>
-          <a:p>
-            <a:pPr algn="ctr">
-              <a:lnSpc>
-                <a:spcPts val="3800"/>
-              </a:lnSpc>
-            </a:pPr>
-            <a:r>
-              <a:rPr lang="de-DE" sz="3000" b="1" dirty="0" smtClean="0">
-                <a:solidFill>
-                  <a:srgbClr val="262626"/>
-                </a:solidFill>
-              </a:rPr>
-              <a:t>Eingabegeräte</a:t>
-            </a:r>
-            <a:endParaRPr lang="de-DE" sz="3000" dirty="0" smtClean="0">
-              <a:solidFill>
-                <a:srgbClr val="262626"/>
-              </a:solidFill>
-            </a:endParaRPr>
-          </a:p>
-        </p:txBody>
-      </p:sp>
     </p:spTree>
     <p:extLst>
       <p:ext uri="{BB962C8B-B14F-4D97-AF65-F5344CB8AC3E}">

</xml_diff>